<commit_message>
undone work for 2/10/17
</commit_message>
<xml_diff>
--- a/Spring 2017 Semester/Urban Development/Urban Development Weekly Readings/Week 2/Week 2 Readings.pptx
+++ b/Spring 2017 Semester/Urban Development/Urban Development Weekly Readings/Week 2/Week 2 Readings.pptx
@@ -107,6 +107,11 @@
       </a:defRPr>
     </a:lvl9pPr>
   </p:defaultTextStyle>
+  <p:extLst>
+    <p:ext uri="{EFAFB233-063F-42B5-8137-9DF3F51BA10A}">
+      <p15:sldGuideLst xmlns:p15="http://schemas.microsoft.com/office/powerpoint/2012/main"/>
+    </p:ext>
+  </p:extLst>
 </p:presentation>
 </file>
 
@@ -205,7 +210,7 @@
           <a:effectLst/>
           <a:extLst>
             <a:ext uri="{91240B29-F687-4f45-9708-019B960494DF}">
-              <a14:hiddenLine xmlns:a14="http://schemas.microsoft.com/office/drawing/2010/main" xmlns="" w="9525">
+              <a14:hiddenLine xmlns="" xmlns:a14="http://schemas.microsoft.com/office/drawing/2010/main" w="9525">
                 <a:solidFill>
                   <a:srgbClr val="000000"/>
                 </a:solidFill>
@@ -398,7 +403,7 @@
             <a:fld id="{08B9EBBA-996F-894A-B54A-D6246ED52CEA}" type="datetimeFigureOut">
               <a:rPr lang="en-US" dirty="0"/>
               <a:pPr/>
-              <a:t>2/7/2017</a:t>
+              <a:t>2/10/2017</a:t>
             </a:fld>
             <a:endParaRPr lang="en-US" dirty="0"/>
           </a:p>
@@ -713,7 +718,7 @@
             <a:fld id="{18C79C5D-2A6F-F04D-97DA-BEF2467B64E4}" type="datetimeFigureOut">
               <a:rPr lang="en-US" dirty="0"/>
               <a:pPr/>
-              <a:t>2/7/2017</a:t>
+              <a:t>2/10/2017</a:t>
             </a:fld>
             <a:endParaRPr lang="en-US" dirty="0"/>
           </a:p>
@@ -1198,7 +1203,7 @@
             <a:fld id="{8DFA1846-DA80-1C48-A609-854EA85C59AD}" type="datetimeFigureOut">
               <a:rPr lang="en-US" dirty="0"/>
               <a:pPr/>
-              <a:t>2/7/2017</a:t>
+              <a:t>2/10/2017</a:t>
             </a:fld>
             <a:endParaRPr lang="en-US" dirty="0"/>
           </a:p>
@@ -1564,7 +1569,7 @@
             <a:fld id="{FBF54567-0DE4-3F47-BF90-CB84690072F9}" type="datetimeFigureOut">
               <a:rPr lang="en-US" dirty="0"/>
               <a:pPr/>
-              <a:t>2/7/2017</a:t>
+              <a:t>2/10/2017</a:t>
             </a:fld>
             <a:endParaRPr lang="en-US" dirty="0"/>
           </a:p>
@@ -1715,7 +1720,7 @@
           <a:ln/>
           <a:extLst>
             <a:ext uri="{91240B29-F687-4f45-9708-019B960494DF}">
-              <a14:hiddenLine xmlns:a14="http://schemas.microsoft.com/office/drawing/2010/main" xmlns="" w="9525">
+              <a14:hiddenLine xmlns="" xmlns:a14="http://schemas.microsoft.com/office/drawing/2010/main" w="9525">
                 <a:solidFill>
                   <a:srgbClr val="000000"/>
                 </a:solidFill>
@@ -1834,7 +1839,7 @@
             <a:fld id="{C6C52C72-DE31-F449-A4ED-4C594FD91407}" type="datetimeFigureOut">
               <a:rPr lang="en-US" dirty="0"/>
               <a:pPr/>
-              <a:t>2/7/2017</a:t>
+              <a:t>2/10/2017</a:t>
             </a:fld>
             <a:endParaRPr lang="en-US" dirty="0"/>
           </a:p>
@@ -1987,7 +1992,7 @@
           <a:ln/>
           <a:extLst>
             <a:ext uri="{91240B29-F687-4f45-9708-019B960494DF}">
-              <a14:hiddenLine xmlns:a14="http://schemas.microsoft.com/office/drawing/2010/main" xmlns="" w="9525">
+              <a14:hiddenLine xmlns="" xmlns:a14="http://schemas.microsoft.com/office/drawing/2010/main" w="9525">
                 <a:solidFill>
                   <a:srgbClr val="000000"/>
                 </a:solidFill>
@@ -2116,7 +2121,7 @@
             <a:fld id="{ED62726E-379B-B349-9EED-81ED093FA806}" type="datetimeFigureOut">
               <a:rPr lang="en-US" dirty="0"/>
               <a:pPr/>
-              <a:t>2/7/2017</a:t>
+              <a:t>2/10/2017</a:t>
             </a:fld>
             <a:endParaRPr lang="en-US" dirty="0"/>
           </a:p>
@@ -2267,7 +2272,7 @@
           <a:ln/>
           <a:extLst>
             <a:ext uri="{91240B29-F687-4f45-9708-019B960494DF}">
-              <a14:hiddenLine xmlns:a14="http://schemas.microsoft.com/office/drawing/2010/main" xmlns="" w="9525">
+              <a14:hiddenLine xmlns="" xmlns:a14="http://schemas.microsoft.com/office/drawing/2010/main" w="9525">
                 <a:solidFill>
                   <a:srgbClr val="000000"/>
                 </a:solidFill>
@@ -2396,7 +2401,7 @@
             <a:fld id="{9B3A1323-8D79-1946-B0D7-40001CF92E9D}" type="datetimeFigureOut">
               <a:rPr lang="en-US" dirty="0"/>
               <a:pPr/>
-              <a:t>2/7/2017</a:t>
+              <a:t>2/10/2017</a:t>
             </a:fld>
             <a:endParaRPr lang="en-US" dirty="0"/>
           </a:p>
@@ -2736,7 +2741,7 @@
             <a:fld id="{8DFA1846-DA80-1C48-A609-854EA85C59AD}" type="datetimeFigureOut">
               <a:rPr lang="en-US" dirty="0"/>
               <a:pPr/>
-              <a:t>2/7/2017</a:t>
+              <a:t>2/10/2017</a:t>
             </a:fld>
             <a:endParaRPr lang="en-US" dirty="0"/>
           </a:p>
@@ -2887,7 +2892,7 @@
           <a:ln/>
           <a:extLst>
             <a:ext uri="{91240B29-F687-4f45-9708-019B960494DF}">
-              <a14:hiddenLine xmlns:a14="http://schemas.microsoft.com/office/drawing/2010/main" xmlns="" w="9525">
+              <a14:hiddenLine xmlns="" xmlns:a14="http://schemas.microsoft.com/office/drawing/2010/main" w="9525">
                 <a:solidFill>
                   <a:srgbClr val="000000"/>
                 </a:solidFill>
@@ -3072,7 +3077,7 @@
             <a:fld id="{57302355-E14B-8545-A8F8-0FE83CC9D524}" type="datetimeFigureOut">
               <a:rPr lang="en-US" dirty="0"/>
               <a:pPr/>
-              <a:t>2/7/2017</a:t>
+              <a:t>2/10/2017</a:t>
             </a:fld>
             <a:endParaRPr lang="en-US" dirty="0"/>
           </a:p>
@@ -3223,7 +3228,7 @@
           <a:ln/>
           <a:extLst>
             <a:ext uri="{91240B29-F687-4f45-9708-019B960494DF}">
-              <a14:hiddenLine xmlns:a14="http://schemas.microsoft.com/office/drawing/2010/main" xmlns="" w="9525">
+              <a14:hiddenLine xmlns="" xmlns:a14="http://schemas.microsoft.com/office/drawing/2010/main" w="9525">
                 <a:solidFill>
                   <a:srgbClr val="000000"/>
                 </a:solidFill>
@@ -3546,7 +3551,7 @@
             <a:fld id="{02640F58-564D-2B4F-AE67-E407BA4FCF45}" type="datetimeFigureOut">
               <a:rPr lang="en-US" dirty="0"/>
               <a:pPr/>
-              <a:t>2/7/2017</a:t>
+              <a:t>2/10/2017</a:t>
             </a:fld>
             <a:endParaRPr lang="en-US" dirty="0"/>
           </a:p>
@@ -3697,7 +3702,7 @@
           <a:ln/>
           <a:extLst>
             <a:ext uri="{91240B29-F687-4f45-9708-019B960494DF}">
-              <a14:hiddenLine xmlns:a14="http://schemas.microsoft.com/office/drawing/2010/main" xmlns="" w="9525">
+              <a14:hiddenLine xmlns="" xmlns:a14="http://schemas.microsoft.com/office/drawing/2010/main" w="9525">
                 <a:solidFill>
                   <a:srgbClr val="000000"/>
                 </a:solidFill>
@@ -3764,7 +3769,7 @@
             <a:fld id="{F13A34C8-038E-2045-AF43-DF7DBB8E0E9E}" type="datetimeFigureOut">
               <a:rPr lang="en-US" dirty="0"/>
               <a:pPr/>
-              <a:t>2/7/2017</a:t>
+              <a:t>2/10/2017</a:t>
             </a:fld>
             <a:endParaRPr lang="en-US" dirty="0"/>
           </a:p>
@@ -3856,7 +3861,7 @@
             <a:fld id="{8818C68F-D26B-8F47-958C-23B49CF8A634}" type="datetimeFigureOut">
               <a:rPr lang="en-US" dirty="0"/>
               <a:pPr/>
-              <a:t>2/7/2017</a:t>
+              <a:t>2/10/2017</a:t>
             </a:fld>
             <a:endParaRPr lang="en-US" dirty="0"/>
           </a:p>
@@ -4120,7 +4125,7 @@
           <a:ln/>
           <a:extLst>
             <a:ext uri="{91240B29-F687-4f45-9708-019B960494DF}">
-              <a14:hiddenLine xmlns:a14="http://schemas.microsoft.com/office/drawing/2010/main" xmlns="" w="9525">
+              <a14:hiddenLine xmlns="" xmlns:a14="http://schemas.microsoft.com/office/drawing/2010/main" w="9525">
                 <a:solidFill>
                   <a:srgbClr val="000000"/>
                 </a:solidFill>
@@ -4320,7 +4325,7 @@
             <a:fld id="{D0DF5E60-9974-AC48-9591-99C2BB44B7CF}" type="datetimeFigureOut">
               <a:rPr lang="en-US" dirty="0"/>
               <a:pPr/>
-              <a:t>2/7/2017</a:t>
+              <a:t>2/10/2017</a:t>
             </a:fld>
             <a:endParaRPr lang="en-US" dirty="0"/>
           </a:p>
@@ -4630,7 +4635,7 @@
             <a:fld id="{18C79C5D-2A6F-F04D-97DA-BEF2467B64E4}" type="datetimeFigureOut">
               <a:rPr lang="en-US" dirty="0"/>
               <a:pPr/>
-              <a:t>2/7/2017</a:t>
+              <a:t>2/10/2017</a:t>
             </a:fld>
             <a:endParaRPr lang="en-US" dirty="0"/>
           </a:p>
@@ -4897,7 +4902,7 @@
             <a:fld id="{09B482E8-6E0E-1B4F-B1FD-C69DB9E858D9}" type="datetimeFigureOut">
               <a:rPr lang="en-US" dirty="0"/>
               <a:pPr/>
-              <a:t>2/7/2017</a:t>
+              <a:t>2/10/2017</a:t>
             </a:fld>
             <a:endParaRPr lang="en-US" dirty="0"/>
           </a:p>
@@ -5423,6 +5428,13 @@
   <p:clrMapOvr>
     <a:masterClrMapping/>
   </p:clrMapOvr>
+  <p:timing>
+    <p:tnLst>
+      <p:par>
+        <p:cTn id="1" dur="indefinite" restart="never" nodeType="tmRoot"/>
+      </p:par>
+    </p:tnLst>
+  </p:timing>
 </p:sld>
 </file>
 
@@ -5520,6 +5532,13 @@
   <p:clrMapOvr>
     <a:masterClrMapping/>
   </p:clrMapOvr>
+  <p:timing>
+    <p:tnLst>
+      <p:par>
+        <p:cTn id="1" dur="indefinite" restart="never" nodeType="tmRoot"/>
+      </p:par>
+    </p:tnLst>
+  </p:timing>
 </p:sld>
 </file>
 
@@ -5746,6 +5765,13 @@
   <p:clrMapOvr>
     <a:masterClrMapping/>
   </p:clrMapOvr>
+  <p:timing>
+    <p:tnLst>
+      <p:par>
+        <p:cTn id="1" dur="indefinite" restart="never" nodeType="tmRoot"/>
+      </p:par>
+    </p:tnLst>
+  </p:timing>
 </p:sld>
 </file>
 
@@ -5775,7 +5801,7 @@
         <p:spPr>
           <a:xfrm>
             <a:off x="548640" y="311971"/>
-            <a:ext cx="10553252" cy="3046988"/>
+            <a:ext cx="10553252" cy="5693866"/>
           </a:xfrm>
           <a:prstGeom prst="rect">
             <a:avLst/>
@@ -5793,7 +5819,7 @@
               <a:buChar char="•"/>
             </a:pPr>
             <a:r>
-              <a:rPr lang="en-US" sz="3200" dirty="0" smtClean="0">
+              <a:rPr lang="en-US" sz="2800" dirty="0" smtClean="0">
                 <a:solidFill>
                   <a:schemeClr val="bg1"/>
                 </a:solidFill>
@@ -5807,7 +5833,7 @@
               <a:buChar char="•"/>
             </a:pPr>
             <a:r>
-              <a:rPr lang="en-US" sz="3200" dirty="0" smtClean="0">
+              <a:rPr lang="en-US" sz="2800" dirty="0" smtClean="0">
                 <a:solidFill>
                   <a:schemeClr val="bg1"/>
                 </a:solidFill>
@@ -5821,18 +5847,105 @@
               <a:buChar char="•"/>
             </a:pPr>
             <a:r>
-              <a:rPr lang="en-US" sz="3200" smtClean="0">
+              <a:rPr lang="en-US" sz="2800" dirty="0" err="1" smtClean="0">
                 <a:solidFill>
                   <a:schemeClr val="bg1"/>
                 </a:solidFill>
               </a:rPr>
-              <a:t>Left off at p 26 p2</a:t>
-            </a:r>
-            <a:endParaRPr lang="en-US" sz="3200" dirty="0" smtClean="0">
-              <a:solidFill>
-                <a:schemeClr val="bg1"/>
-              </a:solidFill>
-            </a:endParaRPr>
+              <a:t>Corniere</a:t>
+            </a:r>
+            <a:r>
+              <a:rPr lang="en-US" sz="2800" dirty="0" smtClean="0">
+                <a:solidFill>
+                  <a:schemeClr val="bg1"/>
+                </a:solidFill>
+              </a:rPr>
+              <a:t>, storefront of the arcade </a:t>
+            </a:r>
+            <a:r>
+              <a:rPr lang="en-US" sz="2800" dirty="0" smtClean="0">
+                <a:solidFill>
+                  <a:schemeClr val="bg1"/>
+                </a:solidFill>
+              </a:rPr>
+              <a:t>at the side of the town where merchants sold their goods and lived</a:t>
+            </a:r>
+          </a:p>
+          <a:p>
+            <a:pPr marL="285750" indent="-285750">
+              <a:buFont typeface="Arial" panose="020B0604020202020204" pitchFamily="34" charset="0"/>
+              <a:buChar char="•"/>
+            </a:pPr>
+            <a:r>
+              <a:rPr lang="en-US" sz="2800" dirty="0" err="1" smtClean="0">
+                <a:solidFill>
+                  <a:schemeClr val="bg1"/>
+                </a:solidFill>
+              </a:rPr>
+              <a:t>Sucessful</a:t>
+            </a:r>
+            <a:r>
+              <a:rPr lang="en-US" sz="2800" dirty="0" smtClean="0">
+                <a:solidFill>
+                  <a:schemeClr val="bg1"/>
+                </a:solidFill>
+              </a:rPr>
+              <a:t> merchants lived at the square also </a:t>
+            </a:r>
+            <a:endParaRPr lang="en-US" sz="2800" dirty="0" smtClean="0"/>
+          </a:p>
+          <a:p>
+            <a:pPr marL="285750" indent="-285750">
+              <a:buFont typeface="Arial" panose="020B0604020202020204" pitchFamily="34" charset="0"/>
+              <a:buChar char="•"/>
+            </a:pPr>
+            <a:r>
+              <a:rPr lang="en-US" sz="2800" dirty="0" smtClean="0">
+                <a:solidFill>
+                  <a:schemeClr val="bg2"/>
+                </a:solidFill>
+              </a:rPr>
+              <a:t>Gold and silver were not offered, instead the consumers banter among merchants</a:t>
+            </a:r>
+          </a:p>
+          <a:p>
+            <a:pPr marL="285750" indent="-285750">
+              <a:buFont typeface="Arial" panose="020B0604020202020204" pitchFamily="34" charset="0"/>
+              <a:buChar char="•"/>
+            </a:pPr>
+            <a:r>
+              <a:rPr lang="en-US" sz="2800" dirty="0" smtClean="0">
+                <a:solidFill>
+                  <a:schemeClr val="bg2"/>
+                </a:solidFill>
+              </a:rPr>
+              <a:t>To deal with trade between towns lesser town lesser </a:t>
+            </a:r>
+            <a:r>
+              <a:rPr lang="en-US" sz="2800" dirty="0" smtClean="0"/>
+              <a:t>merchants held their goods</a:t>
+            </a:r>
+          </a:p>
+          <a:p>
+            <a:pPr marL="285750" indent="-285750">
+              <a:buFont typeface="Arial" panose="020B0604020202020204" pitchFamily="34" charset="0"/>
+              <a:buChar char="•"/>
+            </a:pPr>
+            <a:r>
+              <a:rPr lang="en-US" sz="2800" dirty="0" smtClean="0"/>
+              <a:t>All the towns were most likely market squares</a:t>
+            </a:r>
+          </a:p>
+          <a:p>
+            <a:pPr marL="285750" indent="-285750">
+              <a:buFont typeface="Arial" panose="020B0604020202020204" pitchFamily="34" charset="0"/>
+              <a:buChar char="•"/>
+            </a:pPr>
+            <a:r>
+              <a:rPr lang="en-US" sz="2800" dirty="0" smtClean="0"/>
+              <a:t>(Find meaning last paragraph)</a:t>
+            </a:r>
+            <a:endParaRPr lang="en-US" sz="2800" dirty="0" smtClean="0"/>
           </a:p>
         </p:txBody>
       </p:sp>
@@ -5846,6 +5959,13 @@
   <p:clrMapOvr>
     <a:masterClrMapping/>
   </p:clrMapOvr>
+  <p:timing>
+    <p:tnLst>
+      <p:par>
+        <p:cTn id="1" dur="indefinite" restart="never" nodeType="tmRoot"/>
+      </p:par>
+    </p:tnLst>
+  </p:timing>
 </p:sld>
 </file>
 

</xml_diff>

<commit_message>
Undone work for 2/10/17(2)
</commit_message>
<xml_diff>
--- a/Spring 2017 Semester/Urban Development/Urban Development Weekly Readings/Week 2/Week 2 Readings.pptx
+++ b/Spring 2017 Semester/Urban Development/Urban Development Weekly Readings/Week 2/Week 2 Readings.pptx
@@ -9,6 +9,9 @@
     <p:sldId id="257" r:id="rId3"/>
     <p:sldId id="258" r:id="rId4"/>
     <p:sldId id="259" r:id="rId5"/>
+    <p:sldId id="261" r:id="rId6"/>
+    <p:sldId id="262" r:id="rId7"/>
+    <p:sldId id="263" r:id="rId8"/>
   </p:sldIdLst>
   <p:sldSz cx="12192000" cy="6858000"/>
   <p:notesSz cx="6858000" cy="9144000"/>
@@ -210,7 +213,7 @@
           <a:effectLst/>
           <a:extLst>
             <a:ext uri="{91240B29-F687-4f45-9708-019B960494DF}">
-              <a14:hiddenLine xmlns="" xmlns:a14="http://schemas.microsoft.com/office/drawing/2010/main" w="9525">
+              <a14:hiddenLine xmlns:a14="http://schemas.microsoft.com/office/drawing/2010/main" xmlns="" w="9525">
                 <a:solidFill>
                   <a:srgbClr val="000000"/>
                 </a:solidFill>
@@ -1720,7 +1723,7 @@
           <a:ln/>
           <a:extLst>
             <a:ext uri="{91240B29-F687-4f45-9708-019B960494DF}">
-              <a14:hiddenLine xmlns="" xmlns:a14="http://schemas.microsoft.com/office/drawing/2010/main" w="9525">
+              <a14:hiddenLine xmlns:a14="http://schemas.microsoft.com/office/drawing/2010/main" xmlns="" w="9525">
                 <a:solidFill>
                   <a:srgbClr val="000000"/>
                 </a:solidFill>
@@ -1992,7 +1995,7 @@
           <a:ln/>
           <a:extLst>
             <a:ext uri="{91240B29-F687-4f45-9708-019B960494DF}">
-              <a14:hiddenLine xmlns="" xmlns:a14="http://schemas.microsoft.com/office/drawing/2010/main" w="9525">
+              <a14:hiddenLine xmlns:a14="http://schemas.microsoft.com/office/drawing/2010/main" xmlns="" w="9525">
                 <a:solidFill>
                   <a:srgbClr val="000000"/>
                 </a:solidFill>
@@ -2272,7 +2275,7 @@
           <a:ln/>
           <a:extLst>
             <a:ext uri="{91240B29-F687-4f45-9708-019B960494DF}">
-              <a14:hiddenLine xmlns="" xmlns:a14="http://schemas.microsoft.com/office/drawing/2010/main" w="9525">
+              <a14:hiddenLine xmlns:a14="http://schemas.microsoft.com/office/drawing/2010/main" xmlns="" w="9525">
                 <a:solidFill>
                   <a:srgbClr val="000000"/>
                 </a:solidFill>
@@ -2892,7 +2895,7 @@
           <a:ln/>
           <a:extLst>
             <a:ext uri="{91240B29-F687-4f45-9708-019B960494DF}">
-              <a14:hiddenLine xmlns="" xmlns:a14="http://schemas.microsoft.com/office/drawing/2010/main" w="9525">
+              <a14:hiddenLine xmlns:a14="http://schemas.microsoft.com/office/drawing/2010/main" xmlns="" w="9525">
                 <a:solidFill>
                   <a:srgbClr val="000000"/>
                 </a:solidFill>
@@ -3228,7 +3231,7 @@
           <a:ln/>
           <a:extLst>
             <a:ext uri="{91240B29-F687-4f45-9708-019B960494DF}">
-              <a14:hiddenLine xmlns="" xmlns:a14="http://schemas.microsoft.com/office/drawing/2010/main" w="9525">
+              <a14:hiddenLine xmlns:a14="http://schemas.microsoft.com/office/drawing/2010/main" xmlns="" w="9525">
                 <a:solidFill>
                   <a:srgbClr val="000000"/>
                 </a:solidFill>
@@ -3702,7 +3705,7 @@
           <a:ln/>
           <a:extLst>
             <a:ext uri="{91240B29-F687-4f45-9708-019B960494DF}">
-              <a14:hiddenLine xmlns="" xmlns:a14="http://schemas.microsoft.com/office/drawing/2010/main" w="9525">
+              <a14:hiddenLine xmlns:a14="http://schemas.microsoft.com/office/drawing/2010/main" xmlns="" w="9525">
                 <a:solidFill>
                   <a:srgbClr val="000000"/>
                 </a:solidFill>
@@ -4125,7 +4128,7 @@
           <a:ln/>
           <a:extLst>
             <a:ext uri="{91240B29-F687-4f45-9708-019B960494DF}">
-              <a14:hiddenLine xmlns="" xmlns:a14="http://schemas.microsoft.com/office/drawing/2010/main" w="9525">
+              <a14:hiddenLine xmlns:a14="http://schemas.microsoft.com/office/drawing/2010/main" xmlns="" w="9525">
                 <a:solidFill>
                   <a:srgbClr val="000000"/>
                 </a:solidFill>
@@ -5860,15 +5863,7 @@
                   <a:schemeClr val="bg1"/>
                 </a:solidFill>
               </a:rPr>
-              <a:t>, storefront of the arcade </a:t>
-            </a:r>
-            <a:r>
-              <a:rPr lang="en-US" sz="2800" dirty="0" smtClean="0">
-                <a:solidFill>
-                  <a:schemeClr val="bg1"/>
-                </a:solidFill>
-              </a:rPr>
-              <a:t>at the side of the town where merchants sold their goods and lived</a:t>
+              <a:t>, storefront of the arcade at the side of the town where merchants sold their goods and lived</a:t>
             </a:r>
           </a:p>
           <a:p>
@@ -5945,7 +5940,6 @@
               <a:rPr lang="en-US" sz="2800" dirty="0" smtClean="0"/>
               <a:t>(Find meaning last paragraph)</a:t>
             </a:r>
-            <a:endParaRPr lang="en-US" sz="2800" dirty="0" smtClean="0"/>
           </a:p>
         </p:txBody>
       </p:sp>
@@ -5953,6 +5947,567 @@
     <p:extLst>
       <p:ext uri="{BB962C8B-B14F-4D97-AF65-F5344CB8AC3E}">
         <p14:creationId xmlns:p14="http://schemas.microsoft.com/office/powerpoint/2010/main" val="610438849"/>
+      </p:ext>
+    </p:extLst>
+  </p:cSld>
+  <p:clrMapOvr>
+    <a:masterClrMapping/>
+  </p:clrMapOvr>
+  <p:timing>
+    <p:tnLst>
+      <p:par>
+        <p:cTn id="1" dur="indefinite" restart="never" nodeType="tmRoot"/>
+      </p:par>
+    </p:tnLst>
+  </p:timing>
+</p:sld>
+</file>
+
+<file path=ppt/slides/slide5.xml><?xml version="1.0" encoding="utf-8"?>
+<p:sld xmlns:a="http://schemas.openxmlformats.org/drawingml/2006/main" xmlns:r="http://schemas.openxmlformats.org/officeDocument/2006/relationships" xmlns:p="http://schemas.openxmlformats.org/presentationml/2006/main">
+  <p:cSld>
+    <p:spTree>
+      <p:nvGrpSpPr>
+        <p:cNvPr id="1" name=""/>
+        <p:cNvGrpSpPr/>
+        <p:nvPr/>
+      </p:nvGrpSpPr>
+      <p:grpSpPr>
+        <a:xfrm>
+          <a:off x="0" y="0"/>
+          <a:ext cx="0" cy="0"/>
+          <a:chOff x="0" y="0"/>
+          <a:chExt cx="0" cy="0"/>
+        </a:xfrm>
+      </p:grpSpPr>
+      <p:sp>
+        <p:nvSpPr>
+          <p:cNvPr id="5" name="TextBox 4"/>
+          <p:cNvSpPr txBox="1"/>
+          <p:nvPr/>
+        </p:nvSpPr>
+        <p:spPr>
+          <a:xfrm>
+            <a:off x="512064" y="324163"/>
+            <a:ext cx="10553252" cy="5909310"/>
+          </a:xfrm>
+          <a:prstGeom prst="rect">
+            <a:avLst/>
+          </a:prstGeom>
+          <a:noFill/>
+        </p:spPr>
+        <p:txBody>
+          <a:bodyPr wrap="square" rtlCol="0">
+            <a:spAutoFit/>
+          </a:bodyPr>
+          <a:lstStyle/>
+          <a:p>
+            <a:pPr marL="285750" indent="-285750">
+              <a:buFont typeface="Arial" panose="020B0604020202020204" pitchFamily="34" charset="0"/>
+              <a:buChar char="•"/>
+            </a:pPr>
+            <a:r>
+              <a:rPr lang="en-US" sz="2100" dirty="0" smtClean="0">
+                <a:solidFill>
+                  <a:schemeClr val="bg1"/>
+                </a:solidFill>
+              </a:rPr>
+              <a:t>The plaza corners were made to correspond with the cardinal directions but the streets would come at the middle to avoid commotion</a:t>
+            </a:r>
+          </a:p>
+          <a:p>
+            <a:pPr marL="285750" indent="-285750">
+              <a:buFont typeface="Arial" panose="020B0604020202020204" pitchFamily="34" charset="0"/>
+              <a:buChar char="•"/>
+            </a:pPr>
+            <a:r>
+              <a:rPr lang="en-US" sz="2100" dirty="0" smtClean="0">
+                <a:solidFill>
+                  <a:schemeClr val="bg1"/>
+                </a:solidFill>
+              </a:rPr>
+              <a:t>Ordinances, basically set up are how to take care of town</a:t>
+            </a:r>
+          </a:p>
+          <a:p>
+            <a:pPr marL="285750" indent="-285750">
+              <a:buFont typeface="Arial" panose="020B0604020202020204" pitchFamily="34" charset="0"/>
+              <a:buChar char="•"/>
+            </a:pPr>
+            <a:r>
+              <a:rPr lang="en-US" sz="2100" dirty="0" smtClean="0">
+                <a:solidFill>
+                  <a:schemeClr val="bg1"/>
+                </a:solidFill>
+              </a:rPr>
+              <a:t>Spanish colonization was big and they had time to setup a colony</a:t>
+            </a:r>
+          </a:p>
+          <a:p>
+            <a:pPr marL="285750" indent="-285750">
+              <a:buFont typeface="Arial" panose="020B0604020202020204" pitchFamily="34" charset="0"/>
+              <a:buChar char="•"/>
+            </a:pPr>
+            <a:r>
+              <a:rPr lang="en-US" sz="2100" dirty="0" smtClean="0">
+                <a:solidFill>
+                  <a:schemeClr val="bg1"/>
+                </a:solidFill>
+              </a:rPr>
+              <a:t>Instead of </a:t>
+            </a:r>
+            <a:r>
+              <a:rPr lang="en-US" sz="2100" dirty="0" err="1" smtClean="0">
+                <a:solidFill>
+                  <a:schemeClr val="bg1"/>
+                </a:solidFill>
+              </a:rPr>
+              <a:t>ind</a:t>
+            </a:r>
+            <a:r>
+              <a:rPr lang="en-US" sz="2100" dirty="0" err="1" smtClean="0">
+                <a:solidFill>
+                  <a:schemeClr val="bg1"/>
+                </a:solidFill>
+              </a:rPr>
+              <a:t>.</a:t>
+            </a:r>
+            <a:r>
+              <a:rPr lang="en-US" sz="2100" dirty="0" smtClean="0">
+                <a:solidFill>
+                  <a:schemeClr val="bg1"/>
+                </a:solidFill>
+              </a:rPr>
+              <a:t> Cities all cities linked to government of Spain, no trade </a:t>
+            </a:r>
+            <a:r>
+              <a:rPr lang="en-US" sz="2100" dirty="0" err="1" smtClean="0">
+                <a:solidFill>
+                  <a:schemeClr val="bg1"/>
+                </a:solidFill>
+              </a:rPr>
+              <a:t>encourgaged</a:t>
+            </a:r>
+            <a:r>
+              <a:rPr lang="en-US" sz="2100" dirty="0" smtClean="0">
+                <a:solidFill>
+                  <a:schemeClr val="bg1"/>
+                </a:solidFill>
+              </a:rPr>
+              <a:t>. Most came from 1506 to 1750</a:t>
+            </a:r>
+          </a:p>
+          <a:p>
+            <a:pPr marL="285750" indent="-285750">
+              <a:buFont typeface="Arial" panose="020B0604020202020204" pitchFamily="34" charset="0"/>
+              <a:buChar char="•"/>
+            </a:pPr>
+            <a:r>
+              <a:rPr lang="en-US" sz="2100" dirty="0" err="1" smtClean="0">
+                <a:solidFill>
+                  <a:schemeClr val="bg1"/>
+                </a:solidFill>
+              </a:rPr>
+              <a:t>Spaish</a:t>
+            </a:r>
+            <a:r>
+              <a:rPr lang="en-US" sz="2100" dirty="0" smtClean="0">
+                <a:solidFill>
+                  <a:schemeClr val="bg1"/>
+                </a:solidFill>
+              </a:rPr>
+              <a:t> towns followed grid structure w/ Roman </a:t>
+            </a:r>
+            <a:r>
+              <a:rPr lang="en-US" sz="2100" dirty="0" smtClean="0">
+                <a:solidFill>
+                  <a:schemeClr val="bg2"/>
+                </a:solidFill>
+              </a:rPr>
+              <a:t>implementation of reserved spots</a:t>
+            </a:r>
+          </a:p>
+          <a:p>
+            <a:pPr marL="285750" indent="-285750">
+              <a:buFont typeface="Arial" panose="020B0604020202020204" pitchFamily="34" charset="0"/>
+              <a:buChar char="•"/>
+            </a:pPr>
+            <a:r>
+              <a:rPr lang="en-US" sz="2100" dirty="0" smtClean="0">
+                <a:solidFill>
+                  <a:schemeClr val="bg2"/>
+                </a:solidFill>
+              </a:rPr>
+              <a:t>Spain towns were narrow, so criminals cant ge</a:t>
+            </a:r>
+            <a:r>
+              <a:rPr lang="en-US" sz="2100" dirty="0" smtClean="0">
+                <a:solidFill>
+                  <a:schemeClr val="bg2"/>
+                </a:solidFill>
+              </a:rPr>
+              <a:t>t out, also helped w/ air ventilation, they also made missions to convert the Indians</a:t>
+            </a:r>
+          </a:p>
+          <a:p>
+            <a:pPr marL="285750" indent="-285750">
+              <a:buFont typeface="Arial" panose="020B0604020202020204" pitchFamily="34" charset="0"/>
+              <a:buChar char="•"/>
+            </a:pPr>
+            <a:r>
+              <a:rPr lang="en-US" sz="2100" dirty="0" smtClean="0">
+                <a:solidFill>
+                  <a:schemeClr val="bg2"/>
+                </a:solidFill>
+              </a:rPr>
+              <a:t>Military cities, pueblos made, made them because they want to </a:t>
+            </a:r>
+            <a:r>
+              <a:rPr lang="en-US" sz="2100" dirty="0" smtClean="0"/>
+              <a:t>settle good </a:t>
+            </a:r>
+            <a:r>
+              <a:rPr lang="en-US" sz="2100" dirty="0" smtClean="0">
+                <a:solidFill>
+                  <a:schemeClr val="bg2"/>
+                </a:solidFill>
+              </a:rPr>
+              <a:t>places for </a:t>
+            </a:r>
+            <a:r>
+              <a:rPr lang="en-US" sz="2100" dirty="0" err="1" smtClean="0">
+                <a:solidFill>
+                  <a:schemeClr val="bg2"/>
+                </a:solidFill>
+              </a:rPr>
+              <a:t>agrilculture</a:t>
+            </a:r>
+            <a:endParaRPr lang="en-US" sz="2100" dirty="0" smtClean="0">
+              <a:solidFill>
+                <a:schemeClr val="bg2"/>
+              </a:solidFill>
+            </a:endParaRPr>
+          </a:p>
+          <a:p>
+            <a:pPr marL="285750" indent="-285750">
+              <a:buFont typeface="Arial" panose="020B0604020202020204" pitchFamily="34" charset="0"/>
+              <a:buChar char="•"/>
+            </a:pPr>
+            <a:r>
+              <a:rPr lang="en-US" sz="2100" dirty="0" smtClean="0">
+                <a:solidFill>
+                  <a:schemeClr val="bg2"/>
+                </a:solidFill>
+              </a:rPr>
+              <a:t>Distinctions disappeared because </a:t>
+            </a:r>
+            <a:r>
+              <a:rPr lang="en-US" sz="2100" dirty="0" err="1" smtClean="0">
+                <a:solidFill>
+                  <a:schemeClr val="bg2"/>
+                </a:solidFill>
+              </a:rPr>
+              <a:t>ppl</a:t>
+            </a:r>
+            <a:r>
+              <a:rPr lang="en-US" sz="2100" dirty="0" smtClean="0">
+                <a:solidFill>
+                  <a:schemeClr val="bg2"/>
+                </a:solidFill>
+              </a:rPr>
+              <a:t> like to act Anglo-Saxon, but not in Latin America</a:t>
+            </a:r>
+          </a:p>
+          <a:p>
+            <a:pPr marL="285750" indent="-285750">
+              <a:buFont typeface="Arial" panose="020B0604020202020204" pitchFamily="34" charset="0"/>
+              <a:buChar char="•"/>
+            </a:pPr>
+            <a:r>
+              <a:rPr lang="en-US" sz="2100" dirty="0" smtClean="0"/>
+              <a:t>“European cities” Washington </a:t>
+            </a:r>
+            <a:r>
+              <a:rPr lang="en-US" sz="2100" dirty="0" err="1" smtClean="0"/>
+              <a:t>D.c</a:t>
+            </a:r>
+            <a:endParaRPr lang="en-US" sz="2100" dirty="0" smtClean="0"/>
+          </a:p>
+          <a:p>
+            <a:pPr marL="285750" indent="-285750">
+              <a:buFont typeface="Arial" panose="020B0604020202020204" pitchFamily="34" charset="0"/>
+              <a:buChar char="•"/>
+            </a:pPr>
+            <a:r>
+              <a:rPr lang="en-US" sz="2100" dirty="0" err="1" smtClean="0"/>
+              <a:t>Terit</a:t>
+            </a:r>
+            <a:r>
+              <a:rPr lang="en-US" sz="2100" dirty="0" smtClean="0"/>
+              <a:t> .Gov. </a:t>
+            </a:r>
+            <a:r>
+              <a:rPr lang="en-US" sz="2100" dirty="0" smtClean="0"/>
+              <a:t>Col. Francis Nicholson made Annapolis (elitist style, large lots, a square, circles</a:t>
+            </a:r>
+            <a:r>
+              <a:rPr lang="en-US" sz="2100" dirty="0" smtClean="0"/>
+              <a:t> w/ circled streets (admin place) College of Will and Mary is there, Duke of </a:t>
+            </a:r>
+            <a:r>
+              <a:rPr lang="en-US" sz="2100" dirty="0" err="1" smtClean="0"/>
+              <a:t>Glocester</a:t>
+            </a:r>
+            <a:r>
+              <a:rPr lang="en-US" sz="2100" dirty="0" smtClean="0"/>
+              <a:t> had a palace there positioned right.</a:t>
+            </a:r>
+            <a:endParaRPr lang="en-US" sz="2100" dirty="0" smtClean="0"/>
+          </a:p>
+        </p:txBody>
+      </p:sp>
+    </p:spTree>
+    <p:extLst>
+      <p:ext uri="{BB962C8B-B14F-4D97-AF65-F5344CB8AC3E}">
+        <p14:creationId xmlns:p14="http://schemas.microsoft.com/office/powerpoint/2010/main" val="1424635276"/>
+      </p:ext>
+    </p:extLst>
+  </p:cSld>
+  <p:clrMapOvr>
+    <a:masterClrMapping/>
+  </p:clrMapOvr>
+  <p:timing>
+    <p:tnLst>
+      <p:par>
+        <p:cTn id="1" dur="indefinite" restart="never" nodeType="tmRoot"/>
+      </p:par>
+    </p:tnLst>
+  </p:timing>
+</p:sld>
+</file>
+
+<file path=ppt/slides/slide6.xml><?xml version="1.0" encoding="utf-8"?>
+<p:sld xmlns:a="http://schemas.openxmlformats.org/drawingml/2006/main" xmlns:r="http://schemas.openxmlformats.org/officeDocument/2006/relationships" xmlns:p="http://schemas.openxmlformats.org/presentationml/2006/main">
+  <p:cSld>
+    <p:spTree>
+      <p:nvGrpSpPr>
+        <p:cNvPr id="1" name=""/>
+        <p:cNvGrpSpPr/>
+        <p:nvPr/>
+      </p:nvGrpSpPr>
+      <p:grpSpPr>
+        <a:xfrm>
+          <a:off x="0" y="0"/>
+          <a:ext cx="0" cy="0"/>
+          <a:chOff x="0" y="0"/>
+          <a:chExt cx="0" cy="0"/>
+        </a:xfrm>
+      </p:grpSpPr>
+      <p:sp>
+        <p:nvSpPr>
+          <p:cNvPr id="5" name="TextBox 4"/>
+          <p:cNvSpPr txBox="1"/>
+          <p:nvPr/>
+        </p:nvSpPr>
+        <p:spPr>
+          <a:xfrm>
+            <a:off x="548640" y="311971"/>
+            <a:ext cx="10553252" cy="2677656"/>
+          </a:xfrm>
+          <a:prstGeom prst="rect">
+            <a:avLst/>
+          </a:prstGeom>
+          <a:noFill/>
+        </p:spPr>
+        <p:txBody>
+          <a:bodyPr wrap="square" rtlCol="0">
+            <a:spAutoFit/>
+          </a:bodyPr>
+          <a:lstStyle/>
+          <a:p>
+            <a:pPr marL="285750" indent="-285750">
+              <a:buFont typeface="Arial" panose="020B0604020202020204" pitchFamily="34" charset="0"/>
+              <a:buChar char="•"/>
+            </a:pPr>
+            <a:r>
+              <a:rPr lang="en-US" sz="2800" dirty="0" smtClean="0">
+                <a:solidFill>
+                  <a:schemeClr val="bg1"/>
+                </a:solidFill>
+              </a:rPr>
+              <a:t>He also made Charleston, an aristo-center, plantation owners lived there so they made it full of mansions,</a:t>
+            </a:r>
+          </a:p>
+          <a:p>
+            <a:pPr marL="285750" indent="-285750">
+              <a:buFont typeface="Arial" panose="020B0604020202020204" pitchFamily="34" charset="0"/>
+              <a:buChar char="•"/>
+            </a:pPr>
+            <a:r>
+              <a:rPr lang="en-US" sz="2800" dirty="0" smtClean="0">
+                <a:solidFill>
+                  <a:schemeClr val="bg1"/>
+                </a:solidFill>
+              </a:rPr>
+              <a:t>Gen. James Oglethorpe made Savannah, several formal open public </a:t>
+            </a:r>
+            <a:r>
+              <a:rPr lang="en-US" sz="2800" dirty="0" err="1" smtClean="0">
+                <a:solidFill>
+                  <a:schemeClr val="bg1"/>
+                </a:solidFill>
+              </a:rPr>
+              <a:t>sqares</a:t>
+            </a:r>
+            <a:r>
+              <a:rPr lang="en-US" sz="2800" dirty="0" smtClean="0">
+                <a:solidFill>
+                  <a:schemeClr val="bg1"/>
+                </a:solidFill>
+              </a:rPr>
+              <a:t>, lots and larger lots for churches and buildings</a:t>
+            </a:r>
+            <a:endParaRPr lang="en-US" sz="2800" dirty="0"/>
+          </a:p>
+          <a:p>
+            <a:pPr marL="285750" indent="-285750">
+              <a:buFont typeface="Arial" panose="020B0604020202020204" pitchFamily="34" charset="0"/>
+              <a:buChar char="•"/>
+            </a:pPr>
+            <a:r>
+              <a:rPr lang="en-US" sz="2800" dirty="0" smtClean="0">
+                <a:solidFill>
+                  <a:schemeClr val="bg1"/>
+                </a:solidFill>
+              </a:rPr>
+              <a:t>Grand wide streets led to the square</a:t>
+            </a:r>
+          </a:p>
+        </p:txBody>
+      </p:sp>
+    </p:spTree>
+    <p:extLst>
+      <p:ext uri="{BB962C8B-B14F-4D97-AF65-F5344CB8AC3E}">
+        <p14:creationId xmlns:p14="http://schemas.microsoft.com/office/powerpoint/2010/main" val="694401840"/>
+      </p:ext>
+    </p:extLst>
+  </p:cSld>
+  <p:clrMapOvr>
+    <a:masterClrMapping/>
+  </p:clrMapOvr>
+  <p:timing>
+    <p:tnLst>
+      <p:par>
+        <p:cTn id="1" dur="indefinite" restart="never" nodeType="tmRoot"/>
+      </p:par>
+    </p:tnLst>
+  </p:timing>
+</p:sld>
+</file>
+
+<file path=ppt/slides/slide7.xml><?xml version="1.0" encoding="utf-8"?>
+<p:sld xmlns:a="http://schemas.openxmlformats.org/drawingml/2006/main" xmlns:r="http://schemas.openxmlformats.org/officeDocument/2006/relationships" xmlns:p="http://schemas.openxmlformats.org/presentationml/2006/main">
+  <p:cSld>
+    <p:spTree>
+      <p:nvGrpSpPr>
+        <p:cNvPr id="1" name=""/>
+        <p:cNvGrpSpPr/>
+        <p:nvPr/>
+      </p:nvGrpSpPr>
+      <p:grpSpPr>
+        <a:xfrm>
+          <a:off x="0" y="0"/>
+          <a:ext cx="0" cy="0"/>
+          <a:chOff x="0" y="0"/>
+          <a:chExt cx="0" cy="0"/>
+        </a:xfrm>
+      </p:grpSpPr>
+      <p:sp>
+        <p:nvSpPr>
+          <p:cNvPr id="5" name="TextBox 4"/>
+          <p:cNvSpPr txBox="1"/>
+          <p:nvPr/>
+        </p:nvSpPr>
+        <p:spPr>
+          <a:xfrm>
+            <a:off x="199107" y="549855"/>
+            <a:ext cx="11620857" cy="1384995"/>
+          </a:xfrm>
+          <a:prstGeom prst="rect">
+            <a:avLst/>
+          </a:prstGeom>
+          <a:noFill/>
+        </p:spPr>
+        <p:txBody>
+          <a:bodyPr wrap="square" rtlCol="0">
+            <a:spAutoFit/>
+          </a:bodyPr>
+          <a:lstStyle/>
+          <a:p>
+            <a:pPr marL="285750" indent="-285750">
+              <a:buFont typeface="Arial" panose="020B0604020202020204" pitchFamily="34" charset="0"/>
+              <a:buChar char="•"/>
+            </a:pPr>
+            <a:r>
+              <a:rPr lang="en-US" sz="2800" dirty="0" smtClean="0">
+                <a:solidFill>
+                  <a:schemeClr val="bg1"/>
+                </a:solidFill>
+              </a:rPr>
+              <a:t>Before the revolutionary war, </a:t>
+            </a:r>
+            <a:r>
+              <a:rPr lang="en-US" sz="2800" dirty="0" err="1" smtClean="0">
+                <a:solidFill>
+                  <a:schemeClr val="bg1"/>
+                </a:solidFill>
+              </a:rPr>
+              <a:t>ppl</a:t>
+            </a:r>
+            <a:r>
+              <a:rPr lang="en-US" sz="2800" dirty="0" smtClean="0">
+                <a:solidFill>
+                  <a:schemeClr val="bg1"/>
+                </a:solidFill>
+              </a:rPr>
+              <a:t> lived in wards and it was </a:t>
+            </a:r>
+            <a:r>
+              <a:rPr lang="en-US" sz="2800" dirty="0" err="1" smtClean="0">
+                <a:solidFill>
+                  <a:schemeClr val="bg1"/>
+                </a:solidFill>
+              </a:rPr>
+              <a:t>gunna</a:t>
+            </a:r>
+            <a:r>
+              <a:rPr lang="en-US" sz="2800" dirty="0" smtClean="0">
+                <a:solidFill>
+                  <a:schemeClr val="bg1"/>
+                </a:solidFill>
+              </a:rPr>
+              <a:t> be like that but then it changed to a bunch of random houses, </a:t>
+            </a:r>
+            <a:r>
+              <a:rPr lang="en-US" sz="2800" smtClean="0">
+                <a:solidFill>
+                  <a:schemeClr val="bg1"/>
+                </a:solidFill>
+              </a:rPr>
+              <a:t>of unorganized format</a:t>
+            </a:r>
+            <a:endParaRPr lang="en-US" sz="2800" dirty="0" smtClean="0">
+              <a:solidFill>
+                <a:schemeClr val="bg1"/>
+              </a:solidFill>
+            </a:endParaRPr>
+          </a:p>
+        </p:txBody>
+      </p:sp>
+    </p:spTree>
+    <p:extLst>
+      <p:ext uri="{BB962C8B-B14F-4D97-AF65-F5344CB8AC3E}">
+        <p14:creationId xmlns:p14="http://schemas.microsoft.com/office/powerpoint/2010/main" val="1197191096"/>
       </p:ext>
     </p:extLst>
   </p:cSld>

</xml_diff>

<commit_message>
Undone work for 2/14/17
</commit_message>
<xml_diff>
--- a/Spring 2017 Semester/Urban Development/Urban Development Weekly Readings/Week 2/Week 2 Readings.pptx
+++ b/Spring 2017 Semester/Urban Development/Urban Development Weekly Readings/Week 2/Week 2 Readings.pptx
@@ -19,6 +19,21 @@
     <p:sldId id="268" r:id="rId13"/>
     <p:sldId id="269" r:id="rId14"/>
     <p:sldId id="270" r:id="rId15"/>
+    <p:sldId id="271" r:id="rId16"/>
+    <p:sldId id="273" r:id="rId17"/>
+    <p:sldId id="274" r:id="rId18"/>
+    <p:sldId id="275" r:id="rId19"/>
+    <p:sldId id="276" r:id="rId20"/>
+    <p:sldId id="277" r:id="rId21"/>
+    <p:sldId id="278" r:id="rId22"/>
+    <p:sldId id="279" r:id="rId23"/>
+    <p:sldId id="280" r:id="rId24"/>
+    <p:sldId id="281" r:id="rId25"/>
+    <p:sldId id="282" r:id="rId26"/>
+    <p:sldId id="283" r:id="rId27"/>
+    <p:sldId id="284" r:id="rId28"/>
+    <p:sldId id="285" r:id="rId29"/>
+    <p:sldId id="286" r:id="rId30"/>
   </p:sldIdLst>
   <p:sldSz cx="12192000" cy="6858000"/>
   <p:notesSz cx="6858000" cy="9144000"/>
@@ -118,6 +133,47 @@
     </a:lvl9pPr>
   </p:defaultTextStyle>
   <p:extLst>
+    <p:ext uri="{521415D9-36F7-43E2-AB2F-B90AF26B5E84}">
+      <p14:sectionLst xmlns:p14="http://schemas.microsoft.com/office/powerpoint/2010/main">
+        <p14:section name="Default Section" id="{F27A97A1-EAB1-43F1-9EF6-186BC3CA8F7A}">
+          <p14:sldIdLst>
+            <p14:sldId id="256"/>
+            <p14:sldId id="257"/>
+            <p14:sldId id="258"/>
+            <p14:sldId id="259"/>
+            <p14:sldId id="261"/>
+            <p14:sldId id="262"/>
+            <p14:sldId id="263"/>
+            <p14:sldId id="265"/>
+            <p14:sldId id="264"/>
+            <p14:sldId id="266"/>
+            <p14:sldId id="267"/>
+            <p14:sldId id="268"/>
+            <p14:sldId id="269"/>
+            <p14:sldId id="270"/>
+            <p14:sldId id="271"/>
+            <p14:sldId id="273"/>
+            <p14:sldId id="274"/>
+            <p14:sldId id="275"/>
+            <p14:sldId id="276"/>
+            <p14:sldId id="277"/>
+            <p14:sldId id="278"/>
+            <p14:sldId id="279"/>
+            <p14:sldId id="280"/>
+            <p14:sldId id="281"/>
+            <p14:sldId id="282"/>
+            <p14:sldId id="283"/>
+            <p14:sldId id="284"/>
+            <p14:sldId id="285"/>
+          </p14:sldIdLst>
+        </p14:section>
+        <p14:section name="Untitled Section" id="{6A493B8B-60B6-4FF8-A94F-CA566693BA00}">
+          <p14:sldIdLst>
+            <p14:sldId id="286"/>
+          </p14:sldIdLst>
+        </p14:section>
+      </p14:sectionLst>
+    </p:ext>
     <p:ext uri="{EFAFB233-063F-42B5-8137-9DF3F51BA10A}">
       <p15:sldGuideLst xmlns:p15="http://schemas.microsoft.com/office/powerpoint/2012/main"/>
     </p:ext>
@@ -220,7 +276,7 @@
           <a:effectLst/>
           <a:extLst>
             <a:ext uri="{91240B29-F687-4f45-9708-019B960494DF}">
-              <a14:hiddenLine xmlns="" xmlns:a14="http://schemas.microsoft.com/office/drawing/2010/main" w="9525">
+              <a14:hiddenLine xmlns:a14="http://schemas.microsoft.com/office/drawing/2010/main" xmlns="" w="9525">
                 <a:solidFill>
                   <a:srgbClr val="000000"/>
                 </a:solidFill>
@@ -413,7 +469,7 @@
             <a:fld id="{08B9EBBA-996F-894A-B54A-D6246ED52CEA}" type="datetimeFigureOut">
               <a:rPr lang="en-US" dirty="0"/>
               <a:pPr/>
-              <a:t>2/12/2017</a:t>
+              <a:t>2/14/2017</a:t>
             </a:fld>
             <a:endParaRPr lang="en-US" dirty="0"/>
           </a:p>
@@ -728,7 +784,7 @@
             <a:fld id="{18C79C5D-2A6F-F04D-97DA-BEF2467B64E4}" type="datetimeFigureOut">
               <a:rPr lang="en-US" dirty="0"/>
               <a:pPr/>
-              <a:t>2/12/2017</a:t>
+              <a:t>2/14/2017</a:t>
             </a:fld>
             <a:endParaRPr lang="en-US" dirty="0"/>
           </a:p>
@@ -1213,7 +1269,7 @@
             <a:fld id="{8DFA1846-DA80-1C48-A609-854EA85C59AD}" type="datetimeFigureOut">
               <a:rPr lang="en-US" dirty="0"/>
               <a:pPr/>
-              <a:t>2/12/2017</a:t>
+              <a:t>2/14/2017</a:t>
             </a:fld>
             <a:endParaRPr lang="en-US" dirty="0"/>
           </a:p>
@@ -1579,7 +1635,7 @@
             <a:fld id="{FBF54567-0DE4-3F47-BF90-CB84690072F9}" type="datetimeFigureOut">
               <a:rPr lang="en-US" dirty="0"/>
               <a:pPr/>
-              <a:t>2/12/2017</a:t>
+              <a:t>2/14/2017</a:t>
             </a:fld>
             <a:endParaRPr lang="en-US" dirty="0"/>
           </a:p>
@@ -1730,7 +1786,7 @@
           <a:ln/>
           <a:extLst>
             <a:ext uri="{91240B29-F687-4f45-9708-019B960494DF}">
-              <a14:hiddenLine xmlns="" xmlns:a14="http://schemas.microsoft.com/office/drawing/2010/main" w="9525">
+              <a14:hiddenLine xmlns:a14="http://schemas.microsoft.com/office/drawing/2010/main" xmlns="" w="9525">
                 <a:solidFill>
                   <a:srgbClr val="000000"/>
                 </a:solidFill>
@@ -1849,7 +1905,7 @@
             <a:fld id="{C6C52C72-DE31-F449-A4ED-4C594FD91407}" type="datetimeFigureOut">
               <a:rPr lang="en-US" dirty="0"/>
               <a:pPr/>
-              <a:t>2/12/2017</a:t>
+              <a:t>2/14/2017</a:t>
             </a:fld>
             <a:endParaRPr lang="en-US" dirty="0"/>
           </a:p>
@@ -2002,7 +2058,7 @@
           <a:ln/>
           <a:extLst>
             <a:ext uri="{91240B29-F687-4f45-9708-019B960494DF}">
-              <a14:hiddenLine xmlns="" xmlns:a14="http://schemas.microsoft.com/office/drawing/2010/main" w="9525">
+              <a14:hiddenLine xmlns:a14="http://schemas.microsoft.com/office/drawing/2010/main" xmlns="" w="9525">
                 <a:solidFill>
                   <a:srgbClr val="000000"/>
                 </a:solidFill>
@@ -2131,7 +2187,7 @@
             <a:fld id="{ED62726E-379B-B349-9EED-81ED093FA806}" type="datetimeFigureOut">
               <a:rPr lang="en-US" dirty="0"/>
               <a:pPr/>
-              <a:t>2/12/2017</a:t>
+              <a:t>2/14/2017</a:t>
             </a:fld>
             <a:endParaRPr lang="en-US" dirty="0"/>
           </a:p>
@@ -2282,7 +2338,7 @@
           <a:ln/>
           <a:extLst>
             <a:ext uri="{91240B29-F687-4f45-9708-019B960494DF}">
-              <a14:hiddenLine xmlns="" xmlns:a14="http://schemas.microsoft.com/office/drawing/2010/main" w="9525">
+              <a14:hiddenLine xmlns:a14="http://schemas.microsoft.com/office/drawing/2010/main" xmlns="" w="9525">
                 <a:solidFill>
                   <a:srgbClr val="000000"/>
                 </a:solidFill>
@@ -2411,7 +2467,7 @@
             <a:fld id="{9B3A1323-8D79-1946-B0D7-40001CF92E9D}" type="datetimeFigureOut">
               <a:rPr lang="en-US" dirty="0"/>
               <a:pPr/>
-              <a:t>2/12/2017</a:t>
+              <a:t>2/14/2017</a:t>
             </a:fld>
             <a:endParaRPr lang="en-US" dirty="0"/>
           </a:p>
@@ -2751,7 +2807,7 @@
             <a:fld id="{8DFA1846-DA80-1C48-A609-854EA85C59AD}" type="datetimeFigureOut">
               <a:rPr lang="en-US" dirty="0"/>
               <a:pPr/>
-              <a:t>2/12/2017</a:t>
+              <a:t>2/14/2017</a:t>
             </a:fld>
             <a:endParaRPr lang="en-US" dirty="0"/>
           </a:p>
@@ -2902,7 +2958,7 @@
           <a:ln/>
           <a:extLst>
             <a:ext uri="{91240B29-F687-4f45-9708-019B960494DF}">
-              <a14:hiddenLine xmlns="" xmlns:a14="http://schemas.microsoft.com/office/drawing/2010/main" w="9525">
+              <a14:hiddenLine xmlns:a14="http://schemas.microsoft.com/office/drawing/2010/main" xmlns="" w="9525">
                 <a:solidFill>
                   <a:srgbClr val="000000"/>
                 </a:solidFill>
@@ -3087,7 +3143,7 @@
             <a:fld id="{57302355-E14B-8545-A8F8-0FE83CC9D524}" type="datetimeFigureOut">
               <a:rPr lang="en-US" dirty="0"/>
               <a:pPr/>
-              <a:t>2/12/2017</a:t>
+              <a:t>2/14/2017</a:t>
             </a:fld>
             <a:endParaRPr lang="en-US" dirty="0"/>
           </a:p>
@@ -3238,7 +3294,7 @@
           <a:ln/>
           <a:extLst>
             <a:ext uri="{91240B29-F687-4f45-9708-019B960494DF}">
-              <a14:hiddenLine xmlns="" xmlns:a14="http://schemas.microsoft.com/office/drawing/2010/main" w="9525">
+              <a14:hiddenLine xmlns:a14="http://schemas.microsoft.com/office/drawing/2010/main" xmlns="" w="9525">
                 <a:solidFill>
                   <a:srgbClr val="000000"/>
                 </a:solidFill>
@@ -3561,7 +3617,7 @@
             <a:fld id="{02640F58-564D-2B4F-AE67-E407BA4FCF45}" type="datetimeFigureOut">
               <a:rPr lang="en-US" dirty="0"/>
               <a:pPr/>
-              <a:t>2/12/2017</a:t>
+              <a:t>2/14/2017</a:t>
             </a:fld>
             <a:endParaRPr lang="en-US" dirty="0"/>
           </a:p>
@@ -3712,7 +3768,7 @@
           <a:ln/>
           <a:extLst>
             <a:ext uri="{91240B29-F687-4f45-9708-019B960494DF}">
-              <a14:hiddenLine xmlns="" xmlns:a14="http://schemas.microsoft.com/office/drawing/2010/main" w="9525">
+              <a14:hiddenLine xmlns:a14="http://schemas.microsoft.com/office/drawing/2010/main" xmlns="" w="9525">
                 <a:solidFill>
                   <a:srgbClr val="000000"/>
                 </a:solidFill>
@@ -3779,7 +3835,7 @@
             <a:fld id="{F13A34C8-038E-2045-AF43-DF7DBB8E0E9E}" type="datetimeFigureOut">
               <a:rPr lang="en-US" dirty="0"/>
               <a:pPr/>
-              <a:t>2/12/2017</a:t>
+              <a:t>2/14/2017</a:t>
             </a:fld>
             <a:endParaRPr lang="en-US" dirty="0"/>
           </a:p>
@@ -3871,7 +3927,7 @@
             <a:fld id="{8818C68F-D26B-8F47-958C-23B49CF8A634}" type="datetimeFigureOut">
               <a:rPr lang="en-US" dirty="0"/>
               <a:pPr/>
-              <a:t>2/12/2017</a:t>
+              <a:t>2/14/2017</a:t>
             </a:fld>
             <a:endParaRPr lang="en-US" dirty="0"/>
           </a:p>
@@ -4135,7 +4191,7 @@
           <a:ln/>
           <a:extLst>
             <a:ext uri="{91240B29-F687-4f45-9708-019B960494DF}">
-              <a14:hiddenLine xmlns="" xmlns:a14="http://schemas.microsoft.com/office/drawing/2010/main" w="9525">
+              <a14:hiddenLine xmlns:a14="http://schemas.microsoft.com/office/drawing/2010/main" xmlns="" w="9525">
                 <a:solidFill>
                   <a:srgbClr val="000000"/>
                 </a:solidFill>
@@ -4335,7 +4391,7 @@
             <a:fld id="{D0DF5E60-9974-AC48-9591-99C2BB44B7CF}" type="datetimeFigureOut">
               <a:rPr lang="en-US" dirty="0"/>
               <a:pPr/>
-              <a:t>2/12/2017</a:t>
+              <a:t>2/14/2017</a:t>
             </a:fld>
             <a:endParaRPr lang="en-US" dirty="0"/>
           </a:p>
@@ -4645,7 +4701,7 @@
             <a:fld id="{18C79C5D-2A6F-F04D-97DA-BEF2467B64E4}" type="datetimeFigureOut">
               <a:rPr lang="en-US" dirty="0"/>
               <a:pPr/>
-              <a:t>2/12/2017</a:t>
+              <a:t>2/14/2017</a:t>
             </a:fld>
             <a:endParaRPr lang="en-US" dirty="0"/>
           </a:p>
@@ -4912,7 +4968,7 @@
             <a:fld id="{09B482E8-6E0E-1B4F-B1FD-C69DB9E858D9}" type="datetimeFigureOut">
               <a:rPr lang="en-US" dirty="0"/>
               <a:pPr/>
-              <a:t>2/12/2017</a:t>
+              <a:t>2/14/2017</a:t>
             </a:fld>
             <a:endParaRPr lang="en-US" dirty="0"/>
           </a:p>
@@ -5715,15 +5771,7 @@
                   <a:schemeClr val="bg1"/>
                 </a:solidFill>
               </a:rPr>
-              <a:t>Urbanism was shaped in many ways</a:t>
-            </a:r>
-            <a:r>
-              <a:rPr lang="en-US" sz="2800" dirty="0" smtClean="0">
-                <a:solidFill>
-                  <a:schemeClr val="bg1"/>
-                </a:solidFill>
-              </a:rPr>
-              <a:t>	</a:t>
+              <a:t>Urbanism was shaped in many ways	</a:t>
             </a:r>
           </a:p>
         </p:txBody>
@@ -6290,11 +6338,6 @@
               </a:rPr>
               <a:t>Range- max. dist. Consumers travel to get goods 	</a:t>
             </a:r>
-            <a:endParaRPr lang="en-US" sz="2800" dirty="0" smtClean="0">
-              <a:solidFill>
-                <a:schemeClr val="bg1"/>
-              </a:solidFill>
-            </a:endParaRPr>
           </a:p>
         </p:txBody>
       </p:sp>
@@ -6497,6 +6540,365 @@
               </a:rPr>
               <a:t>	</a:t>
             </a:r>
+          </a:p>
+        </p:txBody>
+      </p:sp>
+    </p:spTree>
+    <p:extLst>
+      <p:ext uri="{BB962C8B-B14F-4D97-AF65-F5344CB8AC3E}">
+        <p14:creationId xmlns:p14="http://schemas.microsoft.com/office/powerpoint/2010/main" val="254265587"/>
+      </p:ext>
+    </p:extLst>
+  </p:cSld>
+  <p:clrMapOvr>
+    <a:masterClrMapping/>
+  </p:clrMapOvr>
+  <p:timing>
+    <p:tnLst>
+      <p:par>
+        <p:cTn id="1" dur="indefinite" restart="never" nodeType="tmRoot"/>
+      </p:par>
+    </p:tnLst>
+  </p:timing>
+</p:sld>
+</file>
+
+<file path=ppt/slides/slide15.xml><?xml version="1.0" encoding="utf-8"?>
+<p:sld xmlns:a="http://schemas.openxmlformats.org/drawingml/2006/main" xmlns:r="http://schemas.openxmlformats.org/officeDocument/2006/relationships" xmlns:p="http://schemas.openxmlformats.org/presentationml/2006/main">
+  <p:cSld>
+    <p:spTree>
+      <p:nvGrpSpPr>
+        <p:cNvPr id="1" name=""/>
+        <p:cNvGrpSpPr/>
+        <p:nvPr/>
+      </p:nvGrpSpPr>
+      <p:grpSpPr>
+        <a:xfrm>
+          <a:off x="0" y="0"/>
+          <a:ext cx="0" cy="0"/>
+          <a:chOff x="0" y="0"/>
+          <a:chExt cx="0" cy="0"/>
+        </a:xfrm>
+      </p:grpSpPr>
+      <p:sp>
+        <p:nvSpPr>
+          <p:cNvPr id="2" name="Title 1"/>
+          <p:cNvSpPr>
+            <a:spLocks noGrp="1"/>
+          </p:cNvSpPr>
+          <p:nvPr>
+            <p:ph type="title"/>
+          </p:nvPr>
+        </p:nvSpPr>
+        <p:spPr>
+          <a:xfrm>
+            <a:off x="810000" y="484094"/>
+            <a:ext cx="10561418" cy="3882314"/>
+          </a:xfrm>
+        </p:spPr>
+        <p:txBody>
+          <a:bodyPr/>
+          <a:lstStyle/>
+          <a:p>
+            <a:r>
+              <a:rPr lang="en-US" dirty="0" smtClean="0">
+                <a:solidFill>
+                  <a:schemeClr val="bg2"/>
+                </a:solidFill>
+              </a:rPr>
+              <a:t>CSB </a:t>
+            </a:r>
+            <a:r>
+              <a:rPr lang="en-US" dirty="0" err="1" smtClean="0">
+                <a:solidFill>
+                  <a:schemeClr val="bg2"/>
+                </a:solidFill>
+              </a:rPr>
+              <a:t>ch.</a:t>
+            </a:r>
+            <a:r>
+              <a:rPr lang="en-US" dirty="0" smtClean="0">
+                <a:solidFill>
+                  <a:schemeClr val="bg2"/>
+                </a:solidFill>
+              </a:rPr>
+              <a:t> 1,2 &amp;3 </a:t>
+            </a:r>
+            <a:endParaRPr lang="en-US" dirty="0">
+              <a:solidFill>
+                <a:schemeClr val="bg2"/>
+              </a:solidFill>
+            </a:endParaRPr>
+          </a:p>
+        </p:txBody>
+      </p:sp>
+      <p:sp>
+        <p:nvSpPr>
+          <p:cNvPr id="3" name="Text Placeholder 2"/>
+          <p:cNvSpPr>
+            <a:spLocks noGrp="1"/>
+          </p:cNvSpPr>
+          <p:nvPr>
+            <p:ph type="body" idx="1"/>
+          </p:nvPr>
+        </p:nvSpPr>
+        <p:spPr/>
+        <p:txBody>
+          <a:bodyPr/>
+          <a:lstStyle/>
+          <a:p>
+            <a:r>
+              <a:rPr lang="en-US" b="1" dirty="0" smtClean="0"/>
+              <a:t>EVERY PARAGRAPH</a:t>
+            </a:r>
+            <a:endParaRPr lang="en-US" b="1" dirty="0"/>
+          </a:p>
+        </p:txBody>
+      </p:sp>
+    </p:spTree>
+    <p:extLst>
+      <p:ext uri="{BB962C8B-B14F-4D97-AF65-F5344CB8AC3E}">
+        <p14:creationId xmlns:p14="http://schemas.microsoft.com/office/powerpoint/2010/main" val="4054049939"/>
+      </p:ext>
+    </p:extLst>
+  </p:cSld>
+  <p:clrMapOvr>
+    <a:masterClrMapping/>
+  </p:clrMapOvr>
+  <p:timing>
+    <p:tnLst>
+      <p:par>
+        <p:cTn id="1" dur="indefinite" restart="never" nodeType="tmRoot"/>
+      </p:par>
+    </p:tnLst>
+  </p:timing>
+</p:sld>
+</file>
+
+<file path=ppt/slides/slide16.xml><?xml version="1.0" encoding="utf-8"?>
+<p:sld xmlns:a="http://schemas.openxmlformats.org/drawingml/2006/main" xmlns:r="http://schemas.openxmlformats.org/officeDocument/2006/relationships" xmlns:p="http://schemas.openxmlformats.org/presentationml/2006/main">
+  <p:cSld>
+    <p:spTree>
+      <p:nvGrpSpPr>
+        <p:cNvPr id="1" name=""/>
+        <p:cNvGrpSpPr/>
+        <p:nvPr/>
+      </p:nvGrpSpPr>
+      <p:grpSpPr>
+        <a:xfrm>
+          <a:off x="0" y="0"/>
+          <a:ext cx="0" cy="0"/>
+          <a:chOff x="0" y="0"/>
+          <a:chExt cx="0" cy="0"/>
+        </a:xfrm>
+      </p:grpSpPr>
+      <p:sp>
+        <p:nvSpPr>
+          <p:cNvPr id="2" name="Title 1"/>
+          <p:cNvSpPr>
+            <a:spLocks noGrp="1"/>
+          </p:cNvSpPr>
+          <p:nvPr>
+            <p:ph type="title"/>
+          </p:nvPr>
+        </p:nvSpPr>
+        <p:spPr>
+          <a:xfrm>
+            <a:off x="810000" y="484094"/>
+            <a:ext cx="10561418" cy="3882314"/>
+          </a:xfrm>
+        </p:spPr>
+        <p:txBody>
+          <a:bodyPr/>
+          <a:lstStyle/>
+          <a:p>
+            <a:r>
+              <a:rPr lang="en-US" dirty="0" smtClean="0">
+                <a:solidFill>
+                  <a:schemeClr val="bg2"/>
+                </a:solidFill>
+              </a:rPr>
+              <a:t>CSB </a:t>
+            </a:r>
+            <a:r>
+              <a:rPr lang="en-US" dirty="0" err="1" smtClean="0">
+                <a:solidFill>
+                  <a:schemeClr val="bg2"/>
+                </a:solidFill>
+              </a:rPr>
+              <a:t>ch.</a:t>
+            </a:r>
+            <a:r>
+              <a:rPr lang="en-US" dirty="0" smtClean="0">
+                <a:solidFill>
+                  <a:schemeClr val="bg2"/>
+                </a:solidFill>
+              </a:rPr>
+              <a:t> </a:t>
+            </a:r>
+            <a:r>
+              <a:rPr lang="en-US" dirty="0" smtClean="0">
+                <a:solidFill>
+                  <a:schemeClr val="bg2"/>
+                </a:solidFill>
+              </a:rPr>
+              <a:t>1</a:t>
+            </a:r>
+            <a:br>
+              <a:rPr lang="en-US" dirty="0" smtClean="0">
+                <a:solidFill>
+                  <a:schemeClr val="bg2"/>
+                </a:solidFill>
+              </a:rPr>
+            </a:br>
+            <a:r>
+              <a:rPr lang="en-US" dirty="0" smtClean="0">
+                <a:solidFill>
+                  <a:schemeClr val="bg2"/>
+                </a:solidFill>
+              </a:rPr>
+              <a:t>slavery,  trading and cities were </a:t>
+            </a:r>
+            <a:r>
+              <a:rPr lang="en-US" dirty="0" err="1" smtClean="0">
+                <a:solidFill>
+                  <a:schemeClr val="bg2"/>
+                </a:solidFill>
+              </a:rPr>
+              <a:t>everywher</a:t>
+            </a:r>
+            <a:r>
+              <a:rPr lang="en-US" dirty="0" smtClean="0">
+                <a:solidFill>
+                  <a:schemeClr val="bg2"/>
+                </a:solidFill>
+              </a:rPr>
+              <a:t> </a:t>
+            </a:r>
+            <a:endParaRPr lang="en-US" dirty="0">
+              <a:solidFill>
+                <a:schemeClr val="bg2"/>
+              </a:solidFill>
+            </a:endParaRPr>
+          </a:p>
+        </p:txBody>
+      </p:sp>
+      <p:sp>
+        <p:nvSpPr>
+          <p:cNvPr id="3" name="Text Placeholder 2"/>
+          <p:cNvSpPr>
+            <a:spLocks noGrp="1"/>
+          </p:cNvSpPr>
+          <p:nvPr>
+            <p:ph type="body" idx="1"/>
+          </p:nvPr>
+        </p:nvSpPr>
+        <p:spPr/>
+        <p:txBody>
+          <a:bodyPr/>
+          <a:lstStyle/>
+          <a:p>
+            <a:r>
+              <a:rPr lang="en-US" b="1" dirty="0" smtClean="0"/>
+              <a:t>EVERY SUBSECTION</a:t>
+            </a:r>
+            <a:endParaRPr lang="en-US" b="1" dirty="0"/>
+          </a:p>
+        </p:txBody>
+      </p:sp>
+    </p:spTree>
+    <p:extLst>
+      <p:ext uri="{BB962C8B-B14F-4D97-AF65-F5344CB8AC3E}">
+        <p14:creationId xmlns:p14="http://schemas.microsoft.com/office/powerpoint/2010/main" val="1227870689"/>
+      </p:ext>
+    </p:extLst>
+  </p:cSld>
+  <p:clrMapOvr>
+    <a:masterClrMapping/>
+  </p:clrMapOvr>
+  <p:timing>
+    <p:tnLst>
+      <p:par>
+        <p:cTn id="1" dur="indefinite" restart="never" nodeType="tmRoot"/>
+      </p:par>
+    </p:tnLst>
+  </p:timing>
+</p:sld>
+</file>
+
+<file path=ppt/slides/slide17.xml><?xml version="1.0" encoding="utf-8"?>
+<p:sld xmlns:a="http://schemas.openxmlformats.org/drawingml/2006/main" xmlns:r="http://schemas.openxmlformats.org/officeDocument/2006/relationships" xmlns:p="http://schemas.openxmlformats.org/presentationml/2006/main">
+  <p:cSld>
+    <p:spTree>
+      <p:nvGrpSpPr>
+        <p:cNvPr id="1" name=""/>
+        <p:cNvGrpSpPr/>
+        <p:nvPr/>
+      </p:nvGrpSpPr>
+      <p:grpSpPr>
+        <a:xfrm>
+          <a:off x="0" y="0"/>
+          <a:ext cx="0" cy="0"/>
+          <a:chOff x="0" y="0"/>
+          <a:chExt cx="0" cy="0"/>
+        </a:xfrm>
+      </p:grpSpPr>
+      <p:sp>
+        <p:nvSpPr>
+          <p:cNvPr id="5" name="TextBox 4"/>
+          <p:cNvSpPr txBox="1"/>
+          <p:nvPr/>
+        </p:nvSpPr>
+        <p:spPr>
+          <a:xfrm>
+            <a:off x="284015" y="407252"/>
+            <a:ext cx="11620857" cy="1384995"/>
+          </a:xfrm>
+          <a:prstGeom prst="rect">
+            <a:avLst/>
+          </a:prstGeom>
+          <a:noFill/>
+        </p:spPr>
+        <p:txBody>
+          <a:bodyPr wrap="square" rtlCol="0">
+            <a:spAutoFit/>
+          </a:bodyPr>
+          <a:lstStyle/>
+          <a:p>
+            <a:pPr marL="285750" indent="-285750">
+              <a:buFont typeface="Arial" panose="020B0604020202020204" pitchFamily="34" charset="0"/>
+              <a:buChar char="•"/>
+            </a:pPr>
+            <a:r>
+              <a:rPr lang="en-US" sz="2800" dirty="0" smtClean="0">
+                <a:solidFill>
+                  <a:schemeClr val="bg1"/>
+                </a:solidFill>
+              </a:rPr>
+              <a:t>When Cortez came to the city of </a:t>
+            </a:r>
+            <a:r>
+              <a:rPr lang="en-US" sz="2800" dirty="0" err="1" smtClean="0">
+                <a:solidFill>
+                  <a:schemeClr val="bg1"/>
+                </a:solidFill>
+              </a:rPr>
+              <a:t>Tenochitlan</a:t>
+            </a:r>
+            <a:r>
+              <a:rPr lang="en-US" sz="2800" dirty="0" smtClean="0">
+                <a:solidFill>
+                  <a:schemeClr val="bg1"/>
+                </a:solidFill>
+              </a:rPr>
+              <a:t>, it was a grand city which rivaled the greatest cities in Spain</a:t>
+            </a:r>
+          </a:p>
+          <a:p>
+            <a:pPr marL="285750" indent="-285750">
+              <a:buFont typeface="Arial" panose="020B0604020202020204" pitchFamily="34" charset="0"/>
+              <a:buChar char="•"/>
+            </a:pPr>
             <a:endParaRPr lang="en-US" sz="2800" dirty="0" smtClean="0">
               <a:solidFill>
                 <a:schemeClr val="bg1"/>
@@ -6508,7 +6910,424 @@
     </p:spTree>
     <p:extLst>
       <p:ext uri="{BB962C8B-B14F-4D97-AF65-F5344CB8AC3E}">
-        <p14:creationId xmlns:p14="http://schemas.microsoft.com/office/powerpoint/2010/main" val="254265587"/>
+        <p14:creationId xmlns:p14="http://schemas.microsoft.com/office/powerpoint/2010/main" val="3980899491"/>
+      </p:ext>
+    </p:extLst>
+  </p:cSld>
+  <p:clrMapOvr>
+    <a:masterClrMapping/>
+  </p:clrMapOvr>
+  <p:timing>
+    <p:tnLst>
+      <p:par>
+        <p:cTn id="1" dur="indefinite" restart="never" nodeType="tmRoot"/>
+      </p:par>
+    </p:tnLst>
+  </p:timing>
+</p:sld>
+</file>
+
+<file path=ppt/slides/slide18.xml><?xml version="1.0" encoding="utf-8"?>
+<p:sld xmlns:a="http://schemas.openxmlformats.org/drawingml/2006/main" xmlns:r="http://schemas.openxmlformats.org/officeDocument/2006/relationships" xmlns:p="http://schemas.openxmlformats.org/presentationml/2006/main">
+  <p:cSld>
+    <p:spTree>
+      <p:nvGrpSpPr>
+        <p:cNvPr id="1" name=""/>
+        <p:cNvGrpSpPr/>
+        <p:nvPr/>
+      </p:nvGrpSpPr>
+      <p:grpSpPr>
+        <a:xfrm>
+          <a:off x="0" y="0"/>
+          <a:ext cx="0" cy="0"/>
+          <a:chOff x="0" y="0"/>
+          <a:chExt cx="0" cy="0"/>
+        </a:xfrm>
+      </p:grpSpPr>
+      <p:sp>
+        <p:nvSpPr>
+          <p:cNvPr id="5" name="TextBox 4"/>
+          <p:cNvSpPr txBox="1"/>
+          <p:nvPr/>
+        </p:nvSpPr>
+        <p:spPr>
+          <a:xfrm>
+            <a:off x="284015" y="407252"/>
+            <a:ext cx="11620857" cy="5755422"/>
+          </a:xfrm>
+          <a:prstGeom prst="rect">
+            <a:avLst/>
+          </a:prstGeom>
+          <a:noFill/>
+        </p:spPr>
+        <p:txBody>
+          <a:bodyPr wrap="square" rtlCol="0">
+            <a:spAutoFit/>
+          </a:bodyPr>
+          <a:lstStyle/>
+          <a:p>
+            <a:pPr algn="ctr"/>
+            <a:r>
+              <a:rPr lang="en-US" sz="3200" dirty="0" smtClean="0">
+                <a:solidFill>
+                  <a:srgbClr val="FF0000"/>
+                </a:solidFill>
+              </a:rPr>
+              <a:t>Urban </a:t>
+            </a:r>
+            <a:r>
+              <a:rPr lang="en-US" sz="3200" smtClean="0">
+                <a:solidFill>
+                  <a:srgbClr val="FF0000"/>
+                </a:solidFill>
+              </a:rPr>
+              <a:t>Beginngs</a:t>
+            </a:r>
+            <a:endParaRPr lang="en-US" sz="3200" dirty="0" smtClean="0">
+              <a:solidFill>
+                <a:srgbClr val="0070C0"/>
+              </a:solidFill>
+            </a:endParaRPr>
+          </a:p>
+          <a:p>
+            <a:pPr marL="285750" indent="-285750">
+              <a:buFont typeface="Arial" panose="020B0604020202020204" pitchFamily="34" charset="0"/>
+              <a:buChar char="•"/>
+            </a:pPr>
+            <a:r>
+              <a:rPr lang="en-US" sz="2800" dirty="0" smtClean="0">
+                <a:solidFill>
+                  <a:schemeClr val="bg1"/>
+                </a:solidFill>
+              </a:rPr>
+              <a:t>Cortes then goes ahead to destroy the city with help of </a:t>
+            </a:r>
+            <a:r>
+              <a:rPr lang="en-US" sz="2800" dirty="0" err="1" smtClean="0">
+                <a:solidFill>
+                  <a:schemeClr val="bg1"/>
+                </a:solidFill>
+              </a:rPr>
+              <a:t>indian</a:t>
+            </a:r>
+            <a:r>
+              <a:rPr lang="en-US" sz="2800" dirty="0" smtClean="0">
+                <a:solidFill>
+                  <a:schemeClr val="bg1"/>
+                </a:solidFill>
+              </a:rPr>
+              <a:t>, conquistadors build their own city on every South American cities</a:t>
+            </a:r>
+          </a:p>
+          <a:p>
+            <a:pPr marL="285750" indent="-285750">
+              <a:buFont typeface="Arial" panose="020B0604020202020204" pitchFamily="34" charset="0"/>
+              <a:buChar char="•"/>
+            </a:pPr>
+            <a:r>
+              <a:rPr lang="en-US" sz="2800" dirty="0" smtClean="0">
+                <a:solidFill>
+                  <a:schemeClr val="bg1"/>
+                </a:solidFill>
+              </a:rPr>
+              <a:t>North Natives did this w/ Cahokia on a smaller scale</a:t>
+            </a:r>
+          </a:p>
+          <a:p>
+            <a:pPr marL="285750" indent="-285750">
+              <a:buFont typeface="Arial" panose="020B0604020202020204" pitchFamily="34" charset="0"/>
+              <a:buChar char="•"/>
+            </a:pPr>
+            <a:r>
+              <a:rPr lang="en-US" sz="2800" dirty="0" smtClean="0">
+                <a:solidFill>
+                  <a:schemeClr val="bg1"/>
+                </a:solidFill>
+              </a:rPr>
+              <a:t>Cahokia was the biggest city in North America but it declined</a:t>
+            </a:r>
+            <a:r>
+              <a:rPr lang="en-US" sz="2800" dirty="0">
+                <a:solidFill>
+                  <a:schemeClr val="bg1"/>
+                </a:solidFill>
+              </a:rPr>
+              <a:t> </a:t>
+            </a:r>
+            <a:r>
+              <a:rPr lang="en-US" sz="2800" dirty="0" smtClean="0">
+                <a:solidFill>
+                  <a:schemeClr val="bg1"/>
+                </a:solidFill>
+              </a:rPr>
+              <a:t>people just didn’t like cities</a:t>
+            </a:r>
+          </a:p>
+          <a:p>
+            <a:pPr marL="285750" indent="-285750">
+              <a:buFont typeface="Arial" panose="020B0604020202020204" pitchFamily="34" charset="0"/>
+              <a:buChar char="•"/>
+            </a:pPr>
+            <a:r>
+              <a:rPr lang="en-US" sz="2800" dirty="0" smtClean="0">
+                <a:solidFill>
+                  <a:schemeClr val="bg1"/>
+                </a:solidFill>
+              </a:rPr>
+              <a:t>There were other towns around but they were decimated by infections</a:t>
+            </a:r>
+          </a:p>
+          <a:p>
+            <a:pPr marL="285750" indent="-285750">
+              <a:buFont typeface="Arial" panose="020B0604020202020204" pitchFamily="34" charset="0"/>
+              <a:buChar char="•"/>
+            </a:pPr>
+            <a:r>
+              <a:rPr lang="en-US" sz="2800" dirty="0" smtClean="0">
+                <a:solidFill>
+                  <a:schemeClr val="bg1"/>
+                </a:solidFill>
+              </a:rPr>
+              <a:t>People lived in apartments made of mud they still in exist in Cali.</a:t>
+            </a:r>
+          </a:p>
+          <a:p>
+            <a:pPr marL="285750" indent="-285750">
+              <a:buFont typeface="Arial" panose="020B0604020202020204" pitchFamily="34" charset="0"/>
+              <a:buChar char="•"/>
+            </a:pPr>
+            <a:r>
+              <a:rPr lang="en-US" sz="2800" dirty="0" smtClean="0"/>
+              <a:t>Europeans came in and conquered everyone to do that they needed cities</a:t>
+            </a:r>
+          </a:p>
+          <a:p>
+            <a:pPr marL="285750" indent="-285750">
+              <a:buFont typeface="Arial" panose="020B0604020202020204" pitchFamily="34" charset="0"/>
+              <a:buChar char="•"/>
+            </a:pPr>
+            <a:endParaRPr lang="en-US" sz="2800" dirty="0" smtClean="0">
+              <a:solidFill>
+                <a:schemeClr val="bg1"/>
+              </a:solidFill>
+            </a:endParaRPr>
+          </a:p>
+        </p:txBody>
+      </p:sp>
+    </p:spTree>
+    <p:extLst>
+      <p:ext uri="{BB962C8B-B14F-4D97-AF65-F5344CB8AC3E}">
+        <p14:creationId xmlns:p14="http://schemas.microsoft.com/office/powerpoint/2010/main" val="3609362825"/>
+      </p:ext>
+    </p:extLst>
+  </p:cSld>
+  <p:clrMapOvr>
+    <a:masterClrMapping/>
+  </p:clrMapOvr>
+  <p:timing>
+    <p:tnLst>
+      <p:par>
+        <p:cTn id="1" dur="indefinite" restart="never" nodeType="tmRoot"/>
+      </p:par>
+    </p:tnLst>
+  </p:timing>
+</p:sld>
+</file>
+
+<file path=ppt/slides/slide19.xml><?xml version="1.0" encoding="utf-8"?>
+<p:sld xmlns:a="http://schemas.openxmlformats.org/drawingml/2006/main" xmlns:r="http://schemas.openxmlformats.org/officeDocument/2006/relationships" xmlns:p="http://schemas.openxmlformats.org/presentationml/2006/main">
+  <p:cSld>
+    <p:spTree>
+      <p:nvGrpSpPr>
+        <p:cNvPr id="1" name=""/>
+        <p:cNvGrpSpPr/>
+        <p:nvPr/>
+      </p:nvGrpSpPr>
+      <p:grpSpPr>
+        <a:xfrm>
+          <a:off x="0" y="0"/>
+          <a:ext cx="0" cy="0"/>
+          <a:chOff x="0" y="0"/>
+          <a:chExt cx="0" cy="0"/>
+        </a:xfrm>
+      </p:grpSpPr>
+      <p:sp>
+        <p:nvSpPr>
+          <p:cNvPr id="5" name="TextBox 4"/>
+          <p:cNvSpPr txBox="1"/>
+          <p:nvPr/>
+        </p:nvSpPr>
+        <p:spPr>
+          <a:xfrm>
+            <a:off x="284015" y="407252"/>
+            <a:ext cx="11620857" cy="6186309"/>
+          </a:xfrm>
+          <a:prstGeom prst="rect">
+            <a:avLst/>
+          </a:prstGeom>
+          <a:noFill/>
+        </p:spPr>
+        <p:txBody>
+          <a:bodyPr wrap="square" rtlCol="0">
+            <a:spAutoFit/>
+          </a:bodyPr>
+          <a:lstStyle/>
+          <a:p>
+            <a:pPr algn="ctr"/>
+            <a:r>
+              <a:rPr lang="en-US" sz="3200" dirty="0" smtClean="0">
+                <a:solidFill>
+                  <a:srgbClr val="FF0000"/>
+                </a:solidFill>
+              </a:rPr>
+              <a:t>Spanish and French Colonial Settlements</a:t>
+            </a:r>
+            <a:endParaRPr lang="en-US" sz="3200" dirty="0" smtClean="0">
+              <a:solidFill>
+                <a:srgbClr val="0070C0"/>
+              </a:solidFill>
+            </a:endParaRPr>
+          </a:p>
+          <a:p>
+            <a:pPr marL="457200" indent="-457200">
+              <a:buFont typeface="Arial" panose="020B0604020202020204" pitchFamily="34" charset="0"/>
+              <a:buChar char="•"/>
+            </a:pPr>
+            <a:r>
+              <a:rPr lang="en-US" sz="2800" dirty="0" err="1" smtClean="0">
+                <a:solidFill>
+                  <a:schemeClr val="bg1"/>
+                </a:solidFill>
+              </a:rPr>
+              <a:t>Spainards</a:t>
+            </a:r>
+            <a:r>
+              <a:rPr lang="en-US" sz="2800" dirty="0" smtClean="0">
+                <a:solidFill>
+                  <a:schemeClr val="bg1"/>
+                </a:solidFill>
+              </a:rPr>
+              <a:t> wanted to take over </a:t>
+            </a:r>
+            <a:r>
+              <a:rPr lang="en-US" sz="2800" dirty="0" err="1" smtClean="0">
+                <a:solidFill>
+                  <a:schemeClr val="bg1"/>
+                </a:solidFill>
+              </a:rPr>
+              <a:t>florida</a:t>
+            </a:r>
+            <a:r>
+              <a:rPr lang="en-US" sz="2800" dirty="0" smtClean="0">
+                <a:solidFill>
+                  <a:schemeClr val="bg1"/>
+                </a:solidFill>
+              </a:rPr>
+              <a:t>, when the setup San Agustin </a:t>
+            </a:r>
+            <a:r>
+              <a:rPr lang="en-US" sz="2800" dirty="0" err="1" smtClean="0">
+                <a:solidFill>
+                  <a:schemeClr val="bg1"/>
+                </a:solidFill>
+              </a:rPr>
+              <a:t>ppl</a:t>
+            </a:r>
+            <a:r>
+              <a:rPr lang="en-US" sz="2800" dirty="0" smtClean="0">
+                <a:solidFill>
+                  <a:schemeClr val="bg1"/>
+                </a:solidFill>
+              </a:rPr>
+              <a:t> kept taking it down and they gave it + Florida to the English</a:t>
+            </a:r>
+          </a:p>
+          <a:p>
+            <a:pPr marL="457200" indent="-457200">
+              <a:buFont typeface="Arial" panose="020B0604020202020204" pitchFamily="34" charset="0"/>
+              <a:buChar char="•"/>
+            </a:pPr>
+            <a:r>
+              <a:rPr lang="en-US" sz="2800" dirty="0" smtClean="0">
+                <a:solidFill>
+                  <a:schemeClr val="bg1"/>
+                </a:solidFill>
+              </a:rPr>
+              <a:t>New Mexico Spanish tried to kill witchcraft, but they got kicked out, came back and intermarried </a:t>
+            </a:r>
+          </a:p>
+          <a:p>
+            <a:pPr marL="457200" indent="-457200">
+              <a:buFont typeface="Arial" panose="020B0604020202020204" pitchFamily="34" charset="0"/>
+              <a:buChar char="•"/>
+            </a:pPr>
+            <a:r>
+              <a:rPr lang="en-US" sz="2800" dirty="0" smtClean="0">
+                <a:solidFill>
+                  <a:schemeClr val="bg1"/>
+                </a:solidFill>
+              </a:rPr>
+              <a:t>Spanish colonists assoc. w/ city, city was everything around it made a formal system of town planning still seen today</a:t>
+            </a:r>
+          </a:p>
+          <a:p>
+            <a:pPr marL="457200" indent="-457200">
+              <a:buFont typeface="Arial" panose="020B0604020202020204" pitchFamily="34" charset="0"/>
+              <a:buChar char="•"/>
+            </a:pPr>
+            <a:r>
+              <a:rPr lang="en-US" sz="2800" dirty="0" smtClean="0">
+                <a:solidFill>
+                  <a:schemeClr val="bg1"/>
+                </a:solidFill>
+              </a:rPr>
+              <a:t>San Antonio split because of quarrel between general and priest</a:t>
+            </a:r>
+          </a:p>
+          <a:p>
+            <a:pPr marL="457200" indent="-457200">
+              <a:buFont typeface="Arial" panose="020B0604020202020204" pitchFamily="34" charset="0"/>
+              <a:buChar char="•"/>
+            </a:pPr>
+            <a:r>
+              <a:rPr lang="en-US" sz="2800" dirty="0" smtClean="0"/>
+              <a:t>Spanish built stuff for the Indians but they rebelled</a:t>
+            </a:r>
+          </a:p>
+          <a:p>
+            <a:pPr marL="457200" indent="-457200">
+              <a:buFont typeface="Arial" panose="020B0604020202020204" pitchFamily="34" charset="0"/>
+              <a:buChar char="•"/>
+            </a:pPr>
+            <a:r>
+              <a:rPr lang="en-US" sz="2800" dirty="0" smtClean="0"/>
+              <a:t>French wanted to trade instead,</a:t>
+            </a:r>
+          </a:p>
+          <a:p>
+            <a:pPr marL="457200" indent="-457200">
+              <a:buFont typeface="Arial" panose="020B0604020202020204" pitchFamily="34" charset="0"/>
+              <a:buChar char="•"/>
+            </a:pPr>
+            <a:r>
+              <a:rPr lang="en-US" sz="2800" dirty="0" smtClean="0"/>
+              <a:t>Settle in </a:t>
+            </a:r>
+            <a:r>
+              <a:rPr lang="en-US" sz="2800" dirty="0" err="1" smtClean="0"/>
+              <a:t>Louisana</a:t>
+            </a:r>
+            <a:r>
+              <a:rPr lang="en-US" sz="2800" dirty="0" smtClean="0"/>
+              <a:t>, built a town people mixed slaves and criminals made creole culture mix, basically exiles from France</a:t>
+            </a:r>
+          </a:p>
+        </p:txBody>
+      </p:sp>
+    </p:spTree>
+    <p:extLst>
+      <p:ext uri="{BB962C8B-B14F-4D97-AF65-F5344CB8AC3E}">
+        <p14:creationId xmlns:p14="http://schemas.microsoft.com/office/powerpoint/2010/main" val="2668216698"/>
       </p:ext>
     </p:extLst>
   </p:cSld>
@@ -6629,6 +7448,2359 @@
 </p:sld>
 </file>
 
+<file path=ppt/slides/slide20.xml><?xml version="1.0" encoding="utf-8"?>
+<p:sld xmlns:a="http://schemas.openxmlformats.org/drawingml/2006/main" xmlns:r="http://schemas.openxmlformats.org/officeDocument/2006/relationships" xmlns:p="http://schemas.openxmlformats.org/presentationml/2006/main">
+  <p:cSld>
+    <p:spTree>
+      <p:nvGrpSpPr>
+        <p:cNvPr id="1" name=""/>
+        <p:cNvGrpSpPr/>
+        <p:nvPr/>
+      </p:nvGrpSpPr>
+      <p:grpSpPr>
+        <a:xfrm>
+          <a:off x="0" y="0"/>
+          <a:ext cx="0" cy="0"/>
+          <a:chOff x="0" y="0"/>
+          <a:chExt cx="0" cy="0"/>
+        </a:xfrm>
+      </p:grpSpPr>
+      <p:sp>
+        <p:nvSpPr>
+          <p:cNvPr id="5" name="TextBox 4"/>
+          <p:cNvSpPr txBox="1"/>
+          <p:nvPr/>
+        </p:nvSpPr>
+        <p:spPr>
+          <a:xfrm>
+            <a:off x="284015" y="407252"/>
+            <a:ext cx="11620857" cy="5755422"/>
+          </a:xfrm>
+          <a:prstGeom prst="rect">
+            <a:avLst/>
+          </a:prstGeom>
+          <a:noFill/>
+        </p:spPr>
+        <p:txBody>
+          <a:bodyPr wrap="square" rtlCol="0">
+            <a:spAutoFit/>
+          </a:bodyPr>
+          <a:lstStyle/>
+          <a:p>
+            <a:pPr algn="ctr"/>
+            <a:r>
+              <a:rPr lang="en-US" sz="3200" dirty="0" smtClean="0">
+                <a:solidFill>
+                  <a:srgbClr val="FF0000"/>
+                </a:solidFill>
+              </a:rPr>
+              <a:t>English and Dutch Colonial Seaports</a:t>
+            </a:r>
+            <a:endParaRPr lang="en-US" sz="3200" dirty="0" smtClean="0">
+              <a:solidFill>
+                <a:srgbClr val="0070C0"/>
+              </a:solidFill>
+            </a:endParaRPr>
+          </a:p>
+          <a:p>
+            <a:pPr marL="457200" indent="-457200">
+              <a:buFont typeface="Arial" panose="020B0604020202020204" pitchFamily="34" charset="0"/>
+              <a:buChar char="•"/>
+            </a:pPr>
+            <a:r>
+              <a:rPr lang="en-US" sz="2800" dirty="0" smtClean="0">
+                <a:solidFill>
+                  <a:schemeClr val="bg1"/>
+                </a:solidFill>
+              </a:rPr>
+              <a:t>English were </a:t>
+            </a:r>
+            <a:r>
+              <a:rPr lang="en-US" sz="2800" dirty="0" err="1" smtClean="0">
+                <a:solidFill>
+                  <a:schemeClr val="bg1"/>
+                </a:solidFill>
+              </a:rPr>
+              <a:t>trynna</a:t>
+            </a:r>
+            <a:r>
+              <a:rPr lang="en-US" sz="2800" dirty="0" smtClean="0">
+                <a:solidFill>
+                  <a:schemeClr val="bg1"/>
+                </a:solidFill>
+              </a:rPr>
+              <a:t> do a “city on a hill”, but they moved for better water, based of slavery and trading</a:t>
+            </a:r>
+          </a:p>
+          <a:p>
+            <a:pPr marL="457200" indent="-457200">
+              <a:buFont typeface="Arial" panose="020B0604020202020204" pitchFamily="34" charset="0"/>
+              <a:buChar char="•"/>
+            </a:pPr>
+            <a:r>
+              <a:rPr lang="en-US" sz="2800" dirty="0" smtClean="0">
+                <a:solidFill>
+                  <a:schemeClr val="bg1"/>
+                </a:solidFill>
+              </a:rPr>
+              <a:t>Dutch made a trading port in Albany, </a:t>
+            </a:r>
+            <a:r>
+              <a:rPr lang="en-US" sz="2800" dirty="0" err="1" smtClean="0">
+                <a:solidFill>
+                  <a:schemeClr val="bg1"/>
+                </a:solidFill>
+              </a:rPr>
+              <a:t>dutch</a:t>
+            </a:r>
+            <a:r>
+              <a:rPr lang="en-US" sz="2800" dirty="0" smtClean="0">
+                <a:solidFill>
+                  <a:schemeClr val="bg1"/>
+                </a:solidFill>
+              </a:rPr>
+              <a:t> bought land from Indians made New Amsterdam</a:t>
+            </a:r>
+          </a:p>
+          <a:p>
+            <a:pPr marL="457200" indent="-457200">
+              <a:buFont typeface="Arial" panose="020B0604020202020204" pitchFamily="34" charset="0"/>
+              <a:buChar char="•"/>
+            </a:pPr>
+            <a:r>
+              <a:rPr lang="en-US" sz="2800" dirty="0" smtClean="0">
+                <a:solidFill>
+                  <a:schemeClr val="bg1"/>
+                </a:solidFill>
+              </a:rPr>
+              <a:t>Will </a:t>
+            </a:r>
+            <a:r>
+              <a:rPr lang="en-US" sz="2800" dirty="0" err="1" smtClean="0">
+                <a:solidFill>
+                  <a:schemeClr val="bg1"/>
+                </a:solidFill>
+              </a:rPr>
+              <a:t>penn</a:t>
+            </a:r>
+            <a:r>
+              <a:rPr lang="en-US" sz="2800" dirty="0" smtClean="0">
+                <a:solidFill>
+                  <a:schemeClr val="bg1"/>
+                </a:solidFill>
+              </a:rPr>
+              <a:t> made </a:t>
+            </a:r>
+            <a:r>
+              <a:rPr lang="en-US" sz="2800" dirty="0" err="1" smtClean="0">
+                <a:solidFill>
+                  <a:schemeClr val="bg1"/>
+                </a:solidFill>
+              </a:rPr>
+              <a:t>philly</a:t>
+            </a:r>
+            <a:r>
+              <a:rPr lang="en-US" sz="2800" dirty="0" smtClean="0">
+                <a:solidFill>
+                  <a:schemeClr val="bg1"/>
+                </a:solidFill>
+              </a:rPr>
+              <a:t>, religious freedom nice place to live</a:t>
+            </a:r>
+          </a:p>
+          <a:p>
+            <a:pPr marL="457200" indent="-457200">
+              <a:buFont typeface="Arial" panose="020B0604020202020204" pitchFamily="34" charset="0"/>
+              <a:buChar char="•"/>
+            </a:pPr>
+            <a:r>
+              <a:rPr lang="en-US" sz="2800" dirty="0" smtClean="0">
+                <a:solidFill>
+                  <a:schemeClr val="bg1"/>
+                </a:solidFill>
+              </a:rPr>
+              <a:t>Non-religious found Newport and Charleston</a:t>
+            </a:r>
+          </a:p>
+          <a:p>
+            <a:pPr marL="457200" indent="-457200">
+              <a:buFont typeface="Arial" panose="020B0604020202020204" pitchFamily="34" charset="0"/>
+              <a:buChar char="•"/>
+            </a:pPr>
+            <a:r>
+              <a:rPr lang="en-US" sz="2800" dirty="0" smtClean="0">
+                <a:solidFill>
+                  <a:schemeClr val="bg1"/>
+                </a:solidFill>
+              </a:rPr>
+              <a:t>Cities grew fast, seaports didn’t cause no money</a:t>
+            </a:r>
+          </a:p>
+          <a:p>
+            <a:pPr marL="457200" indent="-457200">
+              <a:buFont typeface="Arial" panose="020B0604020202020204" pitchFamily="34" charset="0"/>
+              <a:buChar char="•"/>
+            </a:pPr>
+            <a:r>
+              <a:rPr lang="en-US" sz="2800" dirty="0" smtClean="0">
+                <a:solidFill>
+                  <a:schemeClr val="bg2"/>
+                </a:solidFill>
+              </a:rPr>
+              <a:t>Everybody based of transatlantic trade</a:t>
+            </a:r>
+          </a:p>
+          <a:p>
+            <a:pPr marL="457200" indent="-457200">
+              <a:buFont typeface="Arial" panose="020B0604020202020204" pitchFamily="34" charset="0"/>
+              <a:buChar char="•"/>
+            </a:pPr>
+            <a:r>
+              <a:rPr lang="en-US" sz="2800" dirty="0" smtClean="0">
+                <a:solidFill>
+                  <a:schemeClr val="bg2"/>
+                </a:solidFill>
+              </a:rPr>
+              <a:t>European Officials couldn’t control things</a:t>
+            </a:r>
+          </a:p>
+          <a:p>
+            <a:pPr marL="457200" indent="-457200">
+              <a:buFont typeface="Arial" panose="020B0604020202020204" pitchFamily="34" charset="0"/>
+              <a:buChar char="•"/>
+            </a:pPr>
+            <a:r>
+              <a:rPr lang="en-US" sz="2800" dirty="0" smtClean="0"/>
+              <a:t>South didn’t need ports because they had rivers and slaves </a:t>
+            </a:r>
+          </a:p>
+          <a:p>
+            <a:pPr marL="457200" indent="-457200">
+              <a:buFont typeface="Arial" panose="020B0604020202020204" pitchFamily="34" charset="0"/>
+              <a:buChar char="•"/>
+            </a:pPr>
+            <a:r>
+              <a:rPr lang="en-US" sz="2800" dirty="0" smtClean="0"/>
+              <a:t>Ports w/ </a:t>
+            </a:r>
+            <a:r>
+              <a:rPr lang="en-US" sz="2800" dirty="0" err="1" smtClean="0"/>
+              <a:t>freshwtr</a:t>
+            </a:r>
+            <a:r>
+              <a:rPr lang="en-US" sz="2800" dirty="0" smtClean="0"/>
+              <a:t> no wood-eating barnacles seawater had barnacles, storms also play a factor in ports</a:t>
+            </a:r>
+            <a:endParaRPr lang="en-US" sz="2800" dirty="0"/>
+          </a:p>
+        </p:txBody>
+      </p:sp>
+    </p:spTree>
+    <p:extLst>
+      <p:ext uri="{BB962C8B-B14F-4D97-AF65-F5344CB8AC3E}">
+        <p14:creationId xmlns:p14="http://schemas.microsoft.com/office/powerpoint/2010/main" val="4143283873"/>
+      </p:ext>
+    </p:extLst>
+  </p:cSld>
+  <p:clrMapOvr>
+    <a:masterClrMapping/>
+  </p:clrMapOvr>
+  <p:timing>
+    <p:tnLst>
+      <p:par>
+        <p:cTn id="1" dur="indefinite" restart="never" nodeType="tmRoot"/>
+      </p:par>
+    </p:tnLst>
+  </p:timing>
+</p:sld>
+</file>
+
+<file path=ppt/slides/slide21.xml><?xml version="1.0" encoding="utf-8"?>
+<p:sld xmlns:a="http://schemas.openxmlformats.org/drawingml/2006/main" xmlns:r="http://schemas.openxmlformats.org/officeDocument/2006/relationships" xmlns:p="http://schemas.openxmlformats.org/presentationml/2006/main">
+  <p:cSld>
+    <p:spTree>
+      <p:nvGrpSpPr>
+        <p:cNvPr id="1" name=""/>
+        <p:cNvGrpSpPr/>
+        <p:nvPr/>
+      </p:nvGrpSpPr>
+      <p:grpSpPr>
+        <a:xfrm>
+          <a:off x="0" y="0"/>
+          <a:ext cx="0" cy="0"/>
+          <a:chOff x="0" y="0"/>
+          <a:chExt cx="0" cy="0"/>
+        </a:xfrm>
+      </p:grpSpPr>
+      <p:sp>
+        <p:nvSpPr>
+          <p:cNvPr id="5" name="TextBox 4"/>
+          <p:cNvSpPr txBox="1"/>
+          <p:nvPr/>
+        </p:nvSpPr>
+        <p:spPr>
+          <a:xfrm>
+            <a:off x="284015" y="407252"/>
+            <a:ext cx="11620857" cy="6186309"/>
+          </a:xfrm>
+          <a:prstGeom prst="rect">
+            <a:avLst/>
+          </a:prstGeom>
+          <a:noFill/>
+        </p:spPr>
+        <p:txBody>
+          <a:bodyPr wrap="square" rtlCol="0">
+            <a:spAutoFit/>
+          </a:bodyPr>
+          <a:lstStyle/>
+          <a:p>
+            <a:pPr algn="ctr"/>
+            <a:r>
+              <a:rPr lang="en-US" sz="3200" dirty="0" smtClean="0">
+                <a:solidFill>
+                  <a:srgbClr val="FF0000"/>
+                </a:solidFill>
+              </a:rPr>
+              <a:t>Traditions of Self Gov’t</a:t>
+            </a:r>
+            <a:endParaRPr lang="en-US" sz="3200" dirty="0" smtClean="0">
+              <a:solidFill>
+                <a:srgbClr val="0070C0"/>
+              </a:solidFill>
+            </a:endParaRPr>
+          </a:p>
+          <a:p>
+            <a:pPr marL="457200" indent="-457200">
+              <a:buFont typeface="Arial" panose="020B0604020202020204" pitchFamily="34" charset="0"/>
+              <a:buChar char="•"/>
+            </a:pPr>
+            <a:r>
+              <a:rPr lang="en-US" sz="2800" dirty="0" smtClean="0">
+                <a:solidFill>
+                  <a:schemeClr val="bg1"/>
+                </a:solidFill>
+              </a:rPr>
+              <a:t>England didn’t interfere political parties were bad idea, laws dealt w/ trade</a:t>
+            </a:r>
+          </a:p>
+          <a:p>
+            <a:pPr marL="457200" indent="-457200">
+              <a:buFont typeface="Arial" panose="020B0604020202020204" pitchFamily="34" charset="0"/>
+              <a:buChar char="•"/>
+            </a:pPr>
+            <a:r>
+              <a:rPr lang="en-US" sz="2800" dirty="0" err="1" smtClean="0">
+                <a:solidFill>
+                  <a:schemeClr val="bg1"/>
+                </a:solidFill>
+              </a:rPr>
+              <a:t>Charstelon</a:t>
+            </a:r>
+            <a:r>
+              <a:rPr lang="en-US" sz="2800" dirty="0">
+                <a:solidFill>
+                  <a:schemeClr val="bg1"/>
+                </a:solidFill>
+              </a:rPr>
+              <a:t> </a:t>
+            </a:r>
+            <a:r>
+              <a:rPr lang="en-US" sz="2800" dirty="0" smtClean="0">
+                <a:solidFill>
+                  <a:schemeClr val="bg1"/>
+                </a:solidFill>
+              </a:rPr>
+              <a:t>officials don’t care about city</a:t>
+            </a:r>
+          </a:p>
+          <a:p>
+            <a:pPr marL="457200" indent="-457200">
+              <a:buFont typeface="Arial" panose="020B0604020202020204" pitchFamily="34" charset="0"/>
+              <a:buChar char="•"/>
+            </a:pPr>
+            <a:r>
+              <a:rPr lang="en-US" sz="2800" dirty="0" smtClean="0">
+                <a:solidFill>
+                  <a:schemeClr val="bg1"/>
+                </a:solidFill>
+              </a:rPr>
+              <a:t>They believed in </a:t>
+            </a:r>
+            <a:r>
+              <a:rPr lang="en-US" sz="2800" dirty="0" err="1" smtClean="0">
+                <a:solidFill>
+                  <a:schemeClr val="bg1"/>
+                </a:solidFill>
+              </a:rPr>
+              <a:t>Hierachy</a:t>
+            </a:r>
+            <a:r>
+              <a:rPr lang="en-US" sz="2800" dirty="0" smtClean="0">
+                <a:solidFill>
+                  <a:schemeClr val="bg1"/>
+                </a:solidFill>
+              </a:rPr>
+              <a:t>, which takes care of each other like in  </a:t>
+            </a:r>
+            <a:r>
+              <a:rPr lang="en-US" sz="2800" dirty="0" err="1" smtClean="0">
+                <a:solidFill>
+                  <a:schemeClr val="bg1"/>
+                </a:solidFill>
+              </a:rPr>
+              <a:t>philly</a:t>
+            </a:r>
+            <a:r>
+              <a:rPr lang="en-US" sz="2800" dirty="0" smtClean="0">
+                <a:solidFill>
+                  <a:schemeClr val="bg1"/>
+                </a:solidFill>
+              </a:rPr>
+              <a:t> and NY, Boston and </a:t>
+            </a:r>
+            <a:r>
+              <a:rPr lang="en-US" sz="2800" dirty="0" err="1" smtClean="0">
+                <a:solidFill>
+                  <a:schemeClr val="bg1"/>
+                </a:solidFill>
+              </a:rPr>
+              <a:t>Phiily</a:t>
+            </a:r>
+            <a:r>
+              <a:rPr lang="en-US" sz="2800" dirty="0" smtClean="0">
+                <a:solidFill>
+                  <a:schemeClr val="bg1"/>
+                </a:solidFill>
+              </a:rPr>
+              <a:t> reg. people come together to plan things</a:t>
+            </a:r>
+          </a:p>
+          <a:p>
+            <a:pPr marL="457200" indent="-457200">
+              <a:buFont typeface="Arial" panose="020B0604020202020204" pitchFamily="34" charset="0"/>
+              <a:buChar char="•"/>
+            </a:pPr>
+            <a:r>
+              <a:rPr lang="en-US" sz="2800" dirty="0" smtClean="0">
+                <a:solidFill>
+                  <a:schemeClr val="bg1"/>
+                </a:solidFill>
+              </a:rPr>
+              <a:t>Same thing w/ France n Spain</a:t>
+            </a:r>
+          </a:p>
+          <a:p>
+            <a:pPr marL="457200" indent="-457200">
+              <a:buFont typeface="Arial" panose="020B0604020202020204" pitchFamily="34" charset="0"/>
+              <a:buChar char="•"/>
+            </a:pPr>
+            <a:r>
+              <a:rPr lang="en-US" sz="2800" dirty="0" smtClean="0">
+                <a:solidFill>
+                  <a:schemeClr val="bg1"/>
+                </a:solidFill>
+              </a:rPr>
+              <a:t>There were revolts in Boston,</a:t>
+            </a:r>
+          </a:p>
+          <a:p>
+            <a:pPr marL="457200" indent="-457200">
+              <a:buFont typeface="Arial" panose="020B0604020202020204" pitchFamily="34" charset="0"/>
+              <a:buChar char="•"/>
+            </a:pPr>
+            <a:r>
+              <a:rPr lang="en-US" sz="2800" dirty="0" smtClean="0">
+                <a:solidFill>
+                  <a:schemeClr val="bg1"/>
+                </a:solidFill>
+              </a:rPr>
+              <a:t>People tried to take advantage of people always led to revolt</a:t>
+            </a:r>
+          </a:p>
+          <a:p>
+            <a:pPr marL="457200" indent="-457200">
+              <a:buFont typeface="Arial" panose="020B0604020202020204" pitchFamily="34" charset="0"/>
+              <a:buChar char="•"/>
+            </a:pPr>
+            <a:r>
+              <a:rPr lang="en-US" sz="2800" dirty="0" smtClean="0"/>
+              <a:t>New Orleans Creole elite felt cheated, kicked out French , Spanish showed up and they gave up</a:t>
+            </a:r>
+          </a:p>
+          <a:p>
+            <a:pPr marL="457200" indent="-457200">
+              <a:buFont typeface="Arial" panose="020B0604020202020204" pitchFamily="34" charset="0"/>
+              <a:buChar char="•"/>
+            </a:pPr>
+            <a:endParaRPr lang="en-US" sz="2800" dirty="0" smtClean="0"/>
+          </a:p>
+          <a:p>
+            <a:endParaRPr lang="en-US" sz="2800" dirty="0" smtClean="0"/>
+          </a:p>
+        </p:txBody>
+      </p:sp>
+    </p:spTree>
+    <p:extLst>
+      <p:ext uri="{BB962C8B-B14F-4D97-AF65-F5344CB8AC3E}">
+        <p14:creationId xmlns:p14="http://schemas.microsoft.com/office/powerpoint/2010/main" val="3528269628"/>
+      </p:ext>
+    </p:extLst>
+  </p:cSld>
+  <p:clrMapOvr>
+    <a:masterClrMapping/>
+  </p:clrMapOvr>
+  <p:timing>
+    <p:tnLst>
+      <p:par>
+        <p:cTn id="1" dur="indefinite" restart="never" nodeType="tmRoot"/>
+      </p:par>
+    </p:tnLst>
+  </p:timing>
+</p:sld>
+</file>
+
+<file path=ppt/slides/slide22.xml><?xml version="1.0" encoding="utf-8"?>
+<p:sld xmlns:a="http://schemas.openxmlformats.org/drawingml/2006/main" xmlns:r="http://schemas.openxmlformats.org/officeDocument/2006/relationships" xmlns:p="http://schemas.openxmlformats.org/presentationml/2006/main">
+  <p:cSld>
+    <p:spTree>
+      <p:nvGrpSpPr>
+        <p:cNvPr id="1" name=""/>
+        <p:cNvGrpSpPr/>
+        <p:nvPr/>
+      </p:nvGrpSpPr>
+      <p:grpSpPr>
+        <a:xfrm>
+          <a:off x="0" y="0"/>
+          <a:ext cx="0" cy="0"/>
+          <a:chOff x="0" y="0"/>
+          <a:chExt cx="0" cy="0"/>
+        </a:xfrm>
+      </p:grpSpPr>
+      <p:sp>
+        <p:nvSpPr>
+          <p:cNvPr id="5" name="TextBox 4"/>
+          <p:cNvSpPr txBox="1"/>
+          <p:nvPr/>
+        </p:nvSpPr>
+        <p:spPr>
+          <a:xfrm>
+            <a:off x="294773" y="106038"/>
+            <a:ext cx="11620857" cy="7048083"/>
+          </a:xfrm>
+          <a:prstGeom prst="rect">
+            <a:avLst/>
+          </a:prstGeom>
+          <a:noFill/>
+        </p:spPr>
+        <p:txBody>
+          <a:bodyPr wrap="square" rtlCol="0">
+            <a:spAutoFit/>
+          </a:bodyPr>
+          <a:lstStyle/>
+          <a:p>
+            <a:pPr algn="ctr"/>
+            <a:r>
+              <a:rPr lang="en-US" sz="3200" dirty="0" smtClean="0">
+                <a:solidFill>
+                  <a:srgbClr val="FF0000"/>
+                </a:solidFill>
+              </a:rPr>
+              <a:t>Growing Pains of Atlantic Seaports</a:t>
+            </a:r>
+            <a:endParaRPr lang="en-US" sz="3200" dirty="0" smtClean="0">
+              <a:solidFill>
+                <a:srgbClr val="0070C0"/>
+              </a:solidFill>
+            </a:endParaRPr>
+          </a:p>
+          <a:p>
+            <a:pPr marL="457200" indent="-457200">
+              <a:buFont typeface="Arial" panose="020B0604020202020204" pitchFamily="34" charset="0"/>
+              <a:buChar char="•"/>
+            </a:pPr>
+            <a:r>
+              <a:rPr lang="en-US" sz="2800" dirty="0" smtClean="0">
+                <a:solidFill>
+                  <a:schemeClr val="bg1"/>
+                </a:solidFill>
+              </a:rPr>
+              <a:t>Seaports like a mix of city and village</a:t>
+            </a:r>
+          </a:p>
+          <a:p>
+            <a:pPr marL="457200" indent="-457200">
+              <a:buFont typeface="Arial" panose="020B0604020202020204" pitchFamily="34" charset="0"/>
+              <a:buChar char="•"/>
+            </a:pPr>
+            <a:r>
+              <a:rPr lang="en-US" sz="2800" dirty="0" smtClean="0">
+                <a:solidFill>
+                  <a:schemeClr val="bg1"/>
+                </a:solidFill>
+              </a:rPr>
+              <a:t>Urban growth led to bad things you know</a:t>
+            </a:r>
+          </a:p>
+          <a:p>
+            <a:pPr marL="457200" indent="-457200">
+              <a:buFont typeface="Arial" panose="020B0604020202020204" pitchFamily="34" charset="0"/>
+              <a:buChar char="•"/>
+            </a:pPr>
+            <a:r>
+              <a:rPr lang="en-US" sz="2800" dirty="0" smtClean="0">
+                <a:solidFill>
+                  <a:schemeClr val="bg1"/>
+                </a:solidFill>
+              </a:rPr>
+              <a:t>People built streets n buildings wherever in 1700s gov’t said “enough”</a:t>
+            </a:r>
+          </a:p>
+          <a:p>
+            <a:pPr marL="457200" indent="-457200">
+              <a:buFont typeface="Arial" panose="020B0604020202020204" pitchFamily="34" charset="0"/>
+              <a:buChar char="•"/>
+            </a:pPr>
+            <a:r>
+              <a:rPr lang="en-US" sz="2800" dirty="0" smtClean="0">
+                <a:solidFill>
+                  <a:schemeClr val="bg1"/>
+                </a:solidFill>
+              </a:rPr>
+              <a:t>In city people feared fire, it would take down the city</a:t>
+            </a:r>
+          </a:p>
+          <a:p>
+            <a:pPr marL="457200" indent="-457200">
+              <a:buFont typeface="Arial" panose="020B0604020202020204" pitchFamily="34" charset="0"/>
+              <a:buChar char="•"/>
+            </a:pPr>
+            <a:r>
+              <a:rPr lang="en-US" sz="2800" dirty="0" smtClean="0">
+                <a:solidFill>
+                  <a:schemeClr val="bg1"/>
+                </a:solidFill>
+              </a:rPr>
+              <a:t>Towns didn’t get a fire station till they got burned down badly</a:t>
+            </a:r>
+          </a:p>
+          <a:p>
+            <a:pPr marL="457200" indent="-457200">
+              <a:buFont typeface="Arial" panose="020B0604020202020204" pitchFamily="34" charset="0"/>
+              <a:buChar char="•"/>
+            </a:pPr>
+            <a:r>
+              <a:rPr lang="en-US" sz="2800" dirty="0" smtClean="0">
+                <a:solidFill>
+                  <a:schemeClr val="bg2"/>
+                </a:solidFill>
+              </a:rPr>
+              <a:t>Police started as watchmen who didn’t care about their jobs and were low paid. They became prank targets instead</a:t>
+            </a:r>
+          </a:p>
+          <a:p>
+            <a:pPr marL="457200" indent="-457200">
+              <a:buFont typeface="Arial" panose="020B0604020202020204" pitchFamily="34" charset="0"/>
+              <a:buChar char="•"/>
+            </a:pPr>
+            <a:r>
+              <a:rPr lang="en-US" sz="2800" dirty="0" smtClean="0">
+                <a:solidFill>
+                  <a:schemeClr val="bg2"/>
+                </a:solidFill>
+              </a:rPr>
+              <a:t>People just tossed waste into the streets then</a:t>
+            </a:r>
+          </a:p>
+          <a:p>
+            <a:pPr marL="457200" indent="-457200">
+              <a:buFont typeface="Arial" panose="020B0604020202020204" pitchFamily="34" charset="0"/>
+              <a:buChar char="•"/>
+            </a:pPr>
+            <a:r>
+              <a:rPr lang="en-US" sz="2800" dirty="0" smtClean="0"/>
+              <a:t>To deal w/ sickness </a:t>
+            </a:r>
+            <a:r>
+              <a:rPr lang="en-US" sz="2800" dirty="0" err="1" smtClean="0"/>
+              <a:t>ppl</a:t>
+            </a:r>
+            <a:r>
+              <a:rPr lang="en-US" sz="2800" dirty="0" smtClean="0"/>
+              <a:t> got checked </a:t>
+            </a:r>
+          </a:p>
+          <a:p>
+            <a:pPr marL="457200" indent="-457200">
+              <a:buFont typeface="Arial" panose="020B0604020202020204" pitchFamily="34" charset="0"/>
+              <a:buChar char="•"/>
+            </a:pPr>
+            <a:r>
+              <a:rPr lang="en-US" sz="2800" dirty="0" err="1" smtClean="0"/>
+              <a:t>Ppl</a:t>
+            </a:r>
+            <a:r>
+              <a:rPr lang="en-US" sz="2800" dirty="0" smtClean="0"/>
+              <a:t> helped poverty widows, orphans and disabled were taken care of</a:t>
+            </a:r>
+          </a:p>
+          <a:p>
+            <a:pPr marL="457200" indent="-457200">
+              <a:buFont typeface="Arial" panose="020B0604020202020204" pitchFamily="34" charset="0"/>
+              <a:buChar char="•"/>
+            </a:pPr>
+            <a:r>
+              <a:rPr lang="en-US" sz="2800" dirty="0" smtClean="0"/>
+              <a:t>As cities grew so did # poor people </a:t>
+            </a:r>
+          </a:p>
+          <a:p>
+            <a:pPr marL="457200" indent="-457200">
+              <a:buFont typeface="Arial" panose="020B0604020202020204" pitchFamily="34" charset="0"/>
+              <a:buChar char="•"/>
+            </a:pPr>
+            <a:r>
+              <a:rPr lang="en-US" sz="2800" dirty="0" smtClean="0"/>
+              <a:t>To stop it, no immigrants w/ families, but they needed workers</a:t>
+            </a:r>
+          </a:p>
+          <a:p>
+            <a:endParaRPr lang="en-US" sz="2800" dirty="0" smtClean="0"/>
+          </a:p>
+        </p:txBody>
+      </p:sp>
+    </p:spTree>
+    <p:extLst>
+      <p:ext uri="{BB962C8B-B14F-4D97-AF65-F5344CB8AC3E}">
+        <p14:creationId xmlns:p14="http://schemas.microsoft.com/office/powerpoint/2010/main" val="2062363294"/>
+      </p:ext>
+    </p:extLst>
+  </p:cSld>
+  <p:clrMapOvr>
+    <a:masterClrMapping/>
+  </p:clrMapOvr>
+  <p:timing>
+    <p:tnLst>
+      <p:par>
+        <p:cTn id="1" dur="indefinite" restart="never" nodeType="tmRoot"/>
+      </p:par>
+    </p:tnLst>
+  </p:timing>
+</p:sld>
+</file>
+
+<file path=ppt/slides/slide23.xml><?xml version="1.0" encoding="utf-8"?>
+<p:sld xmlns:a="http://schemas.openxmlformats.org/drawingml/2006/main" xmlns:r="http://schemas.openxmlformats.org/officeDocument/2006/relationships" xmlns:p="http://schemas.openxmlformats.org/presentationml/2006/main">
+  <p:cSld>
+    <p:spTree>
+      <p:nvGrpSpPr>
+        <p:cNvPr id="1" name=""/>
+        <p:cNvGrpSpPr/>
+        <p:nvPr/>
+      </p:nvGrpSpPr>
+      <p:grpSpPr>
+        <a:xfrm>
+          <a:off x="0" y="0"/>
+          <a:ext cx="0" cy="0"/>
+          <a:chOff x="0" y="0"/>
+          <a:chExt cx="0" cy="0"/>
+        </a:xfrm>
+      </p:grpSpPr>
+      <p:sp>
+        <p:nvSpPr>
+          <p:cNvPr id="5" name="TextBox 4"/>
+          <p:cNvSpPr txBox="1"/>
+          <p:nvPr/>
+        </p:nvSpPr>
+        <p:spPr>
+          <a:xfrm>
+            <a:off x="219469" y="0"/>
+            <a:ext cx="11620857" cy="6801862"/>
+          </a:xfrm>
+          <a:prstGeom prst="rect">
+            <a:avLst/>
+          </a:prstGeom>
+          <a:noFill/>
+        </p:spPr>
+        <p:txBody>
+          <a:bodyPr wrap="square" rtlCol="0">
+            <a:spAutoFit/>
+          </a:bodyPr>
+          <a:lstStyle/>
+          <a:p>
+            <a:pPr algn="ctr"/>
+            <a:r>
+              <a:rPr lang="en-US" sz="2800" dirty="0" smtClean="0">
+                <a:solidFill>
+                  <a:srgbClr val="FF0000"/>
+                </a:solidFill>
+              </a:rPr>
+              <a:t>The Social Mosaic</a:t>
+            </a:r>
+            <a:endParaRPr lang="en-US" sz="2800" dirty="0" smtClean="0">
+              <a:solidFill>
+                <a:srgbClr val="0070C0"/>
+              </a:solidFill>
+            </a:endParaRPr>
+          </a:p>
+          <a:p>
+            <a:pPr marL="457200" indent="-457200">
+              <a:buFont typeface="Arial" panose="020B0604020202020204" pitchFamily="34" charset="0"/>
+              <a:buChar char="•"/>
+            </a:pPr>
+            <a:r>
+              <a:rPr lang="en-US" sz="2000" dirty="0" smtClean="0">
+                <a:solidFill>
+                  <a:schemeClr val="bg1"/>
+                </a:solidFill>
+              </a:rPr>
+              <a:t>Cities became a melting pot, </a:t>
+            </a:r>
+            <a:r>
+              <a:rPr lang="en-US" sz="2000" dirty="0" err="1" smtClean="0">
+                <a:solidFill>
+                  <a:schemeClr val="bg1"/>
+                </a:solidFill>
+              </a:rPr>
+              <a:t>ppl</a:t>
+            </a:r>
+            <a:r>
+              <a:rPr lang="en-US" sz="2000" dirty="0" smtClean="0">
+                <a:solidFill>
+                  <a:schemeClr val="bg1"/>
+                </a:solidFill>
+              </a:rPr>
+              <a:t> spoke many languages</a:t>
+            </a:r>
+          </a:p>
+          <a:p>
+            <a:pPr marL="457200" indent="-457200">
+              <a:buFont typeface="Arial" panose="020B0604020202020204" pitchFamily="34" charset="0"/>
+              <a:buChar char="•"/>
+            </a:pPr>
+            <a:r>
+              <a:rPr lang="en-US" sz="2000" dirty="0" smtClean="0">
+                <a:solidFill>
+                  <a:schemeClr val="bg1"/>
+                </a:solidFill>
+              </a:rPr>
+              <a:t>Ruling class were investors ,gov’t official and merchants</a:t>
+            </a:r>
+          </a:p>
+          <a:p>
+            <a:pPr marL="457200" indent="-457200">
+              <a:buFont typeface="Arial" panose="020B0604020202020204" pitchFamily="34" charset="0"/>
+              <a:buChar char="•"/>
+            </a:pPr>
+            <a:r>
+              <a:rPr lang="en-US" sz="2000" dirty="0" smtClean="0">
+                <a:solidFill>
+                  <a:schemeClr val="bg1"/>
+                </a:solidFill>
+              </a:rPr>
+              <a:t>Wealthy wives pay poor wives to do domestic work</a:t>
+            </a:r>
+          </a:p>
+          <a:p>
+            <a:pPr marL="457200" indent="-457200">
+              <a:buFont typeface="Arial" panose="020B0604020202020204" pitchFamily="34" charset="0"/>
+              <a:buChar char="•"/>
+            </a:pPr>
+            <a:r>
+              <a:rPr lang="en-US" sz="2000" dirty="0" smtClean="0">
+                <a:solidFill>
+                  <a:schemeClr val="bg1"/>
+                </a:solidFill>
+              </a:rPr>
+              <a:t>Then you got middle class</a:t>
+            </a:r>
+          </a:p>
+          <a:p>
+            <a:pPr marL="457200" indent="-457200">
+              <a:buFont typeface="Arial" panose="020B0604020202020204" pitchFamily="34" charset="0"/>
+              <a:buChar char="•"/>
+            </a:pPr>
+            <a:r>
+              <a:rPr lang="en-US" sz="2000" dirty="0" smtClean="0">
+                <a:solidFill>
+                  <a:schemeClr val="bg1"/>
+                </a:solidFill>
+              </a:rPr>
+              <a:t>Middle class suffer from bad </a:t>
+            </a:r>
+            <a:r>
+              <a:rPr lang="en-US" sz="2000" dirty="0" err="1" smtClean="0">
+                <a:solidFill>
+                  <a:schemeClr val="bg1"/>
+                </a:solidFill>
+              </a:rPr>
+              <a:t>econmomy</a:t>
+            </a:r>
+            <a:endParaRPr lang="en-US" sz="2000" dirty="0" smtClean="0">
+              <a:solidFill>
+                <a:schemeClr val="bg1"/>
+              </a:solidFill>
+            </a:endParaRPr>
+          </a:p>
+          <a:p>
+            <a:pPr marL="457200" indent="-457200">
+              <a:buFont typeface="Arial" panose="020B0604020202020204" pitchFamily="34" charset="0"/>
+              <a:buChar char="•"/>
+            </a:pPr>
+            <a:r>
+              <a:rPr lang="en-US" sz="2000" dirty="0" smtClean="0">
+                <a:solidFill>
+                  <a:schemeClr val="bg1"/>
+                </a:solidFill>
+              </a:rPr>
+              <a:t>Then unskilled laborers who own irrelevant amounts </a:t>
+            </a:r>
+          </a:p>
+          <a:p>
+            <a:pPr marL="457200" indent="-457200">
+              <a:buFont typeface="Arial" panose="020B0604020202020204" pitchFamily="34" charset="0"/>
+              <a:buChar char="•"/>
+            </a:pPr>
+            <a:r>
+              <a:rPr lang="en-US" sz="2000" dirty="0" smtClean="0">
+                <a:solidFill>
+                  <a:schemeClr val="bg1"/>
+                </a:solidFill>
+              </a:rPr>
+              <a:t>Then free blacks, servants from Europe and slaves</a:t>
+            </a:r>
+          </a:p>
+          <a:p>
+            <a:pPr marL="457200" indent="-457200">
+              <a:buFont typeface="Arial" panose="020B0604020202020204" pitchFamily="34" charset="0"/>
+              <a:buChar char="•"/>
+            </a:pPr>
+            <a:r>
+              <a:rPr lang="en-US" sz="2000" dirty="0" smtClean="0">
+                <a:solidFill>
+                  <a:schemeClr val="bg1"/>
+                </a:solidFill>
+              </a:rPr>
+              <a:t>There were also Indian slaves but nothing got done</a:t>
+            </a:r>
+          </a:p>
+          <a:p>
+            <a:pPr marL="457200" indent="-457200">
+              <a:buFont typeface="Arial" panose="020B0604020202020204" pitchFamily="34" charset="0"/>
+              <a:buChar char="•"/>
+            </a:pPr>
+            <a:r>
+              <a:rPr lang="en-US" sz="2000" dirty="0" smtClean="0">
+                <a:solidFill>
+                  <a:schemeClr val="bg1"/>
+                </a:solidFill>
+              </a:rPr>
+              <a:t>Up north slaves were a sign of wealth, they worked the nonskilled jobs</a:t>
+            </a:r>
+          </a:p>
+          <a:p>
+            <a:pPr marL="457200" indent="-457200">
+              <a:buFont typeface="Arial" panose="020B0604020202020204" pitchFamily="34" charset="0"/>
+              <a:buChar char="•"/>
+            </a:pPr>
+            <a:r>
+              <a:rPr lang="en-US" sz="2000" dirty="0" smtClean="0">
+                <a:solidFill>
+                  <a:schemeClr val="bg1"/>
+                </a:solidFill>
+              </a:rPr>
+              <a:t>They had no place to put slaves in cities however so they gave them freedom</a:t>
+            </a:r>
+          </a:p>
+          <a:p>
+            <a:pPr marL="457200" indent="-457200">
+              <a:buFont typeface="Arial" panose="020B0604020202020204" pitchFamily="34" charset="0"/>
+              <a:buChar char="•"/>
+            </a:pPr>
+            <a:r>
+              <a:rPr lang="en-US" sz="2000" dirty="0" smtClean="0">
+                <a:solidFill>
+                  <a:schemeClr val="bg1"/>
+                </a:solidFill>
+              </a:rPr>
+              <a:t>Slaves did the work in the South </a:t>
+            </a:r>
+            <a:r>
+              <a:rPr lang="en-US" sz="2000" dirty="0" err="1" smtClean="0">
+                <a:solidFill>
+                  <a:schemeClr val="bg1"/>
+                </a:solidFill>
+              </a:rPr>
+              <a:t>tho</a:t>
+            </a:r>
+            <a:r>
+              <a:rPr lang="en-US" sz="2000" dirty="0" smtClean="0">
+                <a:solidFill>
+                  <a:schemeClr val="bg1"/>
+                </a:solidFill>
+              </a:rPr>
+              <a:t>, but its claimed they lived like the white people did at first</a:t>
+            </a:r>
+          </a:p>
+          <a:p>
+            <a:pPr marL="457200" indent="-457200">
+              <a:buFont typeface="Arial" panose="020B0604020202020204" pitchFamily="34" charset="0"/>
+              <a:buChar char="•"/>
+            </a:pPr>
+            <a:r>
+              <a:rPr lang="en-US" sz="2000" dirty="0" smtClean="0">
+                <a:solidFill>
+                  <a:schemeClr val="bg1"/>
+                </a:solidFill>
+              </a:rPr>
+              <a:t>Then slaves started to revolt and white people got scared</a:t>
+            </a:r>
+          </a:p>
+          <a:p>
+            <a:pPr marL="457200" indent="-457200">
+              <a:buFont typeface="Arial" panose="020B0604020202020204" pitchFamily="34" charset="0"/>
+              <a:buChar char="•"/>
+            </a:pPr>
+            <a:r>
+              <a:rPr lang="en-US" sz="2000" dirty="0" smtClean="0">
+                <a:solidFill>
+                  <a:schemeClr val="bg1"/>
+                </a:solidFill>
+              </a:rPr>
+              <a:t>Woman became leaders because gov’t didn’t </a:t>
+            </a:r>
+            <a:r>
+              <a:rPr lang="en-US" sz="2000" dirty="0" err="1" smtClean="0">
+                <a:solidFill>
+                  <a:schemeClr val="bg1"/>
+                </a:solidFill>
+              </a:rPr>
+              <a:t>wanna</a:t>
+            </a:r>
+            <a:r>
+              <a:rPr lang="en-US" sz="2000" dirty="0" smtClean="0">
+                <a:solidFill>
+                  <a:schemeClr val="bg1"/>
+                </a:solidFill>
+              </a:rPr>
+              <a:t> take care of them anymore</a:t>
+            </a:r>
+          </a:p>
+          <a:p>
+            <a:pPr marL="457200" indent="-457200">
+              <a:buFont typeface="Arial" panose="020B0604020202020204" pitchFamily="34" charset="0"/>
+              <a:buChar char="•"/>
+            </a:pPr>
+            <a:r>
+              <a:rPr lang="en-US" sz="2000" dirty="0" smtClean="0"/>
+              <a:t>Unmarried women got more independence, they held jobs like teaching and carpentry and did things too</a:t>
+            </a:r>
+          </a:p>
+          <a:p>
+            <a:pPr marL="457200" indent="-457200">
+              <a:buFont typeface="Arial" panose="020B0604020202020204" pitchFamily="34" charset="0"/>
+              <a:buChar char="•"/>
+            </a:pPr>
+            <a:r>
+              <a:rPr lang="en-US" sz="2000" dirty="0" smtClean="0"/>
+              <a:t>When colonials want independence women were losing it</a:t>
+            </a:r>
+          </a:p>
+          <a:p>
+            <a:pPr marL="457200" indent="-457200">
+              <a:buFont typeface="Arial" panose="020B0604020202020204" pitchFamily="34" charset="0"/>
+              <a:buChar char="•"/>
+            </a:pPr>
+            <a:r>
+              <a:rPr lang="en-US" sz="2000" dirty="0" smtClean="0"/>
+              <a:t>Historian Mary Beth Norton Women didn’t know about money, men didn’t know how to deal w/ a house, urban life made it worse</a:t>
+            </a:r>
+            <a:endParaRPr lang="en-US" sz="2400" dirty="0" smtClean="0"/>
+          </a:p>
+          <a:p>
+            <a:pPr marL="457200" indent="-457200">
+              <a:buFont typeface="Arial" panose="020B0604020202020204" pitchFamily="34" charset="0"/>
+              <a:buChar char="•"/>
+            </a:pPr>
+            <a:endParaRPr lang="en-US" sz="2800" dirty="0" smtClean="0"/>
+          </a:p>
+        </p:txBody>
+      </p:sp>
+    </p:spTree>
+    <p:extLst>
+      <p:ext uri="{BB962C8B-B14F-4D97-AF65-F5344CB8AC3E}">
+        <p14:creationId xmlns:p14="http://schemas.microsoft.com/office/powerpoint/2010/main" val="4087598746"/>
+      </p:ext>
+    </p:extLst>
+  </p:cSld>
+  <p:clrMapOvr>
+    <a:masterClrMapping/>
+  </p:clrMapOvr>
+  <p:timing>
+    <p:tnLst>
+      <p:par>
+        <p:cTn id="1" dur="indefinite" restart="never" nodeType="tmRoot"/>
+      </p:par>
+    </p:tnLst>
+  </p:timing>
+</p:sld>
+</file>
+
+<file path=ppt/slides/slide24.xml><?xml version="1.0" encoding="utf-8"?>
+<p:sld xmlns:a="http://schemas.openxmlformats.org/drawingml/2006/main" xmlns:r="http://schemas.openxmlformats.org/officeDocument/2006/relationships" xmlns:p="http://schemas.openxmlformats.org/presentationml/2006/main">
+  <p:cSld>
+    <p:spTree>
+      <p:nvGrpSpPr>
+        <p:cNvPr id="1" name=""/>
+        <p:cNvGrpSpPr/>
+        <p:nvPr/>
+      </p:nvGrpSpPr>
+      <p:grpSpPr>
+        <a:xfrm>
+          <a:off x="0" y="0"/>
+          <a:ext cx="0" cy="0"/>
+          <a:chOff x="0" y="0"/>
+          <a:chExt cx="0" cy="0"/>
+        </a:xfrm>
+      </p:grpSpPr>
+      <p:sp>
+        <p:nvSpPr>
+          <p:cNvPr id="5" name="TextBox 4"/>
+          <p:cNvSpPr txBox="1"/>
+          <p:nvPr/>
+        </p:nvSpPr>
+        <p:spPr>
+          <a:xfrm>
+            <a:off x="305530" y="159826"/>
+            <a:ext cx="11620857" cy="4893647"/>
+          </a:xfrm>
+          <a:prstGeom prst="rect">
+            <a:avLst/>
+          </a:prstGeom>
+          <a:noFill/>
+        </p:spPr>
+        <p:txBody>
+          <a:bodyPr wrap="square" rtlCol="0">
+            <a:spAutoFit/>
+          </a:bodyPr>
+          <a:lstStyle/>
+          <a:p>
+            <a:pPr algn="ctr"/>
+            <a:r>
+              <a:rPr lang="en-US" sz="3200" dirty="0" smtClean="0">
+                <a:solidFill>
+                  <a:srgbClr val="FF0000"/>
+                </a:solidFill>
+              </a:rPr>
+              <a:t>Cultural Life in Colonial Cities</a:t>
+            </a:r>
+            <a:endParaRPr lang="en-US" sz="3200" dirty="0" smtClean="0">
+              <a:solidFill>
+                <a:srgbClr val="0070C0"/>
+              </a:solidFill>
+            </a:endParaRPr>
+          </a:p>
+          <a:p>
+            <a:pPr marL="457200" indent="-457200">
+              <a:buFont typeface="Arial" panose="020B0604020202020204" pitchFamily="34" charset="0"/>
+              <a:buChar char="•"/>
+            </a:pPr>
+            <a:r>
+              <a:rPr lang="en-US" sz="2800" dirty="0" smtClean="0">
+                <a:solidFill>
+                  <a:schemeClr val="bg1"/>
+                </a:solidFill>
+              </a:rPr>
+              <a:t>City life was fun</a:t>
+            </a:r>
+          </a:p>
+          <a:p>
+            <a:pPr marL="457200" indent="-457200">
+              <a:buFont typeface="Arial" panose="020B0604020202020204" pitchFamily="34" charset="0"/>
+              <a:buChar char="•"/>
+            </a:pPr>
+            <a:r>
+              <a:rPr lang="en-US" sz="2800" dirty="0" err="1" smtClean="0">
+                <a:solidFill>
+                  <a:schemeClr val="bg1"/>
+                </a:solidFill>
+              </a:rPr>
+              <a:t>Religon</a:t>
+            </a:r>
+            <a:r>
+              <a:rPr lang="en-US" sz="2800" dirty="0" smtClean="0">
+                <a:solidFill>
+                  <a:schemeClr val="bg1"/>
+                </a:solidFill>
+              </a:rPr>
+              <a:t> fell apart as different sects didn’t like each other and city was just too fun</a:t>
+            </a:r>
+          </a:p>
+          <a:p>
+            <a:pPr marL="457200" indent="-457200">
+              <a:buFont typeface="Arial" panose="020B0604020202020204" pitchFamily="34" charset="0"/>
+              <a:buChar char="•"/>
+            </a:pPr>
+            <a:r>
+              <a:rPr lang="en-US" sz="2800" dirty="0" smtClean="0">
+                <a:solidFill>
+                  <a:schemeClr val="bg1"/>
+                </a:solidFill>
+              </a:rPr>
+              <a:t>They also got schools and libraries of all kinds by 1720</a:t>
+            </a:r>
+          </a:p>
+          <a:p>
+            <a:pPr marL="457200" indent="-457200">
+              <a:buFont typeface="Arial" panose="020B0604020202020204" pitchFamily="34" charset="0"/>
+              <a:buChar char="•"/>
+            </a:pPr>
+            <a:r>
+              <a:rPr lang="en-US" sz="2800" dirty="0" smtClean="0">
+                <a:solidFill>
+                  <a:schemeClr val="bg1"/>
+                </a:solidFill>
+              </a:rPr>
+              <a:t>They got the printing press going by 1700, </a:t>
+            </a:r>
+          </a:p>
+          <a:p>
+            <a:pPr marL="457200" indent="-457200">
+              <a:buFont typeface="Arial" panose="020B0604020202020204" pitchFamily="34" charset="0"/>
+              <a:buChar char="•"/>
+            </a:pPr>
+            <a:r>
+              <a:rPr lang="en-US" sz="2800" dirty="0" smtClean="0">
+                <a:solidFill>
+                  <a:schemeClr val="bg1"/>
+                </a:solidFill>
+              </a:rPr>
+              <a:t>Black people made their own culture when </a:t>
+            </a:r>
+            <a:r>
+              <a:rPr lang="en-US" sz="2800" dirty="0" err="1" smtClean="0">
+                <a:solidFill>
+                  <a:schemeClr val="bg1"/>
+                </a:solidFill>
+              </a:rPr>
+              <a:t>ppl</a:t>
+            </a:r>
+            <a:r>
+              <a:rPr lang="en-US" sz="2800" dirty="0" smtClean="0">
+                <a:solidFill>
+                  <a:schemeClr val="bg1"/>
+                </a:solidFill>
+              </a:rPr>
+              <a:t> from Africa remind those here of their culture, the also had Negro Election Day festivals were blacks played as rulers</a:t>
+            </a:r>
+          </a:p>
+          <a:p>
+            <a:pPr marL="457200" indent="-457200">
+              <a:buFont typeface="Arial" panose="020B0604020202020204" pitchFamily="34" charset="0"/>
+              <a:buChar char="•"/>
+            </a:pPr>
+            <a:r>
+              <a:rPr lang="en-US" sz="2800" dirty="0" smtClean="0">
+                <a:solidFill>
+                  <a:schemeClr val="bg1"/>
+                </a:solidFill>
+              </a:rPr>
+              <a:t>Tavern was the hangout place for grown men</a:t>
+            </a:r>
+          </a:p>
+          <a:p>
+            <a:pPr marL="457200" indent="-457200">
+              <a:buFont typeface="Arial" panose="020B0604020202020204" pitchFamily="34" charset="0"/>
+              <a:buChar char="•"/>
+            </a:pPr>
+            <a:endParaRPr lang="en-US" sz="2800" dirty="0" smtClean="0"/>
+          </a:p>
+        </p:txBody>
+      </p:sp>
+    </p:spTree>
+    <p:extLst>
+      <p:ext uri="{BB962C8B-B14F-4D97-AF65-F5344CB8AC3E}">
+        <p14:creationId xmlns:p14="http://schemas.microsoft.com/office/powerpoint/2010/main" val="2185724921"/>
+      </p:ext>
+    </p:extLst>
+  </p:cSld>
+  <p:clrMapOvr>
+    <a:masterClrMapping/>
+  </p:clrMapOvr>
+  <p:timing>
+    <p:tnLst>
+      <p:par>
+        <p:cTn id="1" dur="indefinite" restart="never" nodeType="tmRoot"/>
+      </p:par>
+    </p:tnLst>
+  </p:timing>
+</p:sld>
+</file>
+
+<file path=ppt/slides/slide25.xml><?xml version="1.0" encoding="utf-8"?>
+<p:sld xmlns:a="http://schemas.openxmlformats.org/drawingml/2006/main" xmlns:r="http://schemas.openxmlformats.org/officeDocument/2006/relationships" xmlns:p="http://schemas.openxmlformats.org/presentationml/2006/main">
+  <p:cSld>
+    <p:spTree>
+      <p:nvGrpSpPr>
+        <p:cNvPr id="1" name=""/>
+        <p:cNvGrpSpPr/>
+        <p:nvPr/>
+      </p:nvGrpSpPr>
+      <p:grpSpPr>
+        <a:xfrm>
+          <a:off x="0" y="0"/>
+          <a:ext cx="0" cy="0"/>
+          <a:chOff x="0" y="0"/>
+          <a:chExt cx="0" cy="0"/>
+        </a:xfrm>
+      </p:grpSpPr>
+      <p:sp>
+        <p:nvSpPr>
+          <p:cNvPr id="5" name="TextBox 4"/>
+          <p:cNvSpPr txBox="1"/>
+          <p:nvPr/>
+        </p:nvSpPr>
+        <p:spPr>
+          <a:xfrm>
+            <a:off x="316287" y="182880"/>
+            <a:ext cx="11620857" cy="6863417"/>
+          </a:xfrm>
+          <a:prstGeom prst="rect">
+            <a:avLst/>
+          </a:prstGeom>
+          <a:noFill/>
+        </p:spPr>
+        <p:txBody>
+          <a:bodyPr wrap="square" rtlCol="0">
+            <a:spAutoFit/>
+          </a:bodyPr>
+          <a:lstStyle/>
+          <a:p>
+            <a:pPr algn="ctr"/>
+            <a:r>
+              <a:rPr lang="en-US" sz="3200" dirty="0" smtClean="0">
+                <a:solidFill>
+                  <a:srgbClr val="FF0000"/>
+                </a:solidFill>
+              </a:rPr>
+              <a:t>Cities in the American Revolution</a:t>
+            </a:r>
+            <a:endParaRPr lang="en-US" sz="3200" dirty="0" smtClean="0">
+              <a:solidFill>
+                <a:srgbClr val="0070C0"/>
+              </a:solidFill>
+            </a:endParaRPr>
+          </a:p>
+          <a:p>
+            <a:pPr marL="457200" indent="-457200">
+              <a:buFont typeface="Arial" panose="020B0604020202020204" pitchFamily="34" charset="0"/>
+              <a:buChar char="•"/>
+            </a:pPr>
+            <a:r>
+              <a:rPr lang="en-US" sz="2000" dirty="0" smtClean="0">
+                <a:solidFill>
+                  <a:schemeClr val="bg1"/>
+                </a:solidFill>
+              </a:rPr>
+              <a:t>For the first century of colonialism England didn’t care , but then  colonials felt if they came around, it would be tyranny</a:t>
+            </a:r>
+          </a:p>
+          <a:p>
+            <a:pPr marL="457200" indent="-457200">
+              <a:buFont typeface="Arial" panose="020B0604020202020204" pitchFamily="34" charset="0"/>
+              <a:buChar char="•"/>
+            </a:pPr>
+            <a:r>
+              <a:rPr lang="en-US" sz="2000" dirty="0" smtClean="0">
+                <a:solidFill>
+                  <a:schemeClr val="bg1"/>
+                </a:solidFill>
+              </a:rPr>
+              <a:t>After the Seven years war (Treaty of Paris) England began taxing in an attempt to organize, cities got hit</a:t>
+            </a:r>
+          </a:p>
+          <a:p>
+            <a:pPr marL="457200" indent="-457200">
+              <a:buFont typeface="Arial" panose="020B0604020202020204" pitchFamily="34" charset="0"/>
+              <a:buChar char="•"/>
+            </a:pPr>
+            <a:r>
+              <a:rPr lang="en-US" sz="2000" dirty="0" smtClean="0">
+                <a:solidFill>
+                  <a:schemeClr val="bg1"/>
+                </a:solidFill>
+              </a:rPr>
+              <a:t>American revolution backed by cities</a:t>
+            </a:r>
+          </a:p>
+          <a:p>
+            <a:pPr marL="457200" indent="-457200">
+              <a:buFont typeface="Arial" panose="020B0604020202020204" pitchFamily="34" charset="0"/>
+              <a:buChar char="•"/>
+            </a:pPr>
+            <a:r>
+              <a:rPr lang="en-US" sz="2000" dirty="0" smtClean="0">
+                <a:solidFill>
+                  <a:schemeClr val="bg1"/>
+                </a:solidFill>
+              </a:rPr>
+              <a:t>People took sides based on who they benefited more from</a:t>
+            </a:r>
+          </a:p>
+          <a:p>
+            <a:pPr marL="457200" indent="-457200">
+              <a:buFont typeface="Arial" panose="020B0604020202020204" pitchFamily="34" charset="0"/>
+              <a:buChar char="•"/>
+            </a:pPr>
+            <a:r>
+              <a:rPr lang="en-US" sz="2000" dirty="0" smtClean="0">
+                <a:solidFill>
+                  <a:schemeClr val="bg1"/>
+                </a:solidFill>
+              </a:rPr>
+              <a:t>Then everyone got together under –relief from British</a:t>
+            </a:r>
+          </a:p>
+          <a:p>
+            <a:pPr marL="457200" indent="-457200">
+              <a:buFont typeface="Arial" panose="020B0604020202020204" pitchFamily="34" charset="0"/>
+              <a:buChar char="•"/>
+            </a:pPr>
+            <a:r>
+              <a:rPr lang="en-US" sz="2000" dirty="0" err="1" smtClean="0">
+                <a:solidFill>
+                  <a:schemeClr val="bg1"/>
+                </a:solidFill>
+              </a:rPr>
+              <a:t>Propertyless</a:t>
+            </a:r>
+            <a:r>
+              <a:rPr lang="en-US" sz="2000" dirty="0" smtClean="0">
+                <a:solidFill>
+                  <a:schemeClr val="bg1"/>
+                </a:solidFill>
+              </a:rPr>
+              <a:t> classed </a:t>
+            </a:r>
+            <a:r>
+              <a:rPr lang="en-US" sz="2000" dirty="0" err="1" smtClean="0">
+                <a:solidFill>
+                  <a:schemeClr val="bg1"/>
+                </a:solidFill>
+              </a:rPr>
+              <a:t>suffred</a:t>
+            </a:r>
+            <a:r>
+              <a:rPr lang="en-US" sz="2000" dirty="0" smtClean="0">
+                <a:solidFill>
+                  <a:schemeClr val="bg1"/>
+                </a:solidFill>
+              </a:rPr>
+              <a:t> from British soldiers taking jobs and being forced to serve </a:t>
+            </a:r>
+            <a:r>
+              <a:rPr lang="en-US" sz="2000" dirty="0" err="1" smtClean="0">
+                <a:solidFill>
+                  <a:schemeClr val="bg1"/>
+                </a:solidFill>
+              </a:rPr>
+              <a:t>inna</a:t>
+            </a:r>
+            <a:r>
+              <a:rPr lang="en-US" sz="2000" dirty="0" smtClean="0">
+                <a:solidFill>
+                  <a:schemeClr val="bg1"/>
+                </a:solidFill>
+              </a:rPr>
+              <a:t> army</a:t>
+            </a:r>
+          </a:p>
+          <a:p>
+            <a:pPr marL="457200" indent="-457200">
+              <a:buFont typeface="Arial" panose="020B0604020202020204" pitchFamily="34" charset="0"/>
+              <a:buChar char="•"/>
+            </a:pPr>
+            <a:r>
+              <a:rPr lang="en-US" sz="2000" dirty="0" smtClean="0">
+                <a:solidFill>
+                  <a:schemeClr val="bg1"/>
+                </a:solidFill>
+              </a:rPr>
+              <a:t>During stamp act, people got bloodthirsty, stamp officials </a:t>
+            </a:r>
+            <a:r>
+              <a:rPr lang="en-US" sz="2000" dirty="0" smtClean="0"/>
+              <a:t>st</a:t>
+            </a:r>
+            <a:r>
+              <a:rPr lang="en-US" sz="2000" dirty="0" smtClean="0">
+                <a:solidFill>
+                  <a:schemeClr val="bg1"/>
+                </a:solidFill>
+              </a:rPr>
+              <a:t>opped going after taxes</a:t>
+            </a:r>
+          </a:p>
+          <a:p>
+            <a:pPr marL="457200" indent="-457200">
+              <a:buFont typeface="Arial" panose="020B0604020202020204" pitchFamily="34" charset="0"/>
+              <a:buChar char="•"/>
+            </a:pPr>
+            <a:r>
+              <a:rPr lang="en-US" sz="2000" dirty="0" smtClean="0">
+                <a:solidFill>
+                  <a:schemeClr val="bg1"/>
+                </a:solidFill>
+              </a:rPr>
+              <a:t>All this made cities decline </a:t>
+            </a:r>
+          </a:p>
+          <a:p>
+            <a:pPr marL="457200" indent="-457200">
+              <a:buFont typeface="Arial" panose="020B0604020202020204" pitchFamily="34" charset="0"/>
+              <a:buChar char="•"/>
+            </a:pPr>
+            <a:r>
+              <a:rPr lang="en-US" sz="2000" dirty="0" smtClean="0">
+                <a:solidFill>
+                  <a:schemeClr val="bg1"/>
+                </a:solidFill>
+              </a:rPr>
+              <a:t>When Townshend acts repealed, </a:t>
+            </a:r>
+            <a:r>
+              <a:rPr lang="en-US" sz="2000" dirty="0" err="1" smtClean="0">
+                <a:solidFill>
+                  <a:schemeClr val="bg1"/>
+                </a:solidFill>
+              </a:rPr>
+              <a:t>boston</a:t>
+            </a:r>
+            <a:r>
+              <a:rPr lang="en-US" sz="2000" dirty="0" smtClean="0">
+                <a:solidFill>
+                  <a:schemeClr val="bg1"/>
+                </a:solidFill>
+              </a:rPr>
+              <a:t> didn’t stop, but got more bloodthirsty</a:t>
+            </a:r>
+          </a:p>
+          <a:p>
+            <a:pPr marL="457200" indent="-457200">
+              <a:buFont typeface="Arial" panose="020B0604020202020204" pitchFamily="34" charset="0"/>
+              <a:buChar char="•"/>
+            </a:pPr>
+            <a:r>
+              <a:rPr lang="en-US" sz="2000" dirty="0" smtClean="0">
+                <a:solidFill>
+                  <a:schemeClr val="bg1"/>
+                </a:solidFill>
+              </a:rPr>
+              <a:t>That’s how you got the Tea Party</a:t>
+            </a:r>
+          </a:p>
+          <a:p>
+            <a:pPr marL="457200" indent="-457200">
+              <a:buFont typeface="Arial" panose="020B0604020202020204" pitchFamily="34" charset="0"/>
+              <a:buChar char="•"/>
+            </a:pPr>
+            <a:r>
+              <a:rPr lang="en-US" sz="2000" dirty="0" smtClean="0">
+                <a:solidFill>
+                  <a:schemeClr val="bg1"/>
+                </a:solidFill>
+              </a:rPr>
+              <a:t>British threw acts to punish colonists</a:t>
+            </a:r>
+          </a:p>
+          <a:p>
+            <a:pPr marL="457200" indent="-457200">
+              <a:buFont typeface="Arial" panose="020B0604020202020204" pitchFamily="34" charset="0"/>
+              <a:buChar char="•"/>
+            </a:pPr>
+            <a:r>
+              <a:rPr lang="en-US" sz="2000" dirty="0" smtClean="0"/>
+              <a:t>Women challenged </a:t>
+            </a:r>
+            <a:r>
+              <a:rPr lang="en-US" sz="2000" dirty="0" err="1" smtClean="0"/>
+              <a:t>british</a:t>
+            </a:r>
+            <a:r>
+              <a:rPr lang="en-US" sz="2000" dirty="0" smtClean="0"/>
+              <a:t> by organizing boycotts </a:t>
+            </a:r>
+          </a:p>
+          <a:p>
+            <a:pPr marL="457200" indent="-457200">
+              <a:buFont typeface="Arial" panose="020B0604020202020204" pitchFamily="34" charset="0"/>
+              <a:buChar char="•"/>
+            </a:pPr>
+            <a:r>
+              <a:rPr lang="en-US" sz="2000" dirty="0" smtClean="0"/>
+              <a:t>Africans used this to show </a:t>
+            </a:r>
+            <a:r>
+              <a:rPr lang="en-US" sz="2000" dirty="0" err="1" smtClean="0"/>
+              <a:t>ppl</a:t>
+            </a:r>
+            <a:r>
+              <a:rPr lang="en-US" sz="2000" dirty="0" smtClean="0"/>
+              <a:t> why slavery is wrong, others fought for the </a:t>
+            </a:r>
+            <a:r>
+              <a:rPr lang="en-US" sz="2000" dirty="0" err="1" smtClean="0"/>
+              <a:t>Britsh</a:t>
+            </a:r>
+            <a:endParaRPr lang="en-US" sz="2000" dirty="0" smtClean="0"/>
+          </a:p>
+          <a:p>
+            <a:pPr marL="457200" indent="-457200">
+              <a:buFont typeface="Arial" panose="020B0604020202020204" pitchFamily="34" charset="0"/>
+              <a:buChar char="•"/>
+            </a:pPr>
+            <a:r>
+              <a:rPr lang="en-US" sz="2000" dirty="0" smtClean="0"/>
+              <a:t>After the war, the loyalists fled to nova scotia. The pats wanted to burn cities but they didn’t</a:t>
+            </a:r>
+          </a:p>
+          <a:p>
+            <a:pPr marL="457200" indent="-457200">
+              <a:buFont typeface="Arial" panose="020B0604020202020204" pitchFamily="34" charset="0"/>
+              <a:buChar char="•"/>
+            </a:pPr>
+            <a:r>
+              <a:rPr lang="en-US" sz="2000" dirty="0" smtClean="0"/>
+              <a:t>So city main cause of revolution</a:t>
+            </a:r>
+          </a:p>
+          <a:p>
+            <a:pPr marL="457200" indent="-457200">
+              <a:buFont typeface="Arial" panose="020B0604020202020204" pitchFamily="34" charset="0"/>
+              <a:buChar char="•"/>
+            </a:pPr>
+            <a:endParaRPr lang="en-US" sz="2800" dirty="0" smtClean="0"/>
+          </a:p>
+        </p:txBody>
+      </p:sp>
+    </p:spTree>
+    <p:extLst>
+      <p:ext uri="{BB962C8B-B14F-4D97-AF65-F5344CB8AC3E}">
+        <p14:creationId xmlns:p14="http://schemas.microsoft.com/office/powerpoint/2010/main" val="431731719"/>
+      </p:ext>
+    </p:extLst>
+  </p:cSld>
+  <p:clrMapOvr>
+    <a:masterClrMapping/>
+  </p:clrMapOvr>
+  <p:timing>
+    <p:tnLst>
+      <p:par>
+        <p:cTn id="1" dur="indefinite" restart="never" nodeType="tmRoot"/>
+      </p:par>
+    </p:tnLst>
+  </p:timing>
+</p:sld>
+</file>
+
+<file path=ppt/slides/slide26.xml><?xml version="1.0" encoding="utf-8"?>
+<p:sld xmlns:a="http://schemas.openxmlformats.org/drawingml/2006/main" xmlns:r="http://schemas.openxmlformats.org/officeDocument/2006/relationships" xmlns:p="http://schemas.openxmlformats.org/presentationml/2006/main">
+  <p:cSld>
+    <p:spTree>
+      <p:nvGrpSpPr>
+        <p:cNvPr id="1" name=""/>
+        <p:cNvGrpSpPr/>
+        <p:nvPr/>
+      </p:nvGrpSpPr>
+      <p:grpSpPr>
+        <a:xfrm>
+          <a:off x="0" y="0"/>
+          <a:ext cx="0" cy="0"/>
+          <a:chOff x="0" y="0"/>
+          <a:chExt cx="0" cy="0"/>
+        </a:xfrm>
+      </p:grpSpPr>
+      <p:sp>
+        <p:nvSpPr>
+          <p:cNvPr id="2" name="Title 1"/>
+          <p:cNvSpPr>
+            <a:spLocks noGrp="1"/>
+          </p:cNvSpPr>
+          <p:nvPr>
+            <p:ph type="title"/>
+          </p:nvPr>
+        </p:nvSpPr>
+        <p:spPr>
+          <a:xfrm>
+            <a:off x="971365" y="537882"/>
+            <a:ext cx="10561418" cy="3882314"/>
+          </a:xfrm>
+        </p:spPr>
+        <p:txBody>
+          <a:bodyPr/>
+          <a:lstStyle/>
+          <a:p>
+            <a:r>
+              <a:rPr lang="en-US" dirty="0" smtClean="0">
+                <a:solidFill>
+                  <a:schemeClr val="bg2"/>
+                </a:solidFill>
+              </a:rPr>
+              <a:t>CSB </a:t>
+            </a:r>
+            <a:r>
+              <a:rPr lang="en-US" dirty="0" err="1" smtClean="0">
+                <a:solidFill>
+                  <a:schemeClr val="bg2"/>
+                </a:solidFill>
+              </a:rPr>
+              <a:t>ch.</a:t>
+            </a:r>
+            <a:r>
+              <a:rPr lang="en-US" dirty="0" smtClean="0">
+                <a:solidFill>
+                  <a:schemeClr val="bg2"/>
+                </a:solidFill>
+              </a:rPr>
+              <a:t> </a:t>
+            </a:r>
+            <a:r>
+              <a:rPr lang="en-US" dirty="0">
+                <a:solidFill>
+                  <a:schemeClr val="bg2"/>
+                </a:solidFill>
+              </a:rPr>
+              <a:t>2</a:t>
+            </a:r>
+            <a:r>
+              <a:rPr lang="en-US" dirty="0" smtClean="0">
+                <a:solidFill>
+                  <a:schemeClr val="bg2"/>
+                </a:solidFill>
+              </a:rPr>
+              <a:t/>
+            </a:r>
+            <a:br>
+              <a:rPr lang="en-US" dirty="0" smtClean="0">
+                <a:solidFill>
+                  <a:schemeClr val="bg2"/>
+                </a:solidFill>
+              </a:rPr>
+            </a:br>
+            <a:r>
+              <a:rPr lang="en-US" dirty="0" smtClean="0">
+                <a:solidFill>
+                  <a:schemeClr val="bg2"/>
+                </a:solidFill>
+              </a:rPr>
+              <a:t>All answers, revolution gave freedom</a:t>
+            </a:r>
+            <a:endParaRPr lang="en-US" dirty="0">
+              <a:solidFill>
+                <a:schemeClr val="bg2"/>
+              </a:solidFill>
+            </a:endParaRPr>
+          </a:p>
+        </p:txBody>
+      </p:sp>
+      <p:sp>
+        <p:nvSpPr>
+          <p:cNvPr id="3" name="Text Placeholder 2"/>
+          <p:cNvSpPr>
+            <a:spLocks noGrp="1"/>
+          </p:cNvSpPr>
+          <p:nvPr>
+            <p:ph type="body" idx="1"/>
+          </p:nvPr>
+        </p:nvSpPr>
+        <p:spPr>
+          <a:xfrm>
+            <a:off x="810000" y="5281201"/>
+            <a:ext cx="10646894" cy="433955"/>
+          </a:xfrm>
+        </p:spPr>
+        <p:txBody>
+          <a:bodyPr/>
+          <a:lstStyle/>
+          <a:p>
+            <a:r>
+              <a:rPr lang="en-US" b="1" dirty="0" smtClean="0"/>
+              <a:t>EVERY SUBSECTION</a:t>
+            </a:r>
+            <a:endParaRPr lang="en-US" b="1" dirty="0"/>
+          </a:p>
+        </p:txBody>
+      </p:sp>
+    </p:spTree>
+    <p:extLst>
+      <p:ext uri="{BB962C8B-B14F-4D97-AF65-F5344CB8AC3E}">
+        <p14:creationId xmlns:p14="http://schemas.microsoft.com/office/powerpoint/2010/main" val="3835105720"/>
+      </p:ext>
+    </p:extLst>
+  </p:cSld>
+  <p:clrMapOvr>
+    <a:masterClrMapping/>
+  </p:clrMapOvr>
+  <p:timing>
+    <p:tnLst>
+      <p:par>
+        <p:cTn id="1" dur="indefinite" restart="never" nodeType="tmRoot"/>
+      </p:par>
+    </p:tnLst>
+  </p:timing>
+</p:sld>
+</file>
+
+<file path=ppt/slides/slide27.xml><?xml version="1.0" encoding="utf-8"?>
+<p:sld xmlns:a="http://schemas.openxmlformats.org/drawingml/2006/main" xmlns:r="http://schemas.openxmlformats.org/officeDocument/2006/relationships" xmlns:p="http://schemas.openxmlformats.org/presentationml/2006/main">
+  <p:cSld>
+    <p:spTree>
+      <p:nvGrpSpPr>
+        <p:cNvPr id="1" name=""/>
+        <p:cNvGrpSpPr/>
+        <p:nvPr/>
+      </p:nvGrpSpPr>
+      <p:grpSpPr>
+        <a:xfrm>
+          <a:off x="0" y="0"/>
+          <a:ext cx="0" cy="0"/>
+          <a:chOff x="0" y="0"/>
+          <a:chExt cx="0" cy="0"/>
+        </a:xfrm>
+      </p:grpSpPr>
+      <p:sp>
+        <p:nvSpPr>
+          <p:cNvPr id="5" name="TextBox 4"/>
+          <p:cNvSpPr txBox="1"/>
+          <p:nvPr/>
+        </p:nvSpPr>
+        <p:spPr>
+          <a:xfrm>
+            <a:off x="316287" y="182880"/>
+            <a:ext cx="11620857" cy="2739211"/>
+          </a:xfrm>
+          <a:prstGeom prst="rect">
+            <a:avLst/>
+          </a:prstGeom>
+          <a:noFill/>
+        </p:spPr>
+        <p:txBody>
+          <a:bodyPr wrap="square" rtlCol="0">
+            <a:spAutoFit/>
+          </a:bodyPr>
+          <a:lstStyle/>
+          <a:p>
+            <a:pPr algn="ctr"/>
+            <a:r>
+              <a:rPr lang="en-US" sz="3200" dirty="0" smtClean="0">
+                <a:solidFill>
+                  <a:srgbClr val="FF0000"/>
+                </a:solidFill>
+              </a:rPr>
+              <a:t>Introduction</a:t>
+            </a:r>
+          </a:p>
+          <a:p>
+            <a:pPr marL="342900" indent="-342900">
+              <a:buFont typeface="Arial" panose="020B0604020202020204" pitchFamily="34" charset="0"/>
+              <a:buChar char="•"/>
+            </a:pPr>
+            <a:r>
+              <a:rPr lang="en-US" sz="2800" dirty="0" smtClean="0">
+                <a:solidFill>
+                  <a:schemeClr val="bg1"/>
+                </a:solidFill>
+              </a:rPr>
+              <a:t>After the war, cities became relevant except for Newport</a:t>
+            </a:r>
+          </a:p>
+          <a:p>
+            <a:pPr marL="342900" indent="-342900">
+              <a:buFont typeface="Arial" panose="020B0604020202020204" pitchFamily="34" charset="0"/>
+              <a:buChar char="•"/>
+            </a:pPr>
+            <a:r>
+              <a:rPr lang="en-US" sz="2800" dirty="0" smtClean="0">
+                <a:solidFill>
+                  <a:schemeClr val="bg1"/>
+                </a:solidFill>
+              </a:rPr>
+              <a:t>Thomas Jefferson said cities a bad idea</a:t>
+            </a:r>
+          </a:p>
+          <a:p>
+            <a:pPr marL="342900" indent="-342900">
+              <a:buFont typeface="Arial" panose="020B0604020202020204" pitchFamily="34" charset="0"/>
+              <a:buChar char="•"/>
+            </a:pPr>
+            <a:r>
+              <a:rPr lang="en-US" sz="2800" dirty="0" smtClean="0">
+                <a:solidFill>
+                  <a:schemeClr val="bg1"/>
+                </a:solidFill>
+              </a:rPr>
+              <a:t>They said he was stupid that’s why we have cities today</a:t>
+            </a:r>
+          </a:p>
+          <a:p>
+            <a:pPr marL="342900" indent="-342900">
+              <a:buFont typeface="Arial" panose="020B0604020202020204" pitchFamily="34" charset="0"/>
+              <a:buChar char="•"/>
+            </a:pPr>
+            <a:endParaRPr lang="en-US" sz="2800" dirty="0" smtClean="0">
+              <a:solidFill>
+                <a:schemeClr val="bg1"/>
+              </a:solidFill>
+            </a:endParaRPr>
+          </a:p>
+          <a:p>
+            <a:pPr marL="457200" indent="-457200">
+              <a:buFont typeface="Arial" panose="020B0604020202020204" pitchFamily="34" charset="0"/>
+              <a:buChar char="•"/>
+            </a:pPr>
+            <a:endParaRPr lang="en-US" sz="2800" dirty="0" smtClean="0"/>
+          </a:p>
+        </p:txBody>
+      </p:sp>
+    </p:spTree>
+    <p:extLst>
+      <p:ext uri="{BB962C8B-B14F-4D97-AF65-F5344CB8AC3E}">
+        <p14:creationId xmlns:p14="http://schemas.microsoft.com/office/powerpoint/2010/main" val="881876157"/>
+      </p:ext>
+    </p:extLst>
+  </p:cSld>
+  <p:clrMapOvr>
+    <a:masterClrMapping/>
+  </p:clrMapOvr>
+  <p:timing>
+    <p:tnLst>
+      <p:par>
+        <p:cTn id="1" dur="indefinite" restart="never" nodeType="tmRoot"/>
+      </p:par>
+    </p:tnLst>
+  </p:timing>
+</p:sld>
+</file>
+
+<file path=ppt/slides/slide28.xml><?xml version="1.0" encoding="utf-8"?>
+<p:sld xmlns:a="http://schemas.openxmlformats.org/drawingml/2006/main" xmlns:r="http://schemas.openxmlformats.org/officeDocument/2006/relationships" xmlns:p="http://schemas.openxmlformats.org/presentationml/2006/main">
+  <p:cSld>
+    <p:spTree>
+      <p:nvGrpSpPr>
+        <p:cNvPr id="1" name=""/>
+        <p:cNvGrpSpPr/>
+        <p:nvPr/>
+      </p:nvGrpSpPr>
+      <p:grpSpPr>
+        <a:xfrm>
+          <a:off x="0" y="0"/>
+          <a:ext cx="0" cy="0"/>
+          <a:chOff x="0" y="0"/>
+          <a:chExt cx="0" cy="0"/>
+        </a:xfrm>
+      </p:grpSpPr>
+      <p:sp>
+        <p:nvSpPr>
+          <p:cNvPr id="5" name="TextBox 4"/>
+          <p:cNvSpPr txBox="1"/>
+          <p:nvPr/>
+        </p:nvSpPr>
+        <p:spPr>
+          <a:xfrm>
+            <a:off x="316287" y="182880"/>
+            <a:ext cx="11620857" cy="4462760"/>
+          </a:xfrm>
+          <a:prstGeom prst="rect">
+            <a:avLst/>
+          </a:prstGeom>
+          <a:noFill/>
+        </p:spPr>
+        <p:txBody>
+          <a:bodyPr wrap="square" rtlCol="0">
+            <a:spAutoFit/>
+          </a:bodyPr>
+          <a:lstStyle/>
+          <a:p>
+            <a:pPr algn="ctr"/>
+            <a:r>
+              <a:rPr lang="en-US" sz="3200" dirty="0" smtClean="0">
+                <a:solidFill>
+                  <a:srgbClr val="FF0000"/>
+                </a:solidFill>
+              </a:rPr>
+              <a:t>Cities in the New Republic</a:t>
+            </a:r>
+          </a:p>
+          <a:p>
+            <a:pPr marL="342900" indent="-342900">
+              <a:buFont typeface="Arial" panose="020B0604020202020204" pitchFamily="34" charset="0"/>
+              <a:buChar char="•"/>
+            </a:pPr>
+            <a:r>
+              <a:rPr lang="en-US" sz="2800" dirty="0" smtClean="0">
+                <a:solidFill>
+                  <a:schemeClr val="bg1"/>
+                </a:solidFill>
+              </a:rPr>
+              <a:t>After war, things were hard they were rebuilding</a:t>
+            </a:r>
+          </a:p>
+          <a:p>
+            <a:pPr marL="342900" indent="-342900">
+              <a:buFont typeface="Arial" panose="020B0604020202020204" pitchFamily="34" charset="0"/>
+              <a:buChar char="•"/>
+            </a:pPr>
+            <a:r>
+              <a:rPr lang="en-US" sz="2800" dirty="0" smtClean="0">
+                <a:solidFill>
+                  <a:schemeClr val="bg1"/>
+                </a:solidFill>
+              </a:rPr>
+              <a:t>People did shays rebellion because they want a central gov’t that makes trade easier</a:t>
+            </a:r>
+          </a:p>
+          <a:p>
+            <a:pPr marL="342900" indent="-342900">
+              <a:buFont typeface="Arial" panose="020B0604020202020204" pitchFamily="34" charset="0"/>
+              <a:buChar char="•"/>
+            </a:pPr>
+            <a:r>
+              <a:rPr lang="en-US" sz="2800" dirty="0" smtClean="0">
+                <a:solidFill>
+                  <a:schemeClr val="bg1"/>
+                </a:solidFill>
+              </a:rPr>
+              <a:t>People liked the constitution</a:t>
+            </a:r>
+          </a:p>
+          <a:p>
+            <a:pPr marL="342900" indent="-342900">
+              <a:buFont typeface="Arial" panose="020B0604020202020204" pitchFamily="34" charset="0"/>
+              <a:buChar char="•"/>
+            </a:pPr>
+            <a:r>
+              <a:rPr lang="en-US" sz="2800" dirty="0" smtClean="0">
+                <a:solidFill>
+                  <a:schemeClr val="bg1"/>
+                </a:solidFill>
+              </a:rPr>
+              <a:t>Port cities grew</a:t>
+            </a:r>
+          </a:p>
+          <a:p>
+            <a:pPr marL="342900" indent="-342900">
+              <a:buFont typeface="Arial" panose="020B0604020202020204" pitchFamily="34" charset="0"/>
+              <a:buChar char="•"/>
+            </a:pPr>
+            <a:r>
+              <a:rPr lang="en-US" sz="2800" dirty="0" smtClean="0">
+                <a:solidFill>
+                  <a:schemeClr val="bg1"/>
+                </a:solidFill>
+              </a:rPr>
+              <a:t>British blocked American ships, American ships stopped trade that did not work so they did War of 1812, where British blocked  more ships</a:t>
+            </a:r>
+          </a:p>
+          <a:p>
+            <a:pPr marL="457200" indent="-457200">
+              <a:buFont typeface="Arial" panose="020B0604020202020204" pitchFamily="34" charset="0"/>
+              <a:buChar char="•"/>
+            </a:pPr>
+            <a:endParaRPr lang="en-US" sz="2800" dirty="0" smtClean="0"/>
+          </a:p>
+        </p:txBody>
+      </p:sp>
+    </p:spTree>
+    <p:extLst>
+      <p:ext uri="{BB962C8B-B14F-4D97-AF65-F5344CB8AC3E}">
+        <p14:creationId xmlns:p14="http://schemas.microsoft.com/office/powerpoint/2010/main" val="1286568062"/>
+      </p:ext>
+    </p:extLst>
+  </p:cSld>
+  <p:clrMapOvr>
+    <a:masterClrMapping/>
+  </p:clrMapOvr>
+  <p:timing>
+    <p:tnLst>
+      <p:par>
+        <p:cTn id="1" dur="indefinite" restart="never" nodeType="tmRoot"/>
+      </p:par>
+    </p:tnLst>
+  </p:timing>
+</p:sld>
+</file>
+
+<file path=ppt/slides/slide29.xml><?xml version="1.0" encoding="utf-8"?>
+<p:sld xmlns:a="http://schemas.openxmlformats.org/drawingml/2006/main" xmlns:r="http://schemas.openxmlformats.org/officeDocument/2006/relationships" xmlns:p="http://schemas.openxmlformats.org/presentationml/2006/main">
+  <p:cSld>
+    <p:spTree>
+      <p:nvGrpSpPr>
+        <p:cNvPr id="1" name=""/>
+        <p:cNvGrpSpPr/>
+        <p:nvPr/>
+      </p:nvGrpSpPr>
+      <p:grpSpPr>
+        <a:xfrm>
+          <a:off x="0" y="0"/>
+          <a:ext cx="0" cy="0"/>
+          <a:chOff x="0" y="0"/>
+          <a:chExt cx="0" cy="0"/>
+        </a:xfrm>
+      </p:grpSpPr>
+      <p:sp>
+        <p:nvSpPr>
+          <p:cNvPr id="5" name="TextBox 4"/>
+          <p:cNvSpPr txBox="1"/>
+          <p:nvPr/>
+        </p:nvSpPr>
+        <p:spPr>
+          <a:xfrm>
+            <a:off x="176438" y="0"/>
+            <a:ext cx="11620857" cy="5386090"/>
+          </a:xfrm>
+          <a:prstGeom prst="rect">
+            <a:avLst/>
+          </a:prstGeom>
+          <a:noFill/>
+        </p:spPr>
+        <p:txBody>
+          <a:bodyPr wrap="square" rtlCol="0">
+            <a:spAutoFit/>
+          </a:bodyPr>
+          <a:lstStyle/>
+          <a:p>
+            <a:pPr algn="ctr"/>
+            <a:r>
+              <a:rPr lang="en-US" sz="3200" dirty="0" smtClean="0">
+                <a:solidFill>
+                  <a:srgbClr val="FF0000"/>
+                </a:solidFill>
+              </a:rPr>
+              <a:t>Revolutions in Transportation and Economy</a:t>
+            </a:r>
+          </a:p>
+          <a:p>
+            <a:pPr marL="342900" indent="-342900">
+              <a:buFont typeface="Arial" panose="020B0604020202020204" pitchFamily="34" charset="0"/>
+              <a:buChar char="•"/>
+            </a:pPr>
+            <a:r>
+              <a:rPr lang="en-US" sz="2400" dirty="0" smtClean="0">
+                <a:solidFill>
+                  <a:schemeClr val="bg2"/>
+                </a:solidFill>
+              </a:rPr>
+              <a:t>Small NE ports got devastated, everyone benefit because farmers realized they could be rich feeding a nearby city</a:t>
+            </a:r>
+          </a:p>
+          <a:p>
+            <a:pPr marL="342900" indent="-342900">
+              <a:buFont typeface="Arial" panose="020B0604020202020204" pitchFamily="34" charset="0"/>
+              <a:buChar char="•"/>
+            </a:pPr>
+            <a:r>
+              <a:rPr lang="en-US" sz="2400" dirty="0" smtClean="0">
+                <a:solidFill>
+                  <a:schemeClr val="bg2"/>
+                </a:solidFill>
+              </a:rPr>
+              <a:t>They did it through transportation tech and trading w/ friends</a:t>
+            </a:r>
+          </a:p>
+          <a:p>
+            <a:pPr marL="342900" indent="-342900">
+              <a:buFont typeface="Arial" panose="020B0604020202020204" pitchFamily="34" charset="0"/>
+              <a:buChar char="•"/>
+            </a:pPr>
+            <a:r>
+              <a:rPr lang="en-US" sz="2400" dirty="0" smtClean="0">
+                <a:solidFill>
+                  <a:schemeClr val="bg2"/>
+                </a:solidFill>
+              </a:rPr>
+              <a:t>New roads made things easier</a:t>
+            </a:r>
+          </a:p>
+          <a:p>
+            <a:pPr marL="342900" indent="-342900">
+              <a:buFont typeface="Arial" panose="020B0604020202020204" pitchFamily="34" charset="0"/>
+              <a:buChar char="•"/>
+            </a:pPr>
+            <a:r>
+              <a:rPr lang="en-US" sz="2400" dirty="0" smtClean="0">
+                <a:solidFill>
+                  <a:schemeClr val="bg2"/>
+                </a:solidFill>
+              </a:rPr>
+              <a:t>Hudson got his steamboat going in 1812</a:t>
+            </a:r>
+          </a:p>
+          <a:p>
+            <a:pPr marL="342900" indent="-342900">
+              <a:buFont typeface="Arial" panose="020B0604020202020204" pitchFamily="34" charset="0"/>
+              <a:buChar char="•"/>
+            </a:pPr>
+            <a:r>
+              <a:rPr lang="en-US" sz="2400" dirty="0" smtClean="0">
+                <a:solidFill>
+                  <a:schemeClr val="bg2"/>
+                </a:solidFill>
+              </a:rPr>
+              <a:t>Jefferson said New Orleans will shut down America, Spain sold to France, America got </a:t>
+            </a:r>
+            <a:r>
+              <a:rPr lang="en-US" sz="2400" dirty="0" err="1" smtClean="0">
+                <a:solidFill>
+                  <a:schemeClr val="bg2"/>
+                </a:solidFill>
+              </a:rPr>
+              <a:t>tht</a:t>
+            </a:r>
+            <a:r>
+              <a:rPr lang="en-US" sz="2400" dirty="0" smtClean="0">
+                <a:solidFill>
+                  <a:schemeClr val="bg2"/>
+                </a:solidFill>
+              </a:rPr>
+              <a:t> + </a:t>
+            </a:r>
+            <a:r>
+              <a:rPr lang="en-US" sz="2400" dirty="0" err="1" smtClean="0">
+                <a:solidFill>
+                  <a:schemeClr val="bg2"/>
+                </a:solidFill>
+              </a:rPr>
+              <a:t>Louisana</a:t>
+            </a:r>
+            <a:r>
+              <a:rPr lang="en-US" sz="2400" dirty="0" smtClean="0">
+                <a:solidFill>
+                  <a:schemeClr val="bg2"/>
+                </a:solidFill>
+              </a:rPr>
+              <a:t> territory from Napoleon for $15,000 grand</a:t>
+            </a:r>
+          </a:p>
+          <a:p>
+            <a:pPr marL="342900" indent="-342900">
+              <a:buFont typeface="Arial" panose="020B0604020202020204" pitchFamily="34" charset="0"/>
+              <a:buChar char="•"/>
+            </a:pPr>
+            <a:r>
+              <a:rPr lang="en-US" sz="2400" dirty="0" smtClean="0">
+                <a:solidFill>
+                  <a:schemeClr val="bg2"/>
+                </a:solidFill>
+              </a:rPr>
+              <a:t>New Orleans was in a swamp, but they steamboat the problem away</a:t>
+            </a:r>
+          </a:p>
+          <a:p>
+            <a:pPr marL="342900" indent="-342900">
+              <a:buFont typeface="Arial" panose="020B0604020202020204" pitchFamily="34" charset="0"/>
+              <a:buChar char="•"/>
+            </a:pPr>
+            <a:r>
+              <a:rPr lang="en-US" sz="2400" dirty="0" smtClean="0">
+                <a:solidFill>
+                  <a:schemeClr val="bg2"/>
+                </a:solidFill>
+              </a:rPr>
+              <a:t>All cities on Ohio River did well, they called </a:t>
+            </a:r>
+            <a:r>
+              <a:rPr lang="en-US" sz="2400" dirty="0" err="1" smtClean="0">
+                <a:solidFill>
+                  <a:schemeClr val="bg2"/>
+                </a:solidFill>
+              </a:rPr>
+              <a:t>Cinncinati</a:t>
+            </a:r>
+            <a:r>
+              <a:rPr lang="en-US" sz="2400" dirty="0" smtClean="0">
+                <a:solidFill>
+                  <a:schemeClr val="bg2"/>
+                </a:solidFill>
+              </a:rPr>
+              <a:t> </a:t>
+            </a:r>
+            <a:r>
+              <a:rPr lang="en-US" sz="2400" dirty="0" err="1" smtClean="0">
+                <a:solidFill>
+                  <a:schemeClr val="bg2"/>
+                </a:solidFill>
+              </a:rPr>
+              <a:t>porkopolis</a:t>
+            </a:r>
+            <a:r>
+              <a:rPr lang="en-US" sz="2400" dirty="0" smtClean="0">
+                <a:solidFill>
+                  <a:schemeClr val="bg2"/>
+                </a:solidFill>
+              </a:rPr>
+              <a:t> and Queen of the west got like 160,000</a:t>
+            </a:r>
+          </a:p>
+          <a:p>
+            <a:pPr marL="342900" indent="-342900">
+              <a:buFont typeface="Arial" panose="020B0604020202020204" pitchFamily="34" charset="0"/>
+              <a:buChar char="•"/>
+            </a:pPr>
+            <a:r>
+              <a:rPr lang="en-US" sz="2400" dirty="0" smtClean="0">
+                <a:solidFill>
+                  <a:schemeClr val="bg2"/>
+                </a:solidFill>
+              </a:rPr>
+              <a:t>Then you got canals and railroads</a:t>
+            </a:r>
+          </a:p>
+          <a:p>
+            <a:pPr marL="342900" indent="-342900">
+              <a:buFont typeface="Arial" panose="020B0604020202020204" pitchFamily="34" charset="0"/>
+              <a:buChar char="•"/>
+            </a:pPr>
+            <a:r>
+              <a:rPr lang="en-US" sz="2400" dirty="0" smtClean="0">
+                <a:solidFill>
+                  <a:schemeClr val="bg2"/>
+                </a:solidFill>
+              </a:rPr>
+              <a:t>Only mule drawn boats could go in canal, </a:t>
+            </a:r>
+          </a:p>
+          <a:p>
+            <a:pPr marL="342900" indent="-342900">
+              <a:buFont typeface="Arial" panose="020B0604020202020204" pitchFamily="34" charset="0"/>
+              <a:buChar char="•"/>
+            </a:pPr>
+            <a:r>
+              <a:rPr lang="en-US" sz="2400" smtClean="0"/>
+              <a:t>e</a:t>
+            </a:r>
+            <a:endParaRPr lang="en-US" sz="2400" dirty="0" smtClean="0"/>
+          </a:p>
+        </p:txBody>
+      </p:sp>
+    </p:spTree>
+    <p:extLst>
+      <p:ext uri="{BB962C8B-B14F-4D97-AF65-F5344CB8AC3E}">
+        <p14:creationId xmlns:p14="http://schemas.microsoft.com/office/powerpoint/2010/main" val="1521369959"/>
+      </p:ext>
+    </p:extLst>
+  </p:cSld>
+  <p:clrMapOvr>
+    <a:masterClrMapping/>
+  </p:clrMapOvr>
+  <p:timing>
+    <p:tnLst>
+      <p:par>
+        <p:cTn id="1" dur="indefinite" restart="never" nodeType="tmRoot"/>
+      </p:par>
+    </p:tnLst>
+  </p:timing>
+</p:sld>
+</file>
+
 <file path=ppt/slides/slide3.xml><?xml version="1.0" encoding="utf-8"?>
 <p:sld xmlns:a="http://schemas.openxmlformats.org/drawingml/2006/main" xmlns:r="http://schemas.openxmlformats.org/officeDocument/2006/relationships" xmlns:p="http://schemas.openxmlformats.org/presentationml/2006/main">
   <p:cSld>
@@ -6810,20 +9982,192 @@
               <a:buChar char="•"/>
             </a:pPr>
             <a:r>
+              <a:rPr lang="en-US" sz="3200" dirty="0" smtClean="0"/>
+              <a:t>Spain had their own way of building cities by king Philip in 1573, grid- and all, but a formal town	</a:t>
+            </a:r>
+          </a:p>
+          <a:p>
+            <a:pPr marL="285750" indent="-285750">
+              <a:buFont typeface="Arial" panose="020B0604020202020204" pitchFamily="34" charset="0"/>
+              <a:buChar char="•"/>
+            </a:pPr>
+            <a:r>
+              <a:rPr lang="en-US" sz="3200" dirty="0" err="1" smtClean="0"/>
+              <a:t>Bastides</a:t>
+            </a:r>
+            <a:r>
+              <a:rPr lang="en-US" sz="3200" dirty="0" smtClean="0"/>
+              <a:t> stand as forts, trading cities given attention</a:t>
+            </a:r>
+          </a:p>
+        </p:txBody>
+      </p:sp>
+      <p:sp>
+        <p:nvSpPr>
+          <p:cNvPr id="3" name="TextBox 2"/>
+          <p:cNvSpPr txBox="1"/>
+          <p:nvPr/>
+        </p:nvSpPr>
+        <p:spPr>
+          <a:xfrm>
+            <a:off x="548640" y="311970"/>
+            <a:ext cx="10553252" cy="6494085"/>
+          </a:xfrm>
+          <a:prstGeom prst="rect">
+            <a:avLst/>
+          </a:prstGeom>
+          <a:noFill/>
+        </p:spPr>
+        <p:txBody>
+          <a:bodyPr wrap="square" rtlCol="0">
+            <a:spAutoFit/>
+          </a:bodyPr>
+          <a:lstStyle/>
+          <a:p>
+            <a:pPr marL="285750" indent="-285750">
+              <a:buFont typeface="Arial" panose="020B0604020202020204" pitchFamily="34" charset="0"/>
+              <a:buChar char="•"/>
+            </a:pPr>
+            <a:r>
+              <a:rPr lang="en-US" sz="3200" dirty="0" smtClean="0">
+                <a:solidFill>
+                  <a:schemeClr val="bg1"/>
+                </a:solidFill>
+              </a:rPr>
+              <a:t>European </a:t>
+            </a:r>
+            <a:r>
               <a:rPr lang="en-US" sz="3200" dirty="0" err="1" smtClean="0">
                 <a:solidFill>
                   <a:schemeClr val="bg1"/>
                 </a:solidFill>
               </a:rPr>
-              <a:t>ss</a:t>
-            </a:r>
-            <a:r>
-              <a:rPr lang="en-US" sz="3200" dirty="0" err="1" smtClean="0"/>
-              <a:t>Spain</a:t>
-            </a:r>
+              <a:t>bourg</a:t>
+            </a:r>
+            <a:r>
+              <a:rPr lang="en-US" sz="3200" dirty="0" smtClean="0">
+                <a:solidFill>
+                  <a:schemeClr val="bg1"/>
+                </a:solidFill>
+              </a:rPr>
+              <a:t>, inner walled city, </a:t>
+            </a:r>
+            <a:r>
+              <a:rPr lang="en-US" sz="3200" dirty="0" err="1" smtClean="0">
+                <a:solidFill>
+                  <a:schemeClr val="bg1"/>
+                </a:solidFill>
+              </a:rPr>
+              <a:t>fanbourg</a:t>
+            </a:r>
+            <a:r>
+              <a:rPr lang="en-US" sz="3200" dirty="0" smtClean="0">
+                <a:solidFill>
+                  <a:schemeClr val="bg1"/>
+                </a:solidFill>
+              </a:rPr>
+              <a:t>, merchants lived, unorganized for market and security reasons</a:t>
+            </a:r>
+          </a:p>
+          <a:p>
+            <a:pPr marL="285750" indent="-285750">
+              <a:buFont typeface="Arial" panose="020B0604020202020204" pitchFamily="34" charset="0"/>
+              <a:buChar char="•"/>
+            </a:pPr>
+            <a:r>
+              <a:rPr lang="en-US" sz="3200" dirty="0" smtClean="0">
+                <a:solidFill>
+                  <a:schemeClr val="bg1"/>
+                </a:solidFill>
+              </a:rPr>
+              <a:t>America cities copied </a:t>
+            </a:r>
+            <a:r>
+              <a:rPr lang="en-US" sz="3200" dirty="0" err="1" smtClean="0">
+                <a:solidFill>
+                  <a:schemeClr val="bg1"/>
+                </a:solidFill>
+              </a:rPr>
+              <a:t>fanbourg</a:t>
+            </a:r>
+            <a:endParaRPr lang="en-US" sz="3200" dirty="0" smtClean="0">
+              <a:solidFill>
+                <a:schemeClr val="bg1"/>
+              </a:solidFill>
+            </a:endParaRPr>
+          </a:p>
+          <a:p>
+            <a:pPr marL="285750" indent="-285750">
+              <a:buFont typeface="Arial" panose="020B0604020202020204" pitchFamily="34" charset="0"/>
+              <a:buChar char="•"/>
+            </a:pPr>
+            <a:r>
+              <a:rPr lang="en-US" sz="3200" dirty="0" err="1" smtClean="0">
+                <a:solidFill>
+                  <a:schemeClr val="bg1"/>
+                </a:solidFill>
+              </a:rPr>
+              <a:t>Bastide</a:t>
+            </a:r>
+            <a:r>
+              <a:rPr lang="en-US" sz="3200" dirty="0" smtClean="0">
+                <a:solidFill>
+                  <a:schemeClr val="bg1"/>
+                </a:solidFill>
+              </a:rPr>
+              <a:t> for economic reasons</a:t>
+            </a:r>
+          </a:p>
+          <a:p>
+            <a:pPr marL="285750" indent="-285750">
+              <a:buFont typeface="Arial" panose="020B0604020202020204" pitchFamily="34" charset="0"/>
+              <a:buChar char="•"/>
+            </a:pPr>
+            <a:r>
+              <a:rPr lang="en-US" sz="3200" dirty="0" smtClean="0">
+                <a:solidFill>
+                  <a:schemeClr val="bg1"/>
+                </a:solidFill>
+              </a:rPr>
+              <a:t>Had a street plan, and were mainly shopping centers</a:t>
+            </a:r>
+          </a:p>
+          <a:p>
+            <a:pPr marL="285750" indent="-285750">
+              <a:buFont typeface="Arial" panose="020B0604020202020204" pitchFamily="34" charset="0"/>
+              <a:buChar char="•"/>
+            </a:pPr>
+            <a:r>
+              <a:rPr lang="en-US" sz="3200" dirty="0" smtClean="0">
+                <a:solidFill>
+                  <a:schemeClr val="bg1"/>
+                </a:solidFill>
+              </a:rPr>
+              <a:t>English took it with them to America</a:t>
+            </a:r>
+          </a:p>
+          <a:p>
+            <a:pPr marL="285750" indent="-285750">
+              <a:buFont typeface="Arial" panose="020B0604020202020204" pitchFamily="34" charset="0"/>
+              <a:buChar char="•"/>
+            </a:pPr>
+            <a:r>
+              <a:rPr lang="en-US" sz="3200" dirty="0" smtClean="0">
+                <a:solidFill>
+                  <a:schemeClr val="bg1"/>
+                </a:solidFill>
+              </a:rPr>
+              <a:t>America cities made them to be working places</a:t>
+            </a:r>
+          </a:p>
+          <a:p>
+            <a:pPr marL="285750" indent="-285750">
+              <a:buFont typeface="Arial" panose="020B0604020202020204" pitchFamily="34" charset="0"/>
+              <a:buChar char="•"/>
+            </a:pPr>
             <a:r>
               <a:rPr lang="en-US" sz="3200" dirty="0" smtClean="0"/>
-              <a:t> had their own way of building cities by king Philip in 1573, grid- and all, but a formal town	</a:t>
+              <a:t>Spain had their own way of building cities by king Philip in 1573, grid- and all, but a formal town	</a:t>
             </a:r>
           </a:p>
           <a:p>
@@ -6887,8 +10231,8 @@
         </p:nvSpPr>
         <p:spPr>
           <a:xfrm>
-            <a:off x="548640" y="311971"/>
-            <a:ext cx="10553252" cy="5693866"/>
+            <a:off x="536448" y="116899"/>
+            <a:ext cx="10553252" cy="6124754"/>
           </a:xfrm>
           <a:prstGeom prst="rect">
             <a:avLst/>
@@ -7000,6 +10344,43 @@
               </a:rPr>
               <a:t>To deal with trade between towns lesser town lesser </a:t>
             </a:r>
+          </a:p>
+          <a:p>
+            <a:pPr marL="285750" indent="-285750">
+              <a:buFont typeface="Arial" panose="020B0604020202020204" pitchFamily="34" charset="0"/>
+              <a:buChar char="•"/>
+            </a:pPr>
+            <a:r>
+              <a:rPr lang="en-US" sz="2800" dirty="0" smtClean="0">
+                <a:solidFill>
+                  <a:schemeClr val="bg2"/>
+                </a:solidFill>
+              </a:rPr>
+              <a:t>Arcade is just </a:t>
+            </a:r>
+            <a:r>
+              <a:rPr lang="en-US" sz="2800" dirty="0" err="1" smtClean="0">
+                <a:solidFill>
+                  <a:schemeClr val="bg2"/>
+                </a:solidFill>
+              </a:rPr>
+              <a:t>anoter</a:t>
+            </a:r>
+            <a:r>
+              <a:rPr lang="en-US" sz="2800" dirty="0" smtClean="0">
+                <a:solidFill>
+                  <a:schemeClr val="bg2"/>
+                </a:solidFill>
+              </a:rPr>
+              <a:t> word for townhouses joined together</a:t>
+            </a:r>
+            <a:br>
+              <a:rPr lang="en-US" sz="2800" dirty="0" smtClean="0">
+                <a:solidFill>
+                  <a:schemeClr val="bg2"/>
+                </a:solidFill>
+              </a:rPr>
+            </a:br>
             <a:r>
               <a:rPr lang="en-US" sz="2800" dirty="0" smtClean="0"/>
               <a:t>merchants held their goods</a:t>
@@ -7228,19 +10609,7 @@
                   <a:schemeClr val="bg2"/>
                 </a:solidFill>
               </a:rPr>
-              <a:t>Military cities, pueblos made, made them because they want to </a:t>
-            </a:r>
-            <a:r>
-              <a:rPr lang="en-US" sz="2100" dirty="0" smtClean="0"/>
-              <a:t>settle good </a:t>
-            </a:r>
-            <a:r>
-              <a:rPr lang="en-US" sz="2100" dirty="0" smtClean="0">
-                <a:solidFill>
-                  <a:schemeClr val="bg2"/>
-                </a:solidFill>
-              </a:rPr>
-              <a:t>places for </a:t>
+              <a:t>Military cities, pueblos made, made them because they want to settle good places for </a:t>
             </a:r>
             <a:r>
               <a:rPr lang="en-US" sz="2100" dirty="0" err="1" smtClean="0">

</xml_diff>

<commit_message>
undone work for 2/14/17 (2)
</commit_message>
<xml_diff>
--- a/Spring 2017 Semester/Urban Development/Urban Development Weekly Readings/Week 2/Week 2 Readings.pptx
+++ b/Spring 2017 Semester/Urban Development/Urban Development Weekly Readings/Week 2/Week 2 Readings.pptx
@@ -34,6 +34,7 @@
     <p:sldId id="284" r:id="rId28"/>
     <p:sldId id="285" r:id="rId29"/>
     <p:sldId id="286" r:id="rId30"/>
+    <p:sldId id="287" r:id="rId31"/>
   </p:sldIdLst>
   <p:sldSz cx="12192000" cy="6858000"/>
   <p:notesSz cx="6858000" cy="9144000"/>
@@ -170,6 +171,7 @@
         <p14:section name="Untitled Section" id="{6A493B8B-60B6-4FF8-A94F-CA566693BA00}">
           <p14:sldIdLst>
             <p14:sldId id="286"/>
+            <p14:sldId id="287"/>
           </p14:sldIdLst>
         </p14:section>
       </p14:sectionLst>
@@ -9555,7 +9557,7 @@
         <p:spPr>
           <a:xfrm>
             <a:off x="176438" y="0"/>
-            <a:ext cx="11620857" cy="5386090"/>
+            <a:ext cx="11620857" cy="6432530"/>
           </a:xfrm>
           <a:prstGeom prst="rect">
             <a:avLst/>
@@ -9584,7 +9586,7 @@
               <a:buChar char="•"/>
             </a:pPr>
             <a:r>
-              <a:rPr lang="en-US" sz="2400" dirty="0" smtClean="0">
+              <a:rPr lang="en-US" sz="2000" dirty="0" smtClean="0">
                 <a:solidFill>
                   <a:schemeClr val="bg2"/>
                 </a:solidFill>
@@ -9598,7 +9600,7 @@
               <a:buChar char="•"/>
             </a:pPr>
             <a:r>
-              <a:rPr lang="en-US" sz="2400" dirty="0" smtClean="0">
+              <a:rPr lang="en-US" sz="2000" dirty="0" smtClean="0">
                 <a:solidFill>
                   <a:schemeClr val="bg2"/>
                 </a:solidFill>
@@ -9612,7 +9614,7 @@
               <a:buChar char="•"/>
             </a:pPr>
             <a:r>
-              <a:rPr lang="en-US" sz="2400" dirty="0" smtClean="0">
+              <a:rPr lang="en-US" sz="2000" dirty="0" smtClean="0">
                 <a:solidFill>
                   <a:schemeClr val="bg2"/>
                 </a:solidFill>
@@ -9626,7 +9628,7 @@
               <a:buChar char="•"/>
             </a:pPr>
             <a:r>
-              <a:rPr lang="en-US" sz="2400" dirty="0" smtClean="0">
+              <a:rPr lang="en-US" sz="2000" dirty="0" smtClean="0">
                 <a:solidFill>
                   <a:schemeClr val="bg2"/>
                 </a:solidFill>
@@ -9640,7 +9642,7 @@
               <a:buChar char="•"/>
             </a:pPr>
             <a:r>
-              <a:rPr lang="en-US" sz="2400" dirty="0" smtClean="0">
+              <a:rPr lang="en-US" sz="2000" dirty="0" smtClean="0">
                 <a:solidFill>
                   <a:schemeClr val="bg2"/>
                 </a:solidFill>
@@ -9648,7 +9650,7 @@
               <a:t>Jefferson said New Orleans will shut down America, Spain sold to France, America got </a:t>
             </a:r>
             <a:r>
-              <a:rPr lang="en-US" sz="2400" dirty="0" err="1" smtClean="0">
+              <a:rPr lang="en-US" sz="2000" dirty="0" err="1" smtClean="0">
                 <a:solidFill>
                   <a:schemeClr val="bg2"/>
                 </a:solidFill>
@@ -9656,7 +9658,7 @@
               <a:t>tht</a:t>
             </a:r>
             <a:r>
-              <a:rPr lang="en-US" sz="2400" dirty="0" smtClean="0">
+              <a:rPr lang="en-US" sz="2000" dirty="0" smtClean="0">
                 <a:solidFill>
                   <a:schemeClr val="bg2"/>
                 </a:solidFill>
@@ -9664,7 +9666,7 @@
               <a:t> + </a:t>
             </a:r>
             <a:r>
-              <a:rPr lang="en-US" sz="2400" dirty="0" err="1" smtClean="0">
+              <a:rPr lang="en-US" sz="2000" dirty="0" err="1" smtClean="0">
                 <a:solidFill>
                   <a:schemeClr val="bg2"/>
                 </a:solidFill>
@@ -9672,7 +9674,7 @@
               <a:t>Louisana</a:t>
             </a:r>
             <a:r>
-              <a:rPr lang="en-US" sz="2400" dirty="0" smtClean="0">
+              <a:rPr lang="en-US" sz="2000" dirty="0" smtClean="0">
                 <a:solidFill>
                   <a:schemeClr val="bg2"/>
                 </a:solidFill>
@@ -9686,7 +9688,7 @@
               <a:buChar char="•"/>
             </a:pPr>
             <a:r>
-              <a:rPr lang="en-US" sz="2400" dirty="0" smtClean="0">
+              <a:rPr lang="en-US" sz="2000" dirty="0" smtClean="0">
                 <a:solidFill>
                   <a:schemeClr val="bg2"/>
                 </a:solidFill>
@@ -9700,7 +9702,7 @@
               <a:buChar char="•"/>
             </a:pPr>
             <a:r>
-              <a:rPr lang="en-US" sz="2400" dirty="0" smtClean="0">
+              <a:rPr lang="en-US" sz="2000" dirty="0" smtClean="0">
                 <a:solidFill>
                   <a:schemeClr val="bg2"/>
                 </a:solidFill>
@@ -9708,7 +9710,7 @@
               <a:t>All cities on Ohio River did well, they called </a:t>
             </a:r>
             <a:r>
-              <a:rPr lang="en-US" sz="2400" dirty="0" err="1" smtClean="0">
+              <a:rPr lang="en-US" sz="2000" dirty="0" err="1" smtClean="0">
                 <a:solidFill>
                   <a:schemeClr val="bg2"/>
                 </a:solidFill>
@@ -9716,7 +9718,7 @@
               <a:t>Cinncinati</a:t>
             </a:r>
             <a:r>
-              <a:rPr lang="en-US" sz="2400" dirty="0" smtClean="0">
+              <a:rPr lang="en-US" sz="2000" dirty="0" smtClean="0">
                 <a:solidFill>
                   <a:schemeClr val="bg2"/>
                 </a:solidFill>
@@ -9724,7 +9726,7 @@
               <a:t> </a:t>
             </a:r>
             <a:r>
-              <a:rPr lang="en-US" sz="2400" dirty="0" err="1" smtClean="0">
+              <a:rPr lang="en-US" sz="2000" dirty="0" err="1" smtClean="0">
                 <a:solidFill>
                   <a:schemeClr val="bg2"/>
                 </a:solidFill>
@@ -9732,7 +9734,7 @@
               <a:t>porkopolis</a:t>
             </a:r>
             <a:r>
-              <a:rPr lang="en-US" sz="2400" dirty="0" smtClean="0">
+              <a:rPr lang="en-US" sz="2000" dirty="0" smtClean="0">
                 <a:solidFill>
                   <a:schemeClr val="bg2"/>
                 </a:solidFill>
@@ -9746,7 +9748,7 @@
               <a:buChar char="•"/>
             </a:pPr>
             <a:r>
-              <a:rPr lang="en-US" sz="2400" dirty="0" smtClean="0">
+              <a:rPr lang="en-US" sz="2000" dirty="0" smtClean="0">
                 <a:solidFill>
                   <a:schemeClr val="bg2"/>
                 </a:solidFill>
@@ -9760,12 +9762,12 @@
               <a:buChar char="•"/>
             </a:pPr>
             <a:r>
-              <a:rPr lang="en-US" sz="2400" dirty="0" smtClean="0">
+              <a:rPr lang="en-US" sz="2000" dirty="0" smtClean="0">
                 <a:solidFill>
                   <a:schemeClr val="bg2"/>
                 </a:solidFill>
               </a:rPr>
-              <a:t>Only mule drawn boats could go in canal, </a:t>
+              <a:t>Only mule drawn boats could go in canal, New York was the biggest</a:t>
             </a:r>
           </a:p>
           <a:p>
@@ -9774,10 +9776,87 @@
               <a:buChar char="•"/>
             </a:pPr>
             <a:r>
-              <a:rPr lang="en-US" sz="2400" smtClean="0"/>
-              <a:t>e</a:t>
-            </a:r>
-            <a:endParaRPr lang="en-US" sz="2400" dirty="0" smtClean="0"/>
+              <a:rPr lang="en-US" sz="2000" dirty="0" smtClean="0">
+                <a:solidFill>
+                  <a:schemeClr val="bg2"/>
+                </a:solidFill>
+              </a:rPr>
+              <a:t>Everyone did this and in 1830 2,000 miles of canal was built</a:t>
+            </a:r>
+          </a:p>
+          <a:p>
+            <a:pPr marL="342900" indent="-342900">
+              <a:buFont typeface="Arial" panose="020B0604020202020204" pitchFamily="34" charset="0"/>
+              <a:buChar char="•"/>
+            </a:pPr>
+            <a:r>
+              <a:rPr lang="en-US" sz="2000" dirty="0" smtClean="0">
+                <a:solidFill>
+                  <a:schemeClr val="bg2"/>
+                </a:solidFill>
+              </a:rPr>
+              <a:t>You got a canal system w/ the Great Lakes and got Cleveland Detroit and Chicago </a:t>
+            </a:r>
+            <a:r>
+              <a:rPr lang="en-US" sz="2000" dirty="0" smtClean="0"/>
+              <a:t>(head honcho)</a:t>
+            </a:r>
+          </a:p>
+          <a:p>
+            <a:pPr marL="342900" indent="-342900">
+              <a:buFont typeface="Arial" panose="020B0604020202020204" pitchFamily="34" charset="0"/>
+              <a:buChar char="•"/>
+            </a:pPr>
+            <a:r>
+              <a:rPr lang="en-US" sz="2000" dirty="0" smtClean="0"/>
+              <a:t>Chicago </a:t>
+            </a:r>
+            <a:r>
+              <a:rPr lang="en-US" sz="2000" dirty="0" err="1" smtClean="0"/>
+              <a:t>trynna</a:t>
+            </a:r>
+            <a:r>
+              <a:rPr lang="en-US" sz="2000" dirty="0" smtClean="0"/>
+              <a:t> build a canal to link w/ Mississippi River, </a:t>
+            </a:r>
+          </a:p>
+          <a:p>
+            <a:pPr marL="342900" indent="-342900">
+              <a:buFont typeface="Arial" panose="020B0604020202020204" pitchFamily="34" charset="0"/>
+              <a:buChar char="•"/>
+            </a:pPr>
+            <a:r>
+              <a:rPr lang="en-US" sz="2000" dirty="0" smtClean="0"/>
+              <a:t>Even though Chicago was a marsh, </a:t>
+            </a:r>
+            <a:r>
+              <a:rPr lang="en-US" sz="2000" dirty="0" err="1" smtClean="0"/>
+              <a:t>ppl</a:t>
+            </a:r>
+            <a:r>
+              <a:rPr lang="en-US" sz="2000" dirty="0" smtClean="0"/>
+              <a:t> started to pay bread for its land</a:t>
+            </a:r>
+          </a:p>
+          <a:p>
+            <a:pPr marL="342900" indent="-342900">
+              <a:buFont typeface="Arial" panose="020B0604020202020204" pitchFamily="34" charset="0"/>
+              <a:buChar char="•"/>
+            </a:pPr>
+            <a:r>
+              <a:rPr lang="en-US" sz="2000" dirty="0" smtClean="0"/>
+              <a:t>Then it became a city w/ railroads , trading and got a telegraph going</a:t>
+            </a:r>
+          </a:p>
+          <a:p>
+            <a:pPr marL="342900" indent="-342900">
+              <a:buFont typeface="Arial" panose="020B0604020202020204" pitchFamily="34" charset="0"/>
+              <a:buChar char="•"/>
+            </a:pPr>
+            <a:r>
+              <a:rPr lang="en-US" sz="2000" dirty="0" smtClean="0"/>
+              <a:t>Farmers used this and all of a sudden everyone had a reason to go everywhere to do stuff</a:t>
+            </a:r>
           </a:p>
         </p:txBody>
       </p:sp>
@@ -10190,6 +10269,96 @@
     <p:extLst>
       <p:ext uri="{BB962C8B-B14F-4D97-AF65-F5344CB8AC3E}">
         <p14:creationId xmlns:p14="http://schemas.microsoft.com/office/powerpoint/2010/main" val="482838569"/>
+      </p:ext>
+    </p:extLst>
+  </p:cSld>
+  <p:clrMapOvr>
+    <a:masterClrMapping/>
+  </p:clrMapOvr>
+  <p:timing>
+    <p:tnLst>
+      <p:par>
+        <p:cTn id="1" dur="indefinite" restart="never" nodeType="tmRoot"/>
+      </p:par>
+    </p:tnLst>
+  </p:timing>
+</p:sld>
+</file>
+
+<file path=ppt/slides/slide30.xml><?xml version="1.0" encoding="utf-8"?>
+<p:sld xmlns:a="http://schemas.openxmlformats.org/drawingml/2006/main" xmlns:r="http://schemas.openxmlformats.org/officeDocument/2006/relationships" xmlns:p="http://schemas.openxmlformats.org/presentationml/2006/main">
+  <p:cSld>
+    <p:spTree>
+      <p:nvGrpSpPr>
+        <p:cNvPr id="1" name=""/>
+        <p:cNvGrpSpPr/>
+        <p:nvPr/>
+      </p:nvGrpSpPr>
+      <p:grpSpPr>
+        <a:xfrm>
+          <a:off x="0" y="0"/>
+          <a:ext cx="0" cy="0"/>
+          <a:chOff x="0" y="0"/>
+          <a:chExt cx="0" cy="0"/>
+        </a:xfrm>
+      </p:grpSpPr>
+      <p:sp>
+        <p:nvSpPr>
+          <p:cNvPr id="5" name="TextBox 4"/>
+          <p:cNvSpPr txBox="1"/>
+          <p:nvPr/>
+        </p:nvSpPr>
+        <p:spPr>
+          <a:xfrm>
+            <a:off x="176438" y="0"/>
+            <a:ext cx="11620857" cy="1015663"/>
+          </a:xfrm>
+          <a:prstGeom prst="rect">
+            <a:avLst/>
+          </a:prstGeom>
+          <a:noFill/>
+        </p:spPr>
+        <p:txBody>
+          <a:bodyPr wrap="square" rtlCol="0">
+            <a:spAutoFit/>
+          </a:bodyPr>
+          <a:lstStyle/>
+          <a:p>
+            <a:pPr algn="ctr"/>
+            <a:r>
+              <a:rPr lang="en-US" sz="3200" dirty="0" err="1" smtClean="0">
+                <a:solidFill>
+                  <a:srgbClr val="FF0000"/>
+                </a:solidFill>
+              </a:rPr>
+              <a:t>Boosterism</a:t>
+            </a:r>
+            <a:endParaRPr lang="en-US" sz="3200" dirty="0" smtClean="0">
+              <a:solidFill>
+                <a:srgbClr val="FF0000"/>
+              </a:solidFill>
+            </a:endParaRPr>
+          </a:p>
+          <a:p>
+            <a:pPr marL="457200" indent="-457200">
+              <a:buFont typeface="Arial" panose="020B0604020202020204" pitchFamily="34" charset="0"/>
+              <a:buChar char="•"/>
+            </a:pPr>
+            <a:r>
+              <a:rPr lang="en-US" sz="2800" dirty="0" smtClean="0">
+                <a:solidFill>
+                  <a:schemeClr val="bg2"/>
+                </a:solidFill>
+              </a:rPr>
+              <a:t>Left off here</a:t>
+            </a:r>
+          </a:p>
+        </p:txBody>
+      </p:sp>
+    </p:spTree>
+    <p:extLst>
+      <p:ext uri="{BB962C8B-B14F-4D97-AF65-F5344CB8AC3E}">
+        <p14:creationId xmlns:p14="http://schemas.microsoft.com/office/powerpoint/2010/main" val="770512314"/>
       </p:ext>
     </p:extLst>
   </p:cSld>

</xml_diff>